<commit_message>
Update .gitignore and samples
</commit_message>
<xml_diff>
--- a/161702/presentation/01 - Syllabus, Review of PAA 1/01. Syllabus, Review of PAA 1.pptx
+++ b/161702/presentation/01 - Syllabus, Review of PAA 1/01. Syllabus, Review of PAA 1.pptx
@@ -5,17 +5,17 @@
     <p:sldMasterId id="2147483720" r:id="rId1"/>
   </p:sldMasterIdLst>
   <p:notesMasterIdLst>
-    <p:notesMasterId r:id="rId37"/>
+    <p:notesMasterId r:id="rId36"/>
   </p:notesMasterIdLst>
   <p:sldIdLst>
     <p:sldId id="256" r:id="rId2"/>
     <p:sldId id="263" r:id="rId3"/>
     <p:sldId id="264" r:id="rId4"/>
     <p:sldId id="267" r:id="rId5"/>
-    <p:sldId id="268" r:id="rId6"/>
-    <p:sldId id="257" r:id="rId7"/>
-    <p:sldId id="258" r:id="rId8"/>
-    <p:sldId id="262" r:id="rId9"/>
+    <p:sldId id="262" r:id="rId6"/>
+    <p:sldId id="268" r:id="rId7"/>
+    <p:sldId id="257" r:id="rId8"/>
+    <p:sldId id="258" r:id="rId9"/>
     <p:sldId id="265" r:id="rId10"/>
     <p:sldId id="266" r:id="rId11"/>
     <p:sldId id="269" r:id="rId12"/>
@@ -42,7 +42,6 @@
     <p:sldId id="287" r:id="rId33"/>
     <p:sldId id="259" r:id="rId34"/>
     <p:sldId id="260" r:id="rId35"/>
-    <p:sldId id="288" r:id="rId36"/>
   </p:sldIdLst>
   <p:sldSz cx="9144000" cy="6858000" type="screen4x3"/>
   <p:notesSz cx="6858000" cy="9144000"/>
@@ -2713,6 +2712,13 @@
         </dgm:presLayoutVars>
       </dgm:prSet>
       <dgm:spPr/>
+      <dgm:t>
+        <a:bodyPr/>
+        <a:lstStyle/>
+        <a:p>
+          <a:endParaRPr lang="en-US"/>
+        </a:p>
+      </dgm:t>
     </dgm:pt>
     <dgm:pt modelId="{445500B0-F324-410D-9A19-38DE8615FAE0}" type="pres">
       <dgm:prSet presAssocID="{9BBFAAE6-258D-45BE-83EF-4CC1C1B53B48}" presName="tSp" presStyleCnt="0"/>
@@ -2741,6 +2747,13 @@
         </dgm:presLayoutVars>
       </dgm:prSet>
       <dgm:spPr/>
+      <dgm:t>
+        <a:bodyPr/>
+        <a:lstStyle/>
+        <a:p>
+          <a:endParaRPr lang="en-US"/>
+        </a:p>
+      </dgm:t>
     </dgm:pt>
     <dgm:pt modelId="{C5C3795D-9639-446E-B772-21DF6A1AE184}" type="pres">
       <dgm:prSet presAssocID="{78FE7DA1-9E59-4351-A0C3-840B4CEC6B8B}" presName="childNode1tx" presStyleLbl="bgAcc1" presStyleIdx="0" presStyleCnt="3">
@@ -2749,6 +2762,13 @@
         </dgm:presLayoutVars>
       </dgm:prSet>
       <dgm:spPr/>
+      <dgm:t>
+        <a:bodyPr/>
+        <a:lstStyle/>
+        <a:p>
+          <a:endParaRPr lang="en-US"/>
+        </a:p>
+      </dgm:t>
     </dgm:pt>
     <dgm:pt modelId="{47C95866-64A5-47E9-80F8-FDB6E18B76FC}" type="pres">
       <dgm:prSet presAssocID="{78FE7DA1-9E59-4351-A0C3-840B4CEC6B8B}" presName="parentNode1" presStyleLbl="node1" presStyleIdx="0" presStyleCnt="3">
@@ -2758,6 +2778,13 @@
         </dgm:presLayoutVars>
       </dgm:prSet>
       <dgm:spPr/>
+      <dgm:t>
+        <a:bodyPr/>
+        <a:lstStyle/>
+        <a:p>
+          <a:endParaRPr lang="en-US"/>
+        </a:p>
+      </dgm:t>
     </dgm:pt>
     <dgm:pt modelId="{86104BD7-7E25-4710-87D2-17722B37CAE2}" type="pres">
       <dgm:prSet presAssocID="{78FE7DA1-9E59-4351-A0C3-840B4CEC6B8B}" presName="connSite1" presStyleCnt="0"/>
@@ -2766,6 +2793,13 @@
     <dgm:pt modelId="{9E995594-4D40-425B-B6C3-5192722DD04E}" type="pres">
       <dgm:prSet presAssocID="{42409908-29D1-4CE0-96E0-2193869AD446}" presName="Name9" presStyleLbl="sibTrans2D1" presStyleIdx="0" presStyleCnt="2"/>
       <dgm:spPr/>
+      <dgm:t>
+        <a:bodyPr/>
+        <a:lstStyle/>
+        <a:p>
+          <a:endParaRPr lang="en-US"/>
+        </a:p>
+      </dgm:t>
     </dgm:pt>
     <dgm:pt modelId="{547200FE-EAA2-4EF2-BFAB-8B03E5C4A54C}" type="pres">
       <dgm:prSet presAssocID="{F1AE3206-75CB-4280-A0BF-FBD4E28FFC84}" presName="composite2" presStyleCnt="0"/>
@@ -2782,6 +2816,13 @@
         </dgm:presLayoutVars>
       </dgm:prSet>
       <dgm:spPr/>
+      <dgm:t>
+        <a:bodyPr/>
+        <a:lstStyle/>
+        <a:p>
+          <a:endParaRPr lang="en-US"/>
+        </a:p>
+      </dgm:t>
     </dgm:pt>
     <dgm:pt modelId="{C833A0CD-1554-4189-9DEE-7765ED5001B0}" type="pres">
       <dgm:prSet presAssocID="{F1AE3206-75CB-4280-A0BF-FBD4E28FFC84}" presName="childNode2tx" presStyleLbl="bgAcc1" presStyleIdx="1" presStyleCnt="3">
@@ -2790,6 +2831,13 @@
         </dgm:presLayoutVars>
       </dgm:prSet>
       <dgm:spPr/>
+      <dgm:t>
+        <a:bodyPr/>
+        <a:lstStyle/>
+        <a:p>
+          <a:endParaRPr lang="en-US"/>
+        </a:p>
+      </dgm:t>
     </dgm:pt>
     <dgm:pt modelId="{72CDD254-7DB9-47C3-BDAB-1749354C558B}" type="pres">
       <dgm:prSet presAssocID="{F1AE3206-75CB-4280-A0BF-FBD4E28FFC84}" presName="parentNode2" presStyleLbl="node1" presStyleIdx="1" presStyleCnt="3">
@@ -2799,6 +2847,13 @@
         </dgm:presLayoutVars>
       </dgm:prSet>
       <dgm:spPr/>
+      <dgm:t>
+        <a:bodyPr/>
+        <a:lstStyle/>
+        <a:p>
+          <a:endParaRPr lang="en-US"/>
+        </a:p>
+      </dgm:t>
     </dgm:pt>
     <dgm:pt modelId="{2D235F5F-A454-4F8F-BC53-B8FFB8CC7BEB}" type="pres">
       <dgm:prSet presAssocID="{F1AE3206-75CB-4280-A0BF-FBD4E28FFC84}" presName="connSite2" presStyleCnt="0"/>
@@ -2807,6 +2862,13 @@
     <dgm:pt modelId="{17B402CA-3C9E-4FE9-BFE7-F11FFC449096}" type="pres">
       <dgm:prSet presAssocID="{C913CB2B-7253-4823-813D-F140198DFF7F}" presName="Name18" presStyleLbl="sibTrans2D1" presStyleIdx="1" presStyleCnt="2"/>
       <dgm:spPr/>
+      <dgm:t>
+        <a:bodyPr/>
+        <a:lstStyle/>
+        <a:p>
+          <a:endParaRPr lang="en-US"/>
+        </a:p>
+      </dgm:t>
     </dgm:pt>
     <dgm:pt modelId="{26AB677A-0428-4009-A77F-6009D46BFF40}" type="pres">
       <dgm:prSet presAssocID="{07ACBF5B-41EE-45BC-9F26-0C59BEB8E720}" presName="composite1" presStyleCnt="0"/>
@@ -2823,6 +2885,13 @@
         </dgm:presLayoutVars>
       </dgm:prSet>
       <dgm:spPr/>
+      <dgm:t>
+        <a:bodyPr/>
+        <a:lstStyle/>
+        <a:p>
+          <a:endParaRPr lang="en-US"/>
+        </a:p>
+      </dgm:t>
     </dgm:pt>
     <dgm:pt modelId="{DF91D674-87D8-43E1-B096-AF82EC896719}" type="pres">
       <dgm:prSet presAssocID="{07ACBF5B-41EE-45BC-9F26-0C59BEB8E720}" presName="childNode1tx" presStyleLbl="bgAcc1" presStyleIdx="2" presStyleCnt="3">
@@ -2831,6 +2900,13 @@
         </dgm:presLayoutVars>
       </dgm:prSet>
       <dgm:spPr/>
+      <dgm:t>
+        <a:bodyPr/>
+        <a:lstStyle/>
+        <a:p>
+          <a:endParaRPr lang="en-US"/>
+        </a:p>
+      </dgm:t>
     </dgm:pt>
     <dgm:pt modelId="{60055938-3D5E-4F77-8B65-9CC7ABF71EC1}" type="pres">
       <dgm:prSet presAssocID="{07ACBF5B-41EE-45BC-9F26-0C59BEB8E720}" presName="parentNode1" presStyleLbl="node1" presStyleIdx="2" presStyleCnt="3">
@@ -2840,6 +2916,13 @@
         </dgm:presLayoutVars>
       </dgm:prSet>
       <dgm:spPr/>
+      <dgm:t>
+        <a:bodyPr/>
+        <a:lstStyle/>
+        <a:p>
+          <a:endParaRPr lang="en-US"/>
+        </a:p>
+      </dgm:t>
     </dgm:pt>
     <dgm:pt modelId="{1B970AE4-B878-44C5-AC42-895103D3D5C1}" type="pres">
       <dgm:prSet presAssocID="{07ACBF5B-41EE-45BC-9F26-0C59BEB8E720}" presName="connSite1" presStyleCnt="0"/>
@@ -2847,27 +2930,27 @@
     </dgm:pt>
   </dgm:ptLst>
   <dgm:cxnLst>
+    <dgm:cxn modelId="{6E0F4F21-D8E1-4ECC-A0BE-B007C3A542A8}" type="presOf" srcId="{78FE7DA1-9E59-4351-A0C3-840B4CEC6B8B}" destId="{47C95866-64A5-47E9-80F8-FDB6E18B76FC}" srcOrd="0" destOrd="0" presId="urn:microsoft.com/office/officeart/2005/8/layout/hProcess4"/>
+    <dgm:cxn modelId="{2AD9506D-8678-4463-8BEE-674171AF029F}" type="presOf" srcId="{42409908-29D1-4CE0-96E0-2193869AD446}" destId="{9E995594-4D40-425B-B6C3-5192722DD04E}" srcOrd="0" destOrd="0" presId="urn:microsoft.com/office/officeart/2005/8/layout/hProcess4"/>
+    <dgm:cxn modelId="{9A03DF29-D4A9-43C6-87A3-654F141ACB50}" type="presOf" srcId="{DAD88AB1-D040-48C3-9C8A-C5BD0814DF57}" destId="{E89BAE0A-F2AE-4D7B-85FE-6E7861DA1276}" srcOrd="0" destOrd="1" presId="urn:microsoft.com/office/officeart/2005/8/layout/hProcess4"/>
+    <dgm:cxn modelId="{1BF90691-69FA-4B3C-9BFB-124A9070CC76}" srcId="{F1AE3206-75CB-4280-A0BF-FBD4E28FFC84}" destId="{5579AFF2-84FC-47E4-8BA4-5409DA1E0F8A}" srcOrd="0" destOrd="0" parTransId="{6147226A-24FC-4C60-A1E7-6F0211288257}" sibTransId="{C6A3F0BA-9969-4572-AA27-4A870FCACA99}"/>
+    <dgm:cxn modelId="{55E475BA-AED7-4BBB-9062-40C435BFB6BF}" type="presOf" srcId="{5579AFF2-84FC-47E4-8BA4-5409DA1E0F8A}" destId="{C833A0CD-1554-4189-9DEE-7765ED5001B0}" srcOrd="1" destOrd="0" presId="urn:microsoft.com/office/officeart/2005/8/layout/hProcess4"/>
+    <dgm:cxn modelId="{4B6E621A-9667-4643-A502-115AC47950EF}" type="presOf" srcId="{F1AE3206-75CB-4280-A0BF-FBD4E28FFC84}" destId="{72CDD254-7DB9-47C3-BDAB-1749354C558B}" srcOrd="0" destOrd="0" presId="urn:microsoft.com/office/officeart/2005/8/layout/hProcess4"/>
+    <dgm:cxn modelId="{4F925B48-E3E2-4575-A982-EA3C673A7878}" type="presOf" srcId="{76D81896-1C46-42DE-87D3-5A45E28CE80C}" destId="{E89BAE0A-F2AE-4D7B-85FE-6E7861DA1276}" srcOrd="0" destOrd="0" presId="urn:microsoft.com/office/officeart/2005/8/layout/hProcess4"/>
+    <dgm:cxn modelId="{57AFEE38-E877-4A2E-8EDD-6A59F3DAA36B}" type="presOf" srcId="{07ACBF5B-41EE-45BC-9F26-0C59BEB8E720}" destId="{60055938-3D5E-4F77-8B65-9CC7ABF71EC1}" srcOrd="0" destOrd="0" presId="urn:microsoft.com/office/officeart/2005/8/layout/hProcess4"/>
+    <dgm:cxn modelId="{81DF4524-15C8-4BC1-AFA2-39D58DBB5BD9}" srcId="{9BBFAAE6-258D-45BE-83EF-4CC1C1B53B48}" destId="{F1AE3206-75CB-4280-A0BF-FBD4E28FFC84}" srcOrd="1" destOrd="0" parTransId="{DD14A4E8-9146-447B-9D4F-BD7940A60ED5}" sibTransId="{C913CB2B-7253-4823-813D-F140198DFF7F}"/>
     <dgm:cxn modelId="{4044DEB9-691C-4B5E-94E7-BB340DA9878E}" type="presOf" srcId="{9BBFAAE6-258D-45BE-83EF-4CC1C1B53B48}" destId="{C547005F-C70B-42E0-98DD-253002E640A0}" srcOrd="0" destOrd="0" presId="urn:microsoft.com/office/officeart/2005/8/layout/hProcess4"/>
-    <dgm:cxn modelId="{9B8B33AF-C9FF-4CB0-805E-3818BD96E2EA}" type="presOf" srcId="{6D643C8B-D23F-468C-8A3A-6D9C4F65202B}" destId="{C5C3795D-9639-446E-B772-21DF6A1AE184}" srcOrd="1" destOrd="0" presId="urn:microsoft.com/office/officeart/2005/8/layout/hProcess4"/>
+    <dgm:cxn modelId="{C419C141-0DA2-4652-B644-626B5ADDE819}" srcId="{07ACBF5B-41EE-45BC-9F26-0C59BEB8E720}" destId="{DAD88AB1-D040-48C3-9C8A-C5BD0814DF57}" srcOrd="1" destOrd="0" parTransId="{57F1F36D-4BCB-46EE-8070-28BF61EB7FA9}" sibTransId="{26EA948E-21DD-4D97-950B-3897246E1E8C}"/>
+    <dgm:cxn modelId="{1984DA53-B032-42BA-8C18-668DB615D106}" srcId="{9BBFAAE6-258D-45BE-83EF-4CC1C1B53B48}" destId="{07ACBF5B-41EE-45BC-9F26-0C59BEB8E720}" srcOrd="2" destOrd="0" parTransId="{9789B8F6-2FE2-460A-95DE-572065C04CB2}" sibTransId="{5132266D-CE6E-4715-BB65-9A9D0BCDF2EB}"/>
+    <dgm:cxn modelId="{CB30325B-E022-417C-B6A5-90DC48FD5215}" type="presOf" srcId="{5579AFF2-84FC-47E4-8BA4-5409DA1E0F8A}" destId="{DDC744F6-E538-44A1-8F96-92ACE8690B9B}" srcOrd="0" destOrd="0" presId="urn:microsoft.com/office/officeart/2005/8/layout/hProcess4"/>
     <dgm:cxn modelId="{75AE2E8B-629F-4076-9E27-9EDE7570E091}" type="presOf" srcId="{C913CB2B-7253-4823-813D-F140198DFF7F}" destId="{17B402CA-3C9E-4FE9-BFE7-F11FFC449096}" srcOrd="0" destOrd="0" presId="urn:microsoft.com/office/officeart/2005/8/layout/hProcess4"/>
     <dgm:cxn modelId="{A383C5A5-2490-432D-9838-67CB132EE4A4}" srcId="{78FE7DA1-9E59-4351-A0C3-840B4CEC6B8B}" destId="{6D643C8B-D23F-468C-8A3A-6D9C4F65202B}" srcOrd="0" destOrd="0" parTransId="{601B77FF-C486-4C1A-9A99-A4428C52C768}" sibTransId="{81156465-3098-4FBF-8422-ED00F14E8B6C}"/>
-    <dgm:cxn modelId="{81DF4524-15C8-4BC1-AFA2-39D58DBB5BD9}" srcId="{9BBFAAE6-258D-45BE-83EF-4CC1C1B53B48}" destId="{F1AE3206-75CB-4280-A0BF-FBD4E28FFC84}" srcOrd="1" destOrd="0" parTransId="{DD14A4E8-9146-447B-9D4F-BD7940A60ED5}" sibTransId="{C913CB2B-7253-4823-813D-F140198DFF7F}"/>
-    <dgm:cxn modelId="{57AFEE38-E877-4A2E-8EDD-6A59F3DAA36B}" type="presOf" srcId="{07ACBF5B-41EE-45BC-9F26-0C59BEB8E720}" destId="{60055938-3D5E-4F77-8B65-9CC7ABF71EC1}" srcOrd="0" destOrd="0" presId="urn:microsoft.com/office/officeart/2005/8/layout/hProcess4"/>
-    <dgm:cxn modelId="{1984DA53-B032-42BA-8C18-668DB615D106}" srcId="{9BBFAAE6-258D-45BE-83EF-4CC1C1B53B48}" destId="{07ACBF5B-41EE-45BC-9F26-0C59BEB8E720}" srcOrd="2" destOrd="0" parTransId="{9789B8F6-2FE2-460A-95DE-572065C04CB2}" sibTransId="{5132266D-CE6E-4715-BB65-9A9D0BCDF2EB}"/>
-    <dgm:cxn modelId="{4B6E621A-9667-4643-A502-115AC47950EF}" type="presOf" srcId="{F1AE3206-75CB-4280-A0BF-FBD4E28FFC84}" destId="{72CDD254-7DB9-47C3-BDAB-1749354C558B}" srcOrd="0" destOrd="0" presId="urn:microsoft.com/office/officeart/2005/8/layout/hProcess4"/>
+    <dgm:cxn modelId="{369298E0-B03F-4393-ABCB-D96AE4B1CDC7}" srcId="{9BBFAAE6-258D-45BE-83EF-4CC1C1B53B48}" destId="{78FE7DA1-9E59-4351-A0C3-840B4CEC6B8B}" srcOrd="0" destOrd="0" parTransId="{ECF79735-E5EC-4733-BC81-A8A28CC7A6FF}" sibTransId="{42409908-29D1-4CE0-96E0-2193869AD446}"/>
+    <dgm:cxn modelId="{1D005D69-BC60-4D82-AE4C-07DA63AA60FF}" type="presOf" srcId="{DAD88AB1-D040-48C3-9C8A-C5BD0814DF57}" destId="{DF91D674-87D8-43E1-B096-AF82EC896719}" srcOrd="1" destOrd="1" presId="urn:microsoft.com/office/officeart/2005/8/layout/hProcess4"/>
+    <dgm:cxn modelId="{9B8B33AF-C9FF-4CB0-805E-3818BD96E2EA}" type="presOf" srcId="{6D643C8B-D23F-468C-8A3A-6D9C4F65202B}" destId="{C5C3795D-9639-446E-B772-21DF6A1AE184}" srcOrd="1" destOrd="0" presId="urn:microsoft.com/office/officeart/2005/8/layout/hProcess4"/>
+    <dgm:cxn modelId="{067FDA65-92B1-4E83-8827-9FC8FEBFB00E}" type="presOf" srcId="{76D81896-1C46-42DE-87D3-5A45E28CE80C}" destId="{DF91D674-87D8-43E1-B096-AF82EC896719}" srcOrd="1" destOrd="0" presId="urn:microsoft.com/office/officeart/2005/8/layout/hProcess4"/>
     <dgm:cxn modelId="{16D1C678-B8E9-4387-95EB-916E8C5D300C}" srcId="{07ACBF5B-41EE-45BC-9F26-0C59BEB8E720}" destId="{76D81896-1C46-42DE-87D3-5A45E28CE80C}" srcOrd="0" destOrd="0" parTransId="{30AF906F-9AC3-4441-881D-77F5666055FD}" sibTransId="{BEA812B5-BB26-4762-ADE9-6F862D145942}"/>
-    <dgm:cxn modelId="{55E475BA-AED7-4BBB-9062-40C435BFB6BF}" type="presOf" srcId="{5579AFF2-84FC-47E4-8BA4-5409DA1E0F8A}" destId="{C833A0CD-1554-4189-9DEE-7765ED5001B0}" srcOrd="1" destOrd="0" presId="urn:microsoft.com/office/officeart/2005/8/layout/hProcess4"/>
-    <dgm:cxn modelId="{1BF90691-69FA-4B3C-9BFB-124A9070CC76}" srcId="{F1AE3206-75CB-4280-A0BF-FBD4E28FFC84}" destId="{5579AFF2-84FC-47E4-8BA4-5409DA1E0F8A}" srcOrd="0" destOrd="0" parTransId="{6147226A-24FC-4C60-A1E7-6F0211288257}" sibTransId="{C6A3F0BA-9969-4572-AA27-4A870FCACA99}"/>
-    <dgm:cxn modelId="{6E0F4F21-D8E1-4ECC-A0BE-B007C3A542A8}" type="presOf" srcId="{78FE7DA1-9E59-4351-A0C3-840B4CEC6B8B}" destId="{47C95866-64A5-47E9-80F8-FDB6E18B76FC}" srcOrd="0" destOrd="0" presId="urn:microsoft.com/office/officeart/2005/8/layout/hProcess4"/>
-    <dgm:cxn modelId="{CB30325B-E022-417C-B6A5-90DC48FD5215}" type="presOf" srcId="{5579AFF2-84FC-47E4-8BA4-5409DA1E0F8A}" destId="{DDC744F6-E538-44A1-8F96-92ACE8690B9B}" srcOrd="0" destOrd="0" presId="urn:microsoft.com/office/officeart/2005/8/layout/hProcess4"/>
-    <dgm:cxn modelId="{1D005D69-BC60-4D82-AE4C-07DA63AA60FF}" type="presOf" srcId="{DAD88AB1-D040-48C3-9C8A-C5BD0814DF57}" destId="{DF91D674-87D8-43E1-B096-AF82EC896719}" srcOrd="1" destOrd="1" presId="urn:microsoft.com/office/officeart/2005/8/layout/hProcess4"/>
-    <dgm:cxn modelId="{9A03DF29-D4A9-43C6-87A3-654F141ACB50}" type="presOf" srcId="{DAD88AB1-D040-48C3-9C8A-C5BD0814DF57}" destId="{E89BAE0A-F2AE-4D7B-85FE-6E7861DA1276}" srcOrd="0" destOrd="1" presId="urn:microsoft.com/office/officeart/2005/8/layout/hProcess4"/>
     <dgm:cxn modelId="{EDB19DA6-8BEE-4626-9FC4-A68D1069A869}" type="presOf" srcId="{6D643C8B-D23F-468C-8A3A-6D9C4F65202B}" destId="{3FD38DDF-DF88-4B13-841F-7C239A8C582F}" srcOrd="0" destOrd="0" presId="urn:microsoft.com/office/officeart/2005/8/layout/hProcess4"/>
-    <dgm:cxn modelId="{C419C141-0DA2-4652-B644-626B5ADDE819}" srcId="{07ACBF5B-41EE-45BC-9F26-0C59BEB8E720}" destId="{DAD88AB1-D040-48C3-9C8A-C5BD0814DF57}" srcOrd="1" destOrd="0" parTransId="{57F1F36D-4BCB-46EE-8070-28BF61EB7FA9}" sibTransId="{26EA948E-21DD-4D97-950B-3897246E1E8C}"/>
-    <dgm:cxn modelId="{2AD9506D-8678-4463-8BEE-674171AF029F}" type="presOf" srcId="{42409908-29D1-4CE0-96E0-2193869AD446}" destId="{9E995594-4D40-425B-B6C3-5192722DD04E}" srcOrd="0" destOrd="0" presId="urn:microsoft.com/office/officeart/2005/8/layout/hProcess4"/>
-    <dgm:cxn modelId="{4F925B48-E3E2-4575-A982-EA3C673A7878}" type="presOf" srcId="{76D81896-1C46-42DE-87D3-5A45E28CE80C}" destId="{E89BAE0A-F2AE-4D7B-85FE-6E7861DA1276}" srcOrd="0" destOrd="0" presId="urn:microsoft.com/office/officeart/2005/8/layout/hProcess4"/>
-    <dgm:cxn modelId="{369298E0-B03F-4393-ABCB-D96AE4B1CDC7}" srcId="{9BBFAAE6-258D-45BE-83EF-4CC1C1B53B48}" destId="{78FE7DA1-9E59-4351-A0C3-840B4CEC6B8B}" srcOrd="0" destOrd="0" parTransId="{ECF79735-E5EC-4733-BC81-A8A28CC7A6FF}" sibTransId="{42409908-29D1-4CE0-96E0-2193869AD446}"/>
-    <dgm:cxn modelId="{067FDA65-92B1-4E83-8827-9FC8FEBFB00E}" type="presOf" srcId="{76D81896-1C46-42DE-87D3-5A45E28CE80C}" destId="{DF91D674-87D8-43E1-B096-AF82EC896719}" srcOrd="1" destOrd="0" presId="urn:microsoft.com/office/officeart/2005/8/layout/hProcess4"/>
     <dgm:cxn modelId="{CFA2BAA9-22F0-4B27-82E2-782E822111FE}" type="presParOf" srcId="{C547005F-C70B-42E0-98DD-253002E640A0}" destId="{445500B0-F324-410D-9A19-38DE8615FAE0}" srcOrd="0" destOrd="0" presId="urn:microsoft.com/office/officeart/2005/8/layout/hProcess4"/>
     <dgm:cxn modelId="{CEDFB3DF-35B9-4F98-9D58-BD8D09C9C3AA}" type="presParOf" srcId="{C547005F-C70B-42E0-98DD-253002E640A0}" destId="{C222B8B3-271E-4191-9D8A-5E74AB504B1D}" srcOrd="1" destOrd="0" presId="urn:microsoft.com/office/officeart/2005/8/layout/hProcess4"/>
     <dgm:cxn modelId="{326AF4E5-006C-4A22-AD25-94CEC5828B60}" type="presParOf" srcId="{C547005F-C70B-42E0-98DD-253002E640A0}" destId="{FB7D34AD-BE76-4310-A51E-50FA1E8BF49B}" srcOrd="2" destOrd="0" presId="urn:microsoft.com/office/officeart/2005/8/layout/hProcess4"/>
@@ -3004,6 +3087,13 @@
         </dgm:presLayoutVars>
       </dgm:prSet>
       <dgm:spPr/>
+      <dgm:t>
+        <a:bodyPr/>
+        <a:lstStyle/>
+        <a:p>
+          <a:endParaRPr lang="en-US"/>
+        </a:p>
+      </dgm:t>
     </dgm:pt>
     <dgm:pt modelId="{59BEBBC8-2151-4B59-BA25-A8495CBB2170}" type="pres">
       <dgm:prSet presAssocID="{1A7B5DD4-8482-445B-8DEE-786314DD7AE5}" presName="node" presStyleLbl="node1" presStyleIdx="0" presStyleCnt="2">
@@ -3023,10 +3113,24 @@
     <dgm:pt modelId="{2640DD53-E18C-476B-8D00-62CF4361DCA0}" type="pres">
       <dgm:prSet presAssocID="{4CC63B35-E6E4-4BE7-B0DB-E1A2C0D1506D}" presName="sibTrans" presStyleLbl="sibTrans2D1" presStyleIdx="0" presStyleCnt="1"/>
       <dgm:spPr/>
+      <dgm:t>
+        <a:bodyPr/>
+        <a:lstStyle/>
+        <a:p>
+          <a:endParaRPr lang="en-US"/>
+        </a:p>
+      </dgm:t>
     </dgm:pt>
     <dgm:pt modelId="{FC92ACD2-DF3E-4B31-A225-935F55BF57F4}" type="pres">
       <dgm:prSet presAssocID="{4CC63B35-E6E4-4BE7-B0DB-E1A2C0D1506D}" presName="connectorText" presStyleLbl="sibTrans2D1" presStyleIdx="0" presStyleCnt="1"/>
       <dgm:spPr/>
+      <dgm:t>
+        <a:bodyPr/>
+        <a:lstStyle/>
+        <a:p>
+          <a:endParaRPr lang="en-US"/>
+        </a:p>
+      </dgm:t>
     </dgm:pt>
     <dgm:pt modelId="{1EE0288E-7DEE-4029-9523-5BB6B52E5940}" type="pres">
       <dgm:prSet presAssocID="{2B060916-2C74-4F54-B694-C5408B72CFD0}" presName="node" presStyleLbl="node1" presStyleIdx="1" presStyleCnt="2">
@@ -3045,13 +3149,13 @@
     </dgm:pt>
   </dgm:ptLst>
   <dgm:cxnLst>
+    <dgm:cxn modelId="{4E78C071-00DE-4084-BF74-03C90D20542F}" type="presOf" srcId="{4CC63B35-E6E4-4BE7-B0DB-E1A2C0D1506D}" destId="{FC92ACD2-DF3E-4B31-A225-935F55BF57F4}" srcOrd="1" destOrd="0" presId="urn:microsoft.com/office/officeart/2005/8/layout/process5"/>
+    <dgm:cxn modelId="{A0322CD6-DDB0-431D-BE5E-F0B3F0A1DC46}" type="presOf" srcId="{1A7B5DD4-8482-445B-8DEE-786314DD7AE5}" destId="{59BEBBC8-2151-4B59-BA25-A8495CBB2170}" srcOrd="0" destOrd="0" presId="urn:microsoft.com/office/officeart/2005/8/layout/process5"/>
+    <dgm:cxn modelId="{82DB7744-CDB6-45DE-A89C-AD6E919BFE1D}" type="presOf" srcId="{4CC63B35-E6E4-4BE7-B0DB-E1A2C0D1506D}" destId="{2640DD53-E18C-476B-8D00-62CF4361DCA0}" srcOrd="0" destOrd="0" presId="urn:microsoft.com/office/officeart/2005/8/layout/process5"/>
+    <dgm:cxn modelId="{677F8D9D-FD39-41BF-AB29-FDEBC372200A}" type="presOf" srcId="{2B060916-2C74-4F54-B694-C5408B72CFD0}" destId="{1EE0288E-7DEE-4029-9523-5BB6B52E5940}" srcOrd="0" destOrd="0" presId="urn:microsoft.com/office/officeart/2005/8/layout/process5"/>
     <dgm:cxn modelId="{96BB573A-D4CB-4488-8261-B9DC7B01A84F}" srcId="{1B7011AC-E756-440E-81AC-4DF9E16F9C52}" destId="{1A7B5DD4-8482-445B-8DEE-786314DD7AE5}" srcOrd="0" destOrd="0" parTransId="{7B412554-7DAD-48A8-8C12-D55AAD805B43}" sibTransId="{4CC63B35-E6E4-4BE7-B0DB-E1A2C0D1506D}"/>
     <dgm:cxn modelId="{3A37A281-A04C-4AF6-99F8-2FC117308EC3}" type="presOf" srcId="{1B7011AC-E756-440E-81AC-4DF9E16F9C52}" destId="{576A4653-B346-46C5-8C35-024745C9D83A}" srcOrd="0" destOrd="0" presId="urn:microsoft.com/office/officeart/2005/8/layout/process5"/>
-    <dgm:cxn modelId="{A0322CD6-DDB0-431D-BE5E-F0B3F0A1DC46}" type="presOf" srcId="{1A7B5DD4-8482-445B-8DEE-786314DD7AE5}" destId="{59BEBBC8-2151-4B59-BA25-A8495CBB2170}" srcOrd="0" destOrd="0" presId="urn:microsoft.com/office/officeart/2005/8/layout/process5"/>
-    <dgm:cxn modelId="{4E78C071-00DE-4084-BF74-03C90D20542F}" type="presOf" srcId="{4CC63B35-E6E4-4BE7-B0DB-E1A2C0D1506D}" destId="{FC92ACD2-DF3E-4B31-A225-935F55BF57F4}" srcOrd="1" destOrd="0" presId="urn:microsoft.com/office/officeart/2005/8/layout/process5"/>
     <dgm:cxn modelId="{D1EB4DBC-1D74-40FF-80FE-FE5C064FB0F2}" srcId="{1B7011AC-E756-440E-81AC-4DF9E16F9C52}" destId="{2B060916-2C74-4F54-B694-C5408B72CFD0}" srcOrd="1" destOrd="0" parTransId="{2B71E673-0AAA-4D41-9DF4-EEBB83AB31AB}" sibTransId="{9225931A-FC25-4F69-9597-716CFBEE9932}"/>
-    <dgm:cxn modelId="{82DB7744-CDB6-45DE-A89C-AD6E919BFE1D}" type="presOf" srcId="{4CC63B35-E6E4-4BE7-B0DB-E1A2C0D1506D}" destId="{2640DD53-E18C-476B-8D00-62CF4361DCA0}" srcOrd="0" destOrd="0" presId="urn:microsoft.com/office/officeart/2005/8/layout/process5"/>
-    <dgm:cxn modelId="{677F8D9D-FD39-41BF-AB29-FDEBC372200A}" type="presOf" srcId="{2B060916-2C74-4F54-B694-C5408B72CFD0}" destId="{1EE0288E-7DEE-4029-9523-5BB6B52E5940}" srcOrd="0" destOrd="0" presId="urn:microsoft.com/office/officeart/2005/8/layout/process5"/>
     <dgm:cxn modelId="{237F7912-A85E-4092-8C06-C748BB64B7D8}" type="presParOf" srcId="{576A4653-B346-46C5-8C35-024745C9D83A}" destId="{59BEBBC8-2151-4B59-BA25-A8495CBB2170}" srcOrd="0" destOrd="0" presId="urn:microsoft.com/office/officeart/2005/8/layout/process5"/>
     <dgm:cxn modelId="{55D2AA25-67F7-4A2F-9E23-F9992CF7EC7A}" type="presParOf" srcId="{576A4653-B346-46C5-8C35-024745C9D83A}" destId="{2640DD53-E18C-476B-8D00-62CF4361DCA0}" srcOrd="1" destOrd="0" presId="urn:microsoft.com/office/officeart/2005/8/layout/process5"/>
     <dgm:cxn modelId="{E4892C76-C02E-4618-931C-EF64137CABDA}" type="presParOf" srcId="{2640DD53-E18C-476B-8D00-62CF4361DCA0}" destId="{FC92ACD2-DF3E-4B31-A225-935F55BF57F4}" srcOrd="0" destOrd="0" presId="urn:microsoft.com/office/officeart/2005/8/layout/process5"/>
@@ -3169,6 +3273,13 @@
         </dgm:presLayoutVars>
       </dgm:prSet>
       <dgm:spPr/>
+      <dgm:t>
+        <a:bodyPr/>
+        <a:lstStyle/>
+        <a:p>
+          <a:endParaRPr lang="en-US"/>
+        </a:p>
+      </dgm:t>
     </dgm:pt>
     <dgm:pt modelId="{59BEBBC8-2151-4B59-BA25-A8495CBB2170}" type="pres">
       <dgm:prSet presAssocID="{1A7B5DD4-8482-445B-8DEE-786314DD7AE5}" presName="node" presStyleLbl="node1" presStyleIdx="0" presStyleCnt="2">
@@ -3188,10 +3299,24 @@
     <dgm:pt modelId="{2640DD53-E18C-476B-8D00-62CF4361DCA0}" type="pres">
       <dgm:prSet presAssocID="{4CC63B35-E6E4-4BE7-B0DB-E1A2C0D1506D}" presName="sibTrans" presStyleLbl="sibTrans2D1" presStyleIdx="0" presStyleCnt="1"/>
       <dgm:spPr/>
+      <dgm:t>
+        <a:bodyPr/>
+        <a:lstStyle/>
+        <a:p>
+          <a:endParaRPr lang="en-US"/>
+        </a:p>
+      </dgm:t>
     </dgm:pt>
     <dgm:pt modelId="{FC92ACD2-DF3E-4B31-A225-935F55BF57F4}" type="pres">
       <dgm:prSet presAssocID="{4CC63B35-E6E4-4BE7-B0DB-E1A2C0D1506D}" presName="connectorText" presStyleLbl="sibTrans2D1" presStyleIdx="0" presStyleCnt="1"/>
       <dgm:spPr/>
+      <dgm:t>
+        <a:bodyPr/>
+        <a:lstStyle/>
+        <a:p>
+          <a:endParaRPr lang="en-US"/>
+        </a:p>
+      </dgm:t>
     </dgm:pt>
     <dgm:pt modelId="{1EE0288E-7DEE-4029-9523-5BB6B52E5940}" type="pres">
       <dgm:prSet presAssocID="{2B060916-2C74-4F54-B694-C5408B72CFD0}" presName="node" presStyleLbl="node1" presStyleIdx="1" presStyleCnt="2">
@@ -8429,7 +8554,7 @@
           <a:p>
             <a:fld id="{54A0D01E-5226-49DB-B876-7FE474C4AC43}" type="datetimeFigureOut">
               <a:rPr lang="en-US" smtClean="0"/>
-              <a:t>2/6/2017</a:t>
+              <a:t>2/7/2017</a:t>
             </a:fld>
             <a:endParaRPr lang="en-US"/>
           </a:p>
@@ -8762,7 +8887,7 @@
           <a:p>
             <a:fld id="{7C0BD9AE-DE82-43C1-BCA1-CA1D65514D9A}" type="slidenum">
               <a:rPr lang="en-US" smtClean="0"/>
-              <a:t>7</a:t>
+              <a:t>8</a:t>
             </a:fld>
             <a:endParaRPr lang="en-US"/>
           </a:p>
@@ -8912,7 +9037,7 @@
           <a:p>
             <a:fld id="{98558AF6-4215-4AC6-9EE0-A56FB7B1541C}" type="datetimeFigureOut">
               <a:rPr lang="en-US" smtClean="0"/>
-              <a:t>2/6/2017</a:t>
+              <a:t>2/7/2017</a:t>
             </a:fld>
             <a:endParaRPr lang="en-US"/>
           </a:p>
@@ -9082,7 +9207,7 @@
           <a:p>
             <a:fld id="{98558AF6-4215-4AC6-9EE0-A56FB7B1541C}" type="datetimeFigureOut">
               <a:rPr lang="en-US" smtClean="0"/>
-              <a:t>2/6/2017</a:t>
+              <a:t>2/7/2017</a:t>
             </a:fld>
             <a:endParaRPr lang="en-US"/>
           </a:p>
@@ -9262,7 +9387,7 @@
           <a:p>
             <a:fld id="{98558AF6-4215-4AC6-9EE0-A56FB7B1541C}" type="datetimeFigureOut">
               <a:rPr lang="en-US" smtClean="0"/>
-              <a:t>2/6/2017</a:t>
+              <a:t>2/7/2017</a:t>
             </a:fld>
             <a:endParaRPr lang="en-US"/>
           </a:p>
@@ -9432,7 +9557,7 @@
           <a:p>
             <a:fld id="{98558AF6-4215-4AC6-9EE0-A56FB7B1541C}" type="datetimeFigureOut">
               <a:rPr lang="en-US" smtClean="0"/>
-              <a:t>2/6/2017</a:t>
+              <a:t>2/7/2017</a:t>
             </a:fld>
             <a:endParaRPr lang="en-US"/>
           </a:p>
@@ -9676,7 +9801,7 @@
           <a:p>
             <a:fld id="{98558AF6-4215-4AC6-9EE0-A56FB7B1541C}" type="datetimeFigureOut">
               <a:rPr lang="en-US" smtClean="0"/>
-              <a:t>2/6/2017</a:t>
+              <a:t>2/7/2017</a:t>
             </a:fld>
             <a:endParaRPr lang="en-US"/>
           </a:p>
@@ -9908,7 +10033,7 @@
           <a:p>
             <a:fld id="{98558AF6-4215-4AC6-9EE0-A56FB7B1541C}" type="datetimeFigureOut">
               <a:rPr lang="en-US" smtClean="0"/>
-              <a:t>2/6/2017</a:t>
+              <a:t>2/7/2017</a:t>
             </a:fld>
             <a:endParaRPr lang="en-US"/>
           </a:p>
@@ -10275,7 +10400,7 @@
           <a:p>
             <a:fld id="{98558AF6-4215-4AC6-9EE0-A56FB7B1541C}" type="datetimeFigureOut">
               <a:rPr lang="en-US" smtClean="0"/>
-              <a:t>2/6/2017</a:t>
+              <a:t>2/7/2017</a:t>
             </a:fld>
             <a:endParaRPr lang="en-US"/>
           </a:p>
@@ -10393,7 +10518,7 @@
           <a:p>
             <a:fld id="{98558AF6-4215-4AC6-9EE0-A56FB7B1541C}" type="datetimeFigureOut">
               <a:rPr lang="en-US" smtClean="0"/>
-              <a:t>2/6/2017</a:t>
+              <a:t>2/7/2017</a:t>
             </a:fld>
             <a:endParaRPr lang="en-US"/>
           </a:p>
@@ -10488,7 +10613,7 @@
           <a:p>
             <a:fld id="{98558AF6-4215-4AC6-9EE0-A56FB7B1541C}" type="datetimeFigureOut">
               <a:rPr lang="en-US" smtClean="0"/>
-              <a:t>2/6/2017</a:t>
+              <a:t>2/7/2017</a:t>
             </a:fld>
             <a:endParaRPr lang="en-US"/>
           </a:p>
@@ -10765,7 +10890,7 @@
           <a:p>
             <a:fld id="{98558AF6-4215-4AC6-9EE0-A56FB7B1541C}" type="datetimeFigureOut">
               <a:rPr lang="en-US" smtClean="0"/>
-              <a:t>2/6/2017</a:t>
+              <a:t>2/7/2017</a:t>
             </a:fld>
             <a:endParaRPr lang="en-US"/>
           </a:p>
@@ -11022,7 +11147,7 @@
           <a:p>
             <a:fld id="{98558AF6-4215-4AC6-9EE0-A56FB7B1541C}" type="datetimeFigureOut">
               <a:rPr lang="en-US" smtClean="0"/>
-              <a:t>2/6/2017</a:t>
+              <a:t>2/7/2017</a:t>
             </a:fld>
             <a:endParaRPr lang="en-US"/>
           </a:p>
@@ -11235,7 +11360,7 @@
           <a:p>
             <a:fld id="{98558AF6-4215-4AC6-9EE0-A56FB7B1541C}" type="datetimeFigureOut">
               <a:rPr lang="en-US" smtClean="0"/>
-              <a:t>2/6/2017</a:t>
+              <a:t>2/7/2017</a:t>
             </a:fld>
             <a:endParaRPr lang="en-US"/>
           </a:p>
@@ -11672,15 +11797,7 @@
           <a:p>
             <a:r>
               <a:rPr lang="en-US" dirty="0" smtClean="0"/>
-              <a:t>01. Introduction, Review of </a:t>
-            </a:r>
-            <a:r>
-              <a:rPr lang="en-US" dirty="0" smtClean="0"/>
-              <a:t>DAA </a:t>
-            </a:r>
-            <a:r>
-              <a:rPr lang="en-US" dirty="0" smtClean="0"/>
-              <a:t>1</a:t>
+              <a:t>01. Introduction, Review of DAA 1</a:t>
             </a:r>
             <a:endParaRPr lang="en-US" dirty="0"/>
           </a:p>
@@ -11707,11 +11824,7 @@
             </a:r>
             <a:r>
               <a:rPr lang="en-US" smtClean="0"/>
-              <a:t>of </a:t>
-            </a:r>
-            <a:r>
-              <a:rPr lang="en-US" smtClean="0"/>
-              <a:t>Algorithm (DAA) </a:t>
+              <a:t>of Algorithm (DAA) </a:t>
             </a:r>
             <a:r>
               <a:rPr lang="en-US" dirty="0" smtClean="0"/>
@@ -11809,11 +11922,7 @@
           <a:p>
             <a:r>
               <a:rPr lang="en-US" dirty="0" smtClean="0"/>
-              <a:t>Pseudocode </a:t>
-            </a:r>
-            <a:r>
-              <a:rPr lang="en-US" dirty="0" smtClean="0"/>
-              <a:t>convention</a:t>
+              <a:t>Pseudocode convention</a:t>
             </a:r>
           </a:p>
           <a:p>
@@ -11827,7 +11936,6 @@
               <a:rPr lang="en-US" dirty="0" smtClean="0"/>
               <a:t>Asymptotic Notation</a:t>
             </a:r>
-            <a:endParaRPr lang="en-US" dirty="0" smtClean="0"/>
           </a:p>
           <a:p>
             <a:endParaRPr lang="en-US" dirty="0"/>
@@ -12230,7 +12338,7 @@
           <a:graphicData uri="http://schemas.openxmlformats.org/presentationml/2006/ole">
             <mc:AlternateContent xmlns:mc="http://schemas.openxmlformats.org/markup-compatibility/2006">
               <mc:Choice xmlns:v="urn:schemas-microsoft-com:vml" Requires="v">
-                <p:oleObj spid="_x0000_s3353" name="Equation" r:id="rId3" imgW="1346040" imgH="253800" progId="Equation.DSMT4">
+                <p:oleObj spid="_x0000_s3428" name="Equation" r:id="rId3" imgW="1346040" imgH="253800" progId="Equation.DSMT4">
                   <p:embed/>
                 </p:oleObj>
               </mc:Choice>
@@ -12287,7 +12395,7 @@
           <a:graphicData uri="http://schemas.openxmlformats.org/presentationml/2006/ole">
             <mc:AlternateContent xmlns:mc="http://schemas.openxmlformats.org/markup-compatibility/2006">
               <mc:Choice xmlns:v="urn:schemas-microsoft-com:vml" Requires="v">
-                <p:oleObj spid="_x0000_s3354" name="Equation" r:id="rId5" imgW="1549080" imgH="1523880" progId="Equation.DSMT4">
+                <p:oleObj spid="_x0000_s3429" name="Equation" r:id="rId5" imgW="1549080" imgH="1523880" progId="Equation.DSMT4">
                   <p:embed/>
                 </p:oleObj>
               </mc:Choice>
@@ -12344,7 +12452,7 @@
           <a:graphicData uri="http://schemas.openxmlformats.org/presentationml/2006/ole">
             <mc:AlternateContent xmlns:mc="http://schemas.openxmlformats.org/markup-compatibility/2006">
               <mc:Choice xmlns:v="urn:schemas-microsoft-com:vml" Requires="v">
-                <p:oleObj spid="_x0000_s3355" name="Equation" r:id="rId7" imgW="2361960" imgH="253800" progId="Equation.DSMT4">
+                <p:oleObj spid="_x0000_s3430" name="Equation" r:id="rId7" imgW="2361960" imgH="253800" progId="Equation.DSMT4">
                   <p:embed/>
                 </p:oleObj>
               </mc:Choice>
@@ -12490,7 +12598,7 @@
           <a:graphicData uri="http://schemas.openxmlformats.org/presentationml/2006/ole">
             <mc:AlternateContent xmlns:mc="http://schemas.openxmlformats.org/markup-compatibility/2006">
               <mc:Choice xmlns:v="urn:schemas-microsoft-com:vml" Requires="v">
-                <p:oleObj spid="_x0000_s1136" name="Equation" r:id="rId4" imgW="1346040" imgH="253800" progId="Equation.DSMT4">
+                <p:oleObj spid="_x0000_s1161" name="Equation" r:id="rId4" imgW="1346040" imgH="253800" progId="Equation.DSMT4">
                   <p:embed/>
                 </p:oleObj>
               </mc:Choice>
@@ -12691,7 +12799,7 @@
           <a:graphicData uri="http://schemas.openxmlformats.org/presentationml/2006/ole">
             <mc:AlternateContent xmlns:mc="http://schemas.openxmlformats.org/markup-compatibility/2006">
               <mc:Choice xmlns:v="urn:schemas-microsoft-com:vml" Requires="v">
-                <p:oleObj spid="_x0000_s2256" name="Equation" r:id="rId3" imgW="1346040" imgH="1638000" progId="Equation.DSMT4">
+                <p:oleObj spid="_x0000_s2306" name="Equation" r:id="rId3" imgW="1346040" imgH="1638000" progId="Equation.DSMT4">
                   <p:embed/>
                 </p:oleObj>
               </mc:Choice>
@@ -12748,7 +12856,7 @@
           <a:graphicData uri="http://schemas.openxmlformats.org/presentationml/2006/ole">
             <mc:AlternateContent xmlns:mc="http://schemas.openxmlformats.org/markup-compatibility/2006">
               <mc:Choice xmlns:v="urn:schemas-microsoft-com:vml" Requires="v">
-                <p:oleObj spid="_x0000_s2257" name="Equation" r:id="rId5" imgW="1104840" imgH="482400" progId="Equation.DSMT4">
+                <p:oleObj spid="_x0000_s2307" name="Equation" r:id="rId5" imgW="1104840" imgH="482400" progId="Equation.DSMT4">
                   <p:embed/>
                 </p:oleObj>
               </mc:Choice>
@@ -12865,7 +12973,7 @@
           <a:graphicData uri="http://schemas.openxmlformats.org/presentationml/2006/ole">
             <mc:AlternateContent xmlns:mc="http://schemas.openxmlformats.org/markup-compatibility/2006">
               <mc:Choice xmlns:v="urn:schemas-microsoft-com:vml" Requires="v">
-                <p:oleObj spid="_x0000_s4329" name="Equation" r:id="rId3" imgW="4368600" imgH="533160" progId="Equation.DSMT4">
+                <p:oleObj spid="_x0000_s4404" name="Equation" r:id="rId3" imgW="4368600" imgH="533160" progId="Equation.DSMT4">
                   <p:embed/>
                 </p:oleObj>
               </mc:Choice>
@@ -12922,7 +13030,7 @@
           <a:graphicData uri="http://schemas.openxmlformats.org/presentationml/2006/ole">
             <mc:AlternateContent xmlns:mc="http://schemas.openxmlformats.org/markup-compatibility/2006">
               <mc:Choice xmlns:v="urn:schemas-microsoft-com:vml" Requires="v">
-                <p:oleObj spid="_x0000_s4330" name="Equation" r:id="rId5" imgW="4089240" imgH="533160" progId="Equation.DSMT4">
+                <p:oleObj spid="_x0000_s4405" name="Equation" r:id="rId5" imgW="4089240" imgH="533160" progId="Equation.DSMT4">
                   <p:embed/>
                 </p:oleObj>
               </mc:Choice>
@@ -12979,7 +13087,7 @@
           <a:graphicData uri="http://schemas.openxmlformats.org/presentationml/2006/ole">
             <mc:AlternateContent xmlns:mc="http://schemas.openxmlformats.org/markup-compatibility/2006">
               <mc:Choice xmlns:v="urn:schemas-microsoft-com:vml" Requires="v">
-                <p:oleObj spid="_x0000_s4331" name="Equation" r:id="rId7" imgW="4101840" imgH="533160" progId="Equation.DSMT4">
+                <p:oleObj spid="_x0000_s4406" name="Equation" r:id="rId7" imgW="4101840" imgH="533160" progId="Equation.DSMT4">
                   <p:embed/>
                 </p:oleObj>
               </mc:Choice>
@@ -13096,7 +13204,7 @@
           <a:graphicData uri="http://schemas.openxmlformats.org/presentationml/2006/ole">
             <mc:AlternateContent xmlns:mc="http://schemas.openxmlformats.org/markup-compatibility/2006">
               <mc:Choice xmlns:v="urn:schemas-microsoft-com:vml" Requires="v">
-                <p:oleObj spid="_x0000_s5274" name="Equation" r:id="rId3" imgW="4470120" imgH="1244520" progId="Equation.DSMT4">
+                <p:oleObj spid="_x0000_s5324" name="Equation" r:id="rId3" imgW="4470120" imgH="1244520" progId="Equation.DSMT4">
                   <p:embed/>
                 </p:oleObj>
               </mc:Choice>
@@ -13153,7 +13261,7 @@
           <a:graphicData uri="http://schemas.openxmlformats.org/presentationml/2006/ole">
             <mc:AlternateContent xmlns:mc="http://schemas.openxmlformats.org/markup-compatibility/2006">
               <mc:Choice xmlns:v="urn:schemas-microsoft-com:vml" Requires="v">
-                <p:oleObj spid="_x0000_s5275" name="Equation" r:id="rId5" imgW="4495680" imgH="1244520" progId="Equation.DSMT4">
+                <p:oleObj spid="_x0000_s5325" name="Equation" r:id="rId5" imgW="4495680" imgH="1244520" progId="Equation.DSMT4">
                   <p:embed/>
                 </p:oleObj>
               </mc:Choice>
@@ -13303,11 +13411,7 @@
           <a:p>
             <a:r>
               <a:rPr lang="en-US" dirty="0" smtClean="0"/>
-              <a:t>I encourage you to use </a:t>
-            </a:r>
-            <a:r>
-              <a:rPr lang="en-US" dirty="0" smtClean="0"/>
-              <a:t>English for </a:t>
+              <a:t>I encourage you to use English for </a:t>
             </a:r>
             <a:r>
               <a:rPr lang="en-US" b="1" dirty="0" smtClean="0">
@@ -14142,6 +14246,13 @@
   <p:clrMapOvr>
     <a:masterClrMapping/>
   </p:clrMapOvr>
+  <p:timing>
+    <p:tnLst>
+      <p:par>
+        <p:cTn id="1" dur="indefinite" restart="never" nodeType="tmRoot"/>
+      </p:par>
+    </p:tnLst>
+  </p:timing>
 </p:sld>
 </file>
 
@@ -14187,20 +14298,1393 @@
       </p:sp>
       <p:sp>
         <p:nvSpPr>
-          <p:cNvPr id="3" name="Content Placeholder 2"/>
-          <p:cNvSpPr>
-            <a:spLocks noGrp="1"/>
-          </p:cNvSpPr>
+          <p:cNvPr id="4" name="Rectangle 3"/>
+          <p:cNvSpPr/>
+          <p:nvPr/>
+        </p:nvSpPr>
+        <p:spPr>
+          <a:xfrm>
+            <a:off x="628649" y="1584814"/>
+            <a:ext cx="5129213" cy="3828227"/>
+          </a:xfrm>
+          <a:prstGeom prst="rect">
+            <a:avLst/>
+          </a:prstGeom>
+        </p:spPr>
+        <p:style>
+          <a:lnRef idx="2">
+            <a:schemeClr val="dk1"/>
+          </a:lnRef>
+          <a:fillRef idx="1">
+            <a:schemeClr val="lt1"/>
+          </a:fillRef>
+          <a:effectRef idx="0">
+            <a:schemeClr val="dk1"/>
+          </a:effectRef>
+          <a:fontRef idx="minor">
+            <a:schemeClr val="dk1"/>
+          </a:fontRef>
+        </p:style>
+        <p:txBody>
+          <a:bodyPr wrap="square">
+            <a:spAutoFit/>
+          </a:bodyPr>
+          <a:lstStyle/>
+          <a:p>
+            <a:pPr>
+              <a:lnSpc>
+                <a:spcPct val="107000"/>
+              </a:lnSpc>
+              <a:spcAft>
+                <a:spcPts val="800"/>
+              </a:spcAft>
+            </a:pPr>
+            <a:r>
+              <a:rPr lang="en-US" sz="2400" dirty="0">
+                <a:latin typeface="Calibri" panose="020F0502020204030204" pitchFamily="34" charset="0"/>
+                <a:ea typeface="Calibri" panose="020F0502020204030204" pitchFamily="34" charset="0"/>
+                <a:cs typeface="Times New Roman" panose="02020603050405020304" pitchFamily="18" charset="0"/>
+              </a:rPr>
+              <a:t>Fibonacci(x)</a:t>
+            </a:r>
+          </a:p>
+          <a:p>
+            <a:pPr marL="342900" lvl="0" indent="-342900">
+              <a:lnSpc>
+                <a:spcPct val="107000"/>
+              </a:lnSpc>
+              <a:spcAft>
+                <a:spcPts val="0"/>
+              </a:spcAft>
+              <a:buFont typeface="+mj-lt"/>
+              <a:buAutoNum type="arabicPeriod"/>
+            </a:pPr>
+            <a:r>
+              <a:rPr lang="en-US" sz="2400" dirty="0" err="1">
+                <a:latin typeface="Calibri" panose="020F0502020204030204" pitchFamily="34" charset="0"/>
+                <a:ea typeface="Calibri" panose="020F0502020204030204" pitchFamily="34" charset="0"/>
+                <a:cs typeface="Times New Roman" panose="02020603050405020304" pitchFamily="18" charset="0"/>
+              </a:rPr>
+              <a:t>Arr</a:t>
+            </a:r>
+            <a:r>
+              <a:rPr lang="en-US" sz="2400" dirty="0">
+                <a:latin typeface="Calibri" panose="020F0502020204030204" pitchFamily="34" charset="0"/>
+                <a:ea typeface="Calibri" panose="020F0502020204030204" pitchFamily="34" charset="0"/>
+                <a:cs typeface="Times New Roman" panose="02020603050405020304" pitchFamily="18" charset="0"/>
+              </a:rPr>
+              <a:t> [x+1]</a:t>
+            </a:r>
+          </a:p>
+          <a:p>
+            <a:pPr marL="342900" lvl="0" indent="-342900">
+              <a:lnSpc>
+                <a:spcPct val="107000"/>
+              </a:lnSpc>
+              <a:spcAft>
+                <a:spcPts val="0"/>
+              </a:spcAft>
+              <a:buFont typeface="+mj-lt"/>
+              <a:buAutoNum type="arabicPeriod"/>
+            </a:pPr>
+            <a:r>
+              <a:rPr lang="en-US" sz="2400" dirty="0" err="1">
+                <a:latin typeface="Calibri" panose="020F0502020204030204" pitchFamily="34" charset="0"/>
+                <a:ea typeface="Calibri" panose="020F0502020204030204" pitchFamily="34" charset="0"/>
+                <a:cs typeface="Times New Roman" panose="02020603050405020304" pitchFamily="18" charset="0"/>
+              </a:rPr>
+              <a:t>Arr</a:t>
+            </a:r>
+            <a:r>
+              <a:rPr lang="en-US" sz="2400" dirty="0">
+                <a:latin typeface="Calibri" panose="020F0502020204030204" pitchFamily="34" charset="0"/>
+                <a:ea typeface="Calibri" panose="020F0502020204030204" pitchFamily="34" charset="0"/>
+                <a:cs typeface="Times New Roman" panose="02020603050405020304" pitchFamily="18" charset="0"/>
+              </a:rPr>
+              <a:t> [0] = 0</a:t>
+            </a:r>
+          </a:p>
+          <a:p>
+            <a:pPr marL="342900" lvl="0" indent="-342900">
+              <a:lnSpc>
+                <a:spcPct val="107000"/>
+              </a:lnSpc>
+              <a:spcAft>
+                <a:spcPts val="0"/>
+              </a:spcAft>
+              <a:buFont typeface="+mj-lt"/>
+              <a:buAutoNum type="arabicPeriod"/>
+            </a:pPr>
+            <a:r>
+              <a:rPr lang="en-US" sz="2400" b="1" dirty="0">
+                <a:latin typeface="Calibri" panose="020F0502020204030204" pitchFamily="34" charset="0"/>
+                <a:ea typeface="Calibri" panose="020F0502020204030204" pitchFamily="34" charset="0"/>
+                <a:cs typeface="Times New Roman" panose="02020603050405020304" pitchFamily="18" charset="0"/>
+              </a:rPr>
+              <a:t>for</a:t>
+            </a:r>
+            <a:r>
+              <a:rPr lang="en-US" sz="2400" dirty="0">
+                <a:latin typeface="Calibri" panose="020F0502020204030204" pitchFamily="34" charset="0"/>
+                <a:ea typeface="Calibri" panose="020F0502020204030204" pitchFamily="34" charset="0"/>
+                <a:cs typeface="Times New Roman" panose="02020603050405020304" pitchFamily="18" charset="0"/>
+              </a:rPr>
+              <a:t> </a:t>
+            </a:r>
+            <a:r>
+              <a:rPr lang="en-US" sz="2400" dirty="0" err="1">
+                <a:latin typeface="Calibri" panose="020F0502020204030204" pitchFamily="34" charset="0"/>
+                <a:ea typeface="Calibri" panose="020F0502020204030204" pitchFamily="34" charset="0"/>
+                <a:cs typeface="Times New Roman" panose="02020603050405020304" pitchFamily="18" charset="0"/>
+              </a:rPr>
+              <a:t>i</a:t>
+            </a:r>
+            <a:r>
+              <a:rPr lang="en-US" sz="2400" dirty="0">
+                <a:latin typeface="Calibri" panose="020F0502020204030204" pitchFamily="34" charset="0"/>
+                <a:ea typeface="Calibri" panose="020F0502020204030204" pitchFamily="34" charset="0"/>
+                <a:cs typeface="Times New Roman" panose="02020603050405020304" pitchFamily="18" charset="0"/>
+              </a:rPr>
+              <a:t> = 1 </a:t>
+            </a:r>
+            <a:r>
+              <a:rPr lang="en-US" sz="2400" b="1" dirty="0">
+                <a:latin typeface="Calibri" panose="020F0502020204030204" pitchFamily="34" charset="0"/>
+                <a:ea typeface="Calibri" panose="020F0502020204030204" pitchFamily="34" charset="0"/>
+                <a:cs typeface="Times New Roman" panose="02020603050405020304" pitchFamily="18" charset="0"/>
+              </a:rPr>
+              <a:t>to</a:t>
+            </a:r>
+            <a:r>
+              <a:rPr lang="en-US" sz="2400" dirty="0">
+                <a:latin typeface="Calibri" panose="020F0502020204030204" pitchFamily="34" charset="0"/>
+                <a:ea typeface="Calibri" panose="020F0502020204030204" pitchFamily="34" charset="0"/>
+                <a:cs typeface="Times New Roman" panose="02020603050405020304" pitchFamily="18" charset="0"/>
+              </a:rPr>
+              <a:t> x</a:t>
+            </a:r>
+          </a:p>
+          <a:p>
+            <a:pPr marL="342900" lvl="0" indent="-342900">
+              <a:lnSpc>
+                <a:spcPct val="107000"/>
+              </a:lnSpc>
+              <a:spcAft>
+                <a:spcPts val="0"/>
+              </a:spcAft>
+              <a:buFont typeface="+mj-lt"/>
+              <a:buAutoNum type="arabicPeriod"/>
+            </a:pPr>
+            <a:r>
+              <a:rPr lang="en-US" sz="2400" dirty="0">
+                <a:latin typeface="Calibri" panose="020F0502020204030204" pitchFamily="34" charset="0"/>
+                <a:ea typeface="Calibri" panose="020F0502020204030204" pitchFamily="34" charset="0"/>
+                <a:cs typeface="Times New Roman" panose="02020603050405020304" pitchFamily="18" charset="0"/>
+              </a:rPr>
+              <a:t>	</a:t>
+            </a:r>
+            <a:r>
+              <a:rPr lang="en-US" sz="2400" b="1" dirty="0">
+                <a:latin typeface="Calibri" panose="020F0502020204030204" pitchFamily="34" charset="0"/>
+                <a:ea typeface="Calibri" panose="020F0502020204030204" pitchFamily="34" charset="0"/>
+                <a:cs typeface="Times New Roman" panose="02020603050405020304" pitchFamily="18" charset="0"/>
+              </a:rPr>
+              <a:t>if</a:t>
+            </a:r>
+            <a:r>
+              <a:rPr lang="en-US" sz="2400" dirty="0">
+                <a:latin typeface="Calibri" panose="020F0502020204030204" pitchFamily="34" charset="0"/>
+                <a:ea typeface="Calibri" panose="020F0502020204030204" pitchFamily="34" charset="0"/>
+                <a:cs typeface="Times New Roman" panose="02020603050405020304" pitchFamily="18" charset="0"/>
+              </a:rPr>
+              <a:t> </a:t>
+            </a:r>
+            <a:r>
+              <a:rPr lang="en-US" sz="2400" dirty="0" err="1">
+                <a:latin typeface="Calibri" panose="020F0502020204030204" pitchFamily="34" charset="0"/>
+                <a:ea typeface="Calibri" panose="020F0502020204030204" pitchFamily="34" charset="0"/>
+                <a:cs typeface="Times New Roman" panose="02020603050405020304" pitchFamily="18" charset="0"/>
+              </a:rPr>
+              <a:t>i</a:t>
+            </a:r>
+            <a:r>
+              <a:rPr lang="en-US" sz="2400" dirty="0">
+                <a:latin typeface="Calibri" panose="020F0502020204030204" pitchFamily="34" charset="0"/>
+                <a:ea typeface="Calibri" panose="020F0502020204030204" pitchFamily="34" charset="0"/>
+                <a:cs typeface="Times New Roman" panose="02020603050405020304" pitchFamily="18" charset="0"/>
+              </a:rPr>
+              <a:t> ≤ 2</a:t>
+            </a:r>
+          </a:p>
+          <a:p>
+            <a:pPr marL="342900" lvl="0" indent="-342900">
+              <a:lnSpc>
+                <a:spcPct val="107000"/>
+              </a:lnSpc>
+              <a:spcAft>
+                <a:spcPts val="0"/>
+              </a:spcAft>
+              <a:buFont typeface="+mj-lt"/>
+              <a:buAutoNum type="arabicPeriod"/>
+            </a:pPr>
+            <a:r>
+              <a:rPr lang="en-US" sz="2400" dirty="0">
+                <a:latin typeface="Calibri" panose="020F0502020204030204" pitchFamily="34" charset="0"/>
+                <a:ea typeface="Calibri" panose="020F0502020204030204" pitchFamily="34" charset="0"/>
+                <a:cs typeface="Times New Roman" panose="02020603050405020304" pitchFamily="18" charset="0"/>
+              </a:rPr>
+              <a:t>		</a:t>
+            </a:r>
+            <a:r>
+              <a:rPr lang="en-US" sz="2400" dirty="0" err="1">
+                <a:latin typeface="Calibri" panose="020F0502020204030204" pitchFamily="34" charset="0"/>
+                <a:ea typeface="Calibri" panose="020F0502020204030204" pitchFamily="34" charset="0"/>
+                <a:cs typeface="Times New Roman" panose="02020603050405020304" pitchFamily="18" charset="0"/>
+              </a:rPr>
+              <a:t>Arr</a:t>
+            </a:r>
+            <a:r>
+              <a:rPr lang="en-US" sz="2400" dirty="0">
+                <a:latin typeface="Calibri" panose="020F0502020204030204" pitchFamily="34" charset="0"/>
+                <a:ea typeface="Calibri" panose="020F0502020204030204" pitchFamily="34" charset="0"/>
+                <a:cs typeface="Times New Roman" panose="02020603050405020304" pitchFamily="18" charset="0"/>
+              </a:rPr>
+              <a:t>[</a:t>
+            </a:r>
+            <a:r>
+              <a:rPr lang="en-US" sz="2400" dirty="0" err="1">
+                <a:latin typeface="Calibri" panose="020F0502020204030204" pitchFamily="34" charset="0"/>
+                <a:ea typeface="Calibri" panose="020F0502020204030204" pitchFamily="34" charset="0"/>
+                <a:cs typeface="Times New Roman" panose="02020603050405020304" pitchFamily="18" charset="0"/>
+              </a:rPr>
+              <a:t>i</a:t>
+            </a:r>
+            <a:r>
+              <a:rPr lang="en-US" sz="2400" dirty="0">
+                <a:latin typeface="Calibri" panose="020F0502020204030204" pitchFamily="34" charset="0"/>
+                <a:ea typeface="Calibri" panose="020F0502020204030204" pitchFamily="34" charset="0"/>
+                <a:cs typeface="Times New Roman" panose="02020603050405020304" pitchFamily="18" charset="0"/>
+              </a:rPr>
+              <a:t>] = 1</a:t>
+            </a:r>
+          </a:p>
+          <a:p>
+            <a:pPr marL="342900" lvl="0" indent="-342900">
+              <a:lnSpc>
+                <a:spcPct val="107000"/>
+              </a:lnSpc>
+              <a:spcAft>
+                <a:spcPts val="0"/>
+              </a:spcAft>
+              <a:buFont typeface="+mj-lt"/>
+              <a:buAutoNum type="arabicPeriod"/>
+            </a:pPr>
+            <a:r>
+              <a:rPr lang="en-US" sz="2400" dirty="0">
+                <a:latin typeface="Calibri" panose="020F0502020204030204" pitchFamily="34" charset="0"/>
+                <a:ea typeface="Calibri" panose="020F0502020204030204" pitchFamily="34" charset="0"/>
+                <a:cs typeface="Times New Roman" panose="02020603050405020304" pitchFamily="18" charset="0"/>
+              </a:rPr>
+              <a:t>	</a:t>
+            </a:r>
+            <a:r>
+              <a:rPr lang="en-US" sz="2400" b="1" dirty="0">
+                <a:latin typeface="Calibri" panose="020F0502020204030204" pitchFamily="34" charset="0"/>
+                <a:ea typeface="Calibri" panose="020F0502020204030204" pitchFamily="34" charset="0"/>
+                <a:cs typeface="Times New Roman" panose="02020603050405020304" pitchFamily="18" charset="0"/>
+              </a:rPr>
+              <a:t>else</a:t>
+            </a:r>
+            <a:endParaRPr lang="en-US" sz="2400" dirty="0">
+              <a:latin typeface="Calibri" panose="020F0502020204030204" pitchFamily="34" charset="0"/>
+              <a:ea typeface="Calibri" panose="020F0502020204030204" pitchFamily="34" charset="0"/>
+              <a:cs typeface="Times New Roman" panose="02020603050405020304" pitchFamily="18" charset="0"/>
+            </a:endParaRPr>
+          </a:p>
+          <a:p>
+            <a:pPr marL="342900" lvl="0" indent="-342900">
+              <a:lnSpc>
+                <a:spcPct val="107000"/>
+              </a:lnSpc>
+              <a:spcAft>
+                <a:spcPts val="800"/>
+              </a:spcAft>
+              <a:buFont typeface="+mj-lt"/>
+              <a:buAutoNum type="arabicPeriod"/>
+            </a:pPr>
+            <a:r>
+              <a:rPr lang="en-US" sz="2400" dirty="0">
+                <a:latin typeface="Calibri" panose="020F0502020204030204" pitchFamily="34" charset="0"/>
+                <a:ea typeface="Calibri" panose="020F0502020204030204" pitchFamily="34" charset="0"/>
+                <a:cs typeface="Times New Roman" panose="02020603050405020304" pitchFamily="18" charset="0"/>
+              </a:rPr>
+              <a:t>		</a:t>
+            </a:r>
+            <a:r>
+              <a:rPr lang="en-US" sz="2400" dirty="0" err="1">
+                <a:latin typeface="Calibri" panose="020F0502020204030204" pitchFamily="34" charset="0"/>
+                <a:ea typeface="Calibri" panose="020F0502020204030204" pitchFamily="34" charset="0"/>
+                <a:cs typeface="Times New Roman" panose="02020603050405020304" pitchFamily="18" charset="0"/>
+              </a:rPr>
+              <a:t>Arr</a:t>
+            </a:r>
+            <a:r>
+              <a:rPr lang="en-US" sz="2400" dirty="0">
+                <a:latin typeface="Calibri" panose="020F0502020204030204" pitchFamily="34" charset="0"/>
+                <a:ea typeface="Calibri" panose="020F0502020204030204" pitchFamily="34" charset="0"/>
+                <a:cs typeface="Times New Roman" panose="02020603050405020304" pitchFamily="18" charset="0"/>
+              </a:rPr>
+              <a:t>[</a:t>
+            </a:r>
+            <a:r>
+              <a:rPr lang="en-US" sz="2400" dirty="0" err="1">
+                <a:latin typeface="Calibri" panose="020F0502020204030204" pitchFamily="34" charset="0"/>
+                <a:ea typeface="Calibri" panose="020F0502020204030204" pitchFamily="34" charset="0"/>
+                <a:cs typeface="Times New Roman" panose="02020603050405020304" pitchFamily="18" charset="0"/>
+              </a:rPr>
+              <a:t>i</a:t>
+            </a:r>
+            <a:r>
+              <a:rPr lang="en-US" sz="2400" dirty="0">
+                <a:latin typeface="Calibri" panose="020F0502020204030204" pitchFamily="34" charset="0"/>
+                <a:ea typeface="Calibri" panose="020F0502020204030204" pitchFamily="34" charset="0"/>
+                <a:cs typeface="Times New Roman" panose="02020603050405020304" pitchFamily="18" charset="0"/>
+              </a:rPr>
+              <a:t>] = </a:t>
+            </a:r>
+            <a:r>
+              <a:rPr lang="en-US" sz="2400" dirty="0" err="1">
+                <a:latin typeface="Calibri" panose="020F0502020204030204" pitchFamily="34" charset="0"/>
+                <a:ea typeface="Calibri" panose="020F0502020204030204" pitchFamily="34" charset="0"/>
+                <a:cs typeface="Times New Roman" panose="02020603050405020304" pitchFamily="18" charset="0"/>
+              </a:rPr>
+              <a:t>Arr</a:t>
+            </a:r>
+            <a:r>
+              <a:rPr lang="en-US" sz="2400" dirty="0">
+                <a:latin typeface="Calibri" panose="020F0502020204030204" pitchFamily="34" charset="0"/>
+                <a:ea typeface="Calibri" panose="020F0502020204030204" pitchFamily="34" charset="0"/>
+                <a:cs typeface="Times New Roman" panose="02020603050405020304" pitchFamily="18" charset="0"/>
+              </a:rPr>
+              <a:t>[i-1] + </a:t>
+            </a:r>
+            <a:r>
+              <a:rPr lang="en-US" sz="2400" dirty="0" err="1">
+                <a:latin typeface="Calibri" panose="020F0502020204030204" pitchFamily="34" charset="0"/>
+                <a:ea typeface="Calibri" panose="020F0502020204030204" pitchFamily="34" charset="0"/>
+                <a:cs typeface="Times New Roman" panose="02020603050405020304" pitchFamily="18" charset="0"/>
+              </a:rPr>
+              <a:t>Arr</a:t>
+            </a:r>
+            <a:r>
+              <a:rPr lang="en-US" sz="2400" dirty="0">
+                <a:latin typeface="Calibri" panose="020F0502020204030204" pitchFamily="34" charset="0"/>
+                <a:ea typeface="Calibri" panose="020F0502020204030204" pitchFamily="34" charset="0"/>
+                <a:cs typeface="Times New Roman" panose="02020603050405020304" pitchFamily="18" charset="0"/>
+              </a:rPr>
+              <a:t>[i-2]</a:t>
+            </a:r>
+          </a:p>
+          <a:p>
+            <a:r>
+              <a:rPr lang="en-US" sz="2400" b="1" dirty="0">
+                <a:latin typeface="Calibri" panose="020F0502020204030204" pitchFamily="34" charset="0"/>
+                <a:ea typeface="Calibri" panose="020F0502020204030204" pitchFamily="34" charset="0"/>
+                <a:cs typeface="Times New Roman" panose="02020603050405020304" pitchFamily="18" charset="0"/>
+              </a:rPr>
+              <a:t>return</a:t>
+            </a:r>
+            <a:r>
+              <a:rPr lang="en-US" sz="2400" dirty="0">
+                <a:latin typeface="Calibri" panose="020F0502020204030204" pitchFamily="34" charset="0"/>
+                <a:ea typeface="Calibri" panose="020F0502020204030204" pitchFamily="34" charset="0"/>
+                <a:cs typeface="Times New Roman" panose="02020603050405020304" pitchFamily="18" charset="0"/>
+              </a:rPr>
+              <a:t> </a:t>
+            </a:r>
+            <a:r>
+              <a:rPr lang="en-US" sz="2400" dirty="0" err="1">
+                <a:latin typeface="Calibri" panose="020F0502020204030204" pitchFamily="34" charset="0"/>
+                <a:ea typeface="Calibri" panose="020F0502020204030204" pitchFamily="34" charset="0"/>
+                <a:cs typeface="Times New Roman" panose="02020603050405020304" pitchFamily="18" charset="0"/>
+              </a:rPr>
+              <a:t>Arr</a:t>
+            </a:r>
+            <a:r>
+              <a:rPr lang="en-US" sz="2400" dirty="0">
+                <a:latin typeface="Calibri" panose="020F0502020204030204" pitchFamily="34" charset="0"/>
+                <a:ea typeface="Calibri" panose="020F0502020204030204" pitchFamily="34" charset="0"/>
+                <a:cs typeface="Times New Roman" panose="02020603050405020304" pitchFamily="18" charset="0"/>
+              </a:rPr>
+              <a:t>[x]</a:t>
+            </a:r>
+            <a:endParaRPr lang="en-US" sz="2400" dirty="0"/>
+          </a:p>
+        </p:txBody>
+      </p:sp>
+      <p:graphicFrame>
+        <p:nvGraphicFramePr>
+          <p:cNvPr id="5" name="Table 4"/>
+          <p:cNvGraphicFramePr>
+            <a:graphicFrameLocks noGrp="1"/>
+          </p:cNvGraphicFramePr>
           <p:nvPr>
-            <p:ph idx="1"/>
+            <p:extLst>
+              <p:ext uri="{D42A27DB-BD31-4B8C-83A1-F6EECF244321}">
+                <p14:modId xmlns:p14="http://schemas.microsoft.com/office/powerpoint/2010/main" val="3157896338"/>
+              </p:ext>
+            </p:extLst>
           </p:nvPr>
+        </p:nvGraphicFramePr>
+        <p:xfrm>
+          <a:off x="628649" y="5572125"/>
+          <a:ext cx="7596512" cy="924242"/>
+        </p:xfrm>
+        <a:graphic>
+          <a:graphicData uri="http://schemas.openxmlformats.org/drawingml/2006/table">
+            <a:tbl>
+              <a:tblPr firstRow="1" bandRow="1">
+                <a:tableStyleId>{5C22544A-7EE6-4342-B048-85BDC9FD1C3A}</a:tableStyleId>
+              </a:tblPr>
+              <a:tblGrid>
+                <a:gridCol w="690592">
+                  <a:extLst>
+                    <a:ext uri="{9D8B030D-6E8A-4147-A177-3AD203B41FA5}">
+                      <a16:colId xmlns:a16="http://schemas.microsoft.com/office/drawing/2014/main" val="1875705097"/>
+                    </a:ext>
+                  </a:extLst>
+                </a:gridCol>
+                <a:gridCol w="690592">
+                  <a:extLst>
+                    <a:ext uri="{9D8B030D-6E8A-4147-A177-3AD203B41FA5}">
+                      <a16:colId xmlns:a16="http://schemas.microsoft.com/office/drawing/2014/main" val="3208193770"/>
+                    </a:ext>
+                  </a:extLst>
+                </a:gridCol>
+                <a:gridCol w="690592">
+                  <a:extLst>
+                    <a:ext uri="{9D8B030D-6E8A-4147-A177-3AD203B41FA5}">
+                      <a16:colId xmlns:a16="http://schemas.microsoft.com/office/drawing/2014/main" val="2310838700"/>
+                    </a:ext>
+                  </a:extLst>
+                </a:gridCol>
+                <a:gridCol w="690592">
+                  <a:extLst>
+                    <a:ext uri="{9D8B030D-6E8A-4147-A177-3AD203B41FA5}">
+                      <a16:colId xmlns:a16="http://schemas.microsoft.com/office/drawing/2014/main" val="2070127064"/>
+                    </a:ext>
+                  </a:extLst>
+                </a:gridCol>
+                <a:gridCol w="690592">
+                  <a:extLst>
+                    <a:ext uri="{9D8B030D-6E8A-4147-A177-3AD203B41FA5}">
+                      <a16:colId xmlns:a16="http://schemas.microsoft.com/office/drawing/2014/main" val="1078310810"/>
+                    </a:ext>
+                  </a:extLst>
+                </a:gridCol>
+                <a:gridCol w="690592">
+                  <a:extLst>
+                    <a:ext uri="{9D8B030D-6E8A-4147-A177-3AD203B41FA5}">
+                      <a16:colId xmlns:a16="http://schemas.microsoft.com/office/drawing/2014/main" val="692663062"/>
+                    </a:ext>
+                  </a:extLst>
+                </a:gridCol>
+                <a:gridCol w="690592">
+                  <a:extLst>
+                    <a:ext uri="{9D8B030D-6E8A-4147-A177-3AD203B41FA5}">
+                      <a16:colId xmlns:a16="http://schemas.microsoft.com/office/drawing/2014/main" val="239151626"/>
+                    </a:ext>
+                  </a:extLst>
+                </a:gridCol>
+                <a:gridCol w="690592">
+                  <a:extLst>
+                    <a:ext uri="{9D8B030D-6E8A-4147-A177-3AD203B41FA5}">
+                      <a16:colId xmlns:a16="http://schemas.microsoft.com/office/drawing/2014/main" val="4245446051"/>
+                    </a:ext>
+                  </a:extLst>
+                </a:gridCol>
+                <a:gridCol w="690592">
+                  <a:extLst>
+                    <a:ext uri="{9D8B030D-6E8A-4147-A177-3AD203B41FA5}">
+                      <a16:colId xmlns:a16="http://schemas.microsoft.com/office/drawing/2014/main" val="3390046654"/>
+                    </a:ext>
+                  </a:extLst>
+                </a:gridCol>
+                <a:gridCol w="690592">
+                  <a:extLst>
+                    <a:ext uri="{9D8B030D-6E8A-4147-A177-3AD203B41FA5}">
+                      <a16:colId xmlns:a16="http://schemas.microsoft.com/office/drawing/2014/main" val="180759772"/>
+                    </a:ext>
+                  </a:extLst>
+                </a:gridCol>
+                <a:gridCol w="690592">
+                  <a:extLst>
+                    <a:ext uri="{9D8B030D-6E8A-4147-A177-3AD203B41FA5}">
+                      <a16:colId xmlns:a16="http://schemas.microsoft.com/office/drawing/2014/main" val="919135017"/>
+                    </a:ext>
+                  </a:extLst>
+                </a:gridCol>
+              </a:tblGrid>
+              <a:tr h="462121">
+                <a:tc>
+                  <a:txBody>
+                    <a:bodyPr/>
+                    <a:lstStyle/>
+                    <a:p>
+                      <a:pPr algn="r"/>
+                      <a:r>
+                        <a:rPr lang="en-US" sz="2200" dirty="0" err="1" smtClean="0">
+                          <a:solidFill>
+                            <a:schemeClr val="tx1"/>
+                          </a:solidFill>
+                        </a:rPr>
+                        <a:t>Arr</a:t>
+                      </a:r>
+                      <a:r>
+                        <a:rPr lang="en-US" sz="2200" dirty="0" smtClean="0">
+                          <a:solidFill>
+                            <a:schemeClr val="tx1"/>
+                          </a:solidFill>
+                        </a:rPr>
+                        <a:t>:</a:t>
+                      </a:r>
+                      <a:endParaRPr lang="en-US" sz="2200" dirty="0">
+                        <a:solidFill>
+                          <a:schemeClr val="tx1"/>
+                        </a:solidFill>
+                      </a:endParaRPr>
+                    </a:p>
+                  </a:txBody>
+                  <a:tcPr marL="113948" marR="113948" marT="56974" marB="56974">
+                    <a:noFill/>
+                  </a:tcPr>
+                </a:tc>
+                <a:tc>
+                  <a:txBody>
+                    <a:bodyPr/>
+                    <a:lstStyle/>
+                    <a:p>
+                      <a:r>
+                        <a:rPr lang="en-US" sz="2200" dirty="0" smtClean="0">
+                          <a:solidFill>
+                            <a:schemeClr val="tx1"/>
+                          </a:solidFill>
+                        </a:rPr>
+                        <a:t>0</a:t>
+                      </a:r>
+                      <a:endParaRPr lang="en-US" sz="2200" dirty="0">
+                        <a:solidFill>
+                          <a:schemeClr val="tx1"/>
+                        </a:solidFill>
+                      </a:endParaRPr>
+                    </a:p>
+                  </a:txBody>
+                  <a:tcPr marL="113948" marR="113948" marT="56974" marB="56974">
+                    <a:solidFill>
+                      <a:schemeClr val="accent1">
+                        <a:lumMod val="40000"/>
+                        <a:lumOff val="60000"/>
+                      </a:schemeClr>
+                    </a:solidFill>
+                  </a:tcPr>
+                </a:tc>
+                <a:tc>
+                  <a:txBody>
+                    <a:bodyPr/>
+                    <a:lstStyle/>
+                    <a:p>
+                      <a:r>
+                        <a:rPr lang="en-US" sz="2200" dirty="0" smtClean="0">
+                          <a:solidFill>
+                            <a:schemeClr val="tx1"/>
+                          </a:solidFill>
+                        </a:rPr>
+                        <a:t>1</a:t>
+                      </a:r>
+                      <a:endParaRPr lang="en-US" sz="2200" dirty="0">
+                        <a:solidFill>
+                          <a:schemeClr val="tx1"/>
+                        </a:solidFill>
+                      </a:endParaRPr>
+                    </a:p>
+                  </a:txBody>
+                  <a:tcPr marL="113948" marR="113948" marT="56974" marB="56974">
+                    <a:solidFill>
+                      <a:schemeClr val="accent1">
+                        <a:lumMod val="40000"/>
+                        <a:lumOff val="60000"/>
+                      </a:schemeClr>
+                    </a:solidFill>
+                  </a:tcPr>
+                </a:tc>
+                <a:tc>
+                  <a:txBody>
+                    <a:bodyPr/>
+                    <a:lstStyle/>
+                    <a:p>
+                      <a:r>
+                        <a:rPr lang="en-US" sz="2200" dirty="0" smtClean="0">
+                          <a:solidFill>
+                            <a:schemeClr val="tx1"/>
+                          </a:solidFill>
+                        </a:rPr>
+                        <a:t>1</a:t>
+                      </a:r>
+                      <a:endParaRPr lang="en-US" sz="2200" dirty="0">
+                        <a:solidFill>
+                          <a:schemeClr val="tx1"/>
+                        </a:solidFill>
+                      </a:endParaRPr>
+                    </a:p>
+                  </a:txBody>
+                  <a:tcPr marL="113948" marR="113948" marT="56974" marB="56974">
+                    <a:solidFill>
+                      <a:schemeClr val="accent1">
+                        <a:lumMod val="40000"/>
+                        <a:lumOff val="60000"/>
+                      </a:schemeClr>
+                    </a:solidFill>
+                  </a:tcPr>
+                </a:tc>
+                <a:tc>
+                  <a:txBody>
+                    <a:bodyPr/>
+                    <a:lstStyle/>
+                    <a:p>
+                      <a:r>
+                        <a:rPr lang="en-US" sz="2200" dirty="0" smtClean="0">
+                          <a:solidFill>
+                            <a:schemeClr val="tx1"/>
+                          </a:solidFill>
+                        </a:rPr>
+                        <a:t>2</a:t>
+                      </a:r>
+                      <a:endParaRPr lang="en-US" sz="2200" dirty="0">
+                        <a:solidFill>
+                          <a:schemeClr val="tx1"/>
+                        </a:solidFill>
+                      </a:endParaRPr>
+                    </a:p>
+                  </a:txBody>
+                  <a:tcPr marL="113948" marR="113948" marT="56974" marB="56974">
+                    <a:solidFill>
+                      <a:schemeClr val="accent1">
+                        <a:lumMod val="40000"/>
+                        <a:lumOff val="60000"/>
+                      </a:schemeClr>
+                    </a:solidFill>
+                  </a:tcPr>
+                </a:tc>
+                <a:tc>
+                  <a:txBody>
+                    <a:bodyPr/>
+                    <a:lstStyle/>
+                    <a:p>
+                      <a:r>
+                        <a:rPr lang="en-US" sz="2200" dirty="0" smtClean="0">
+                          <a:solidFill>
+                            <a:schemeClr val="tx1"/>
+                          </a:solidFill>
+                        </a:rPr>
+                        <a:t>3</a:t>
+                      </a:r>
+                      <a:endParaRPr lang="en-US" sz="2200" dirty="0">
+                        <a:solidFill>
+                          <a:schemeClr val="tx1"/>
+                        </a:solidFill>
+                      </a:endParaRPr>
+                    </a:p>
+                  </a:txBody>
+                  <a:tcPr marL="113948" marR="113948" marT="56974" marB="56974">
+                    <a:solidFill>
+                      <a:schemeClr val="accent1">
+                        <a:lumMod val="40000"/>
+                        <a:lumOff val="60000"/>
+                      </a:schemeClr>
+                    </a:solidFill>
+                  </a:tcPr>
+                </a:tc>
+                <a:tc>
+                  <a:txBody>
+                    <a:bodyPr/>
+                    <a:lstStyle/>
+                    <a:p>
+                      <a:r>
+                        <a:rPr lang="en-US" sz="2200" dirty="0" smtClean="0">
+                          <a:solidFill>
+                            <a:schemeClr val="tx1"/>
+                          </a:solidFill>
+                        </a:rPr>
+                        <a:t>5</a:t>
+                      </a:r>
+                      <a:endParaRPr lang="en-US" sz="2200" dirty="0">
+                        <a:solidFill>
+                          <a:schemeClr val="tx1"/>
+                        </a:solidFill>
+                      </a:endParaRPr>
+                    </a:p>
+                  </a:txBody>
+                  <a:tcPr marL="113948" marR="113948" marT="56974" marB="56974">
+                    <a:solidFill>
+                      <a:schemeClr val="accent1">
+                        <a:lumMod val="40000"/>
+                        <a:lumOff val="60000"/>
+                      </a:schemeClr>
+                    </a:solidFill>
+                  </a:tcPr>
+                </a:tc>
+                <a:tc>
+                  <a:txBody>
+                    <a:bodyPr/>
+                    <a:lstStyle/>
+                    <a:p>
+                      <a:r>
+                        <a:rPr lang="en-US" sz="2200" dirty="0" smtClean="0">
+                          <a:solidFill>
+                            <a:schemeClr val="tx1"/>
+                          </a:solidFill>
+                        </a:rPr>
+                        <a:t>8</a:t>
+                      </a:r>
+                      <a:endParaRPr lang="en-US" sz="2200" dirty="0">
+                        <a:solidFill>
+                          <a:schemeClr val="tx1"/>
+                        </a:solidFill>
+                      </a:endParaRPr>
+                    </a:p>
+                  </a:txBody>
+                  <a:tcPr marL="113948" marR="113948" marT="56974" marB="56974">
+                    <a:solidFill>
+                      <a:schemeClr val="accent1">
+                        <a:lumMod val="40000"/>
+                        <a:lumOff val="60000"/>
+                      </a:schemeClr>
+                    </a:solidFill>
+                  </a:tcPr>
+                </a:tc>
+                <a:tc>
+                  <a:txBody>
+                    <a:bodyPr/>
+                    <a:lstStyle/>
+                    <a:p>
+                      <a:r>
+                        <a:rPr lang="en-US" sz="2200" dirty="0" smtClean="0">
+                          <a:solidFill>
+                            <a:schemeClr val="tx1"/>
+                          </a:solidFill>
+                        </a:rPr>
+                        <a:t>…</a:t>
+                      </a:r>
+                      <a:endParaRPr lang="en-US" sz="2200" dirty="0">
+                        <a:solidFill>
+                          <a:schemeClr val="tx1"/>
+                        </a:solidFill>
+                      </a:endParaRPr>
+                    </a:p>
+                  </a:txBody>
+                  <a:tcPr marL="113948" marR="113948" marT="56974" marB="56974">
+                    <a:solidFill>
+                      <a:schemeClr val="accent1">
+                        <a:lumMod val="40000"/>
+                        <a:lumOff val="60000"/>
+                      </a:schemeClr>
+                    </a:solidFill>
+                  </a:tcPr>
+                </a:tc>
+                <a:tc>
+                  <a:txBody>
+                    <a:bodyPr/>
+                    <a:lstStyle/>
+                    <a:p>
+                      <a:r>
+                        <a:rPr lang="en-US" sz="2200" dirty="0" smtClean="0">
+                          <a:solidFill>
+                            <a:schemeClr val="tx1"/>
+                          </a:solidFill>
+                        </a:rPr>
+                        <a:t>…</a:t>
+                      </a:r>
+                      <a:endParaRPr lang="en-US" sz="2200" dirty="0">
+                        <a:solidFill>
+                          <a:schemeClr val="tx1"/>
+                        </a:solidFill>
+                      </a:endParaRPr>
+                    </a:p>
+                  </a:txBody>
+                  <a:tcPr marL="113948" marR="113948" marT="56974" marB="56974">
+                    <a:solidFill>
+                      <a:schemeClr val="accent1">
+                        <a:lumMod val="40000"/>
+                        <a:lumOff val="60000"/>
+                      </a:schemeClr>
+                    </a:solidFill>
+                  </a:tcPr>
+                </a:tc>
+                <a:tc>
+                  <a:txBody>
+                    <a:bodyPr/>
+                    <a:lstStyle/>
+                    <a:p>
+                      <a:r>
+                        <a:rPr lang="en-US" sz="2200" dirty="0" smtClean="0">
+                          <a:solidFill>
+                            <a:schemeClr val="tx1"/>
+                          </a:solidFill>
+                        </a:rPr>
+                        <a:t>…</a:t>
+                      </a:r>
+                      <a:endParaRPr lang="en-US" sz="2200" dirty="0">
+                        <a:solidFill>
+                          <a:schemeClr val="tx1"/>
+                        </a:solidFill>
+                      </a:endParaRPr>
+                    </a:p>
+                  </a:txBody>
+                  <a:tcPr marL="113948" marR="113948" marT="56974" marB="56974">
+                    <a:solidFill>
+                      <a:schemeClr val="accent1">
+                        <a:lumMod val="40000"/>
+                        <a:lumOff val="60000"/>
+                      </a:schemeClr>
+                    </a:solidFill>
+                  </a:tcPr>
+                </a:tc>
+                <a:extLst>
+                  <a:ext uri="{0D108BD9-81ED-4DB2-BD59-A6C34878D82A}">
+                    <a16:rowId xmlns:a16="http://schemas.microsoft.com/office/drawing/2014/main" val="1403450679"/>
+                  </a:ext>
+                </a:extLst>
+              </a:tr>
+              <a:tr h="462121">
+                <a:tc>
+                  <a:txBody>
+                    <a:bodyPr/>
+                    <a:lstStyle/>
+                    <a:p>
+                      <a:pPr algn="r"/>
+                      <a:r>
+                        <a:rPr lang="en-US" sz="2200" dirty="0" err="1" smtClean="0"/>
+                        <a:t>i</a:t>
+                      </a:r>
+                      <a:endParaRPr lang="en-US" sz="2200" dirty="0"/>
+                    </a:p>
+                  </a:txBody>
+                  <a:tcPr marL="113948" marR="113948" marT="56974" marB="56974">
+                    <a:noFill/>
+                  </a:tcPr>
+                </a:tc>
+                <a:tc>
+                  <a:txBody>
+                    <a:bodyPr/>
+                    <a:lstStyle/>
+                    <a:p>
+                      <a:r>
+                        <a:rPr lang="en-US" sz="2200" dirty="0" smtClean="0"/>
+                        <a:t>0</a:t>
+                      </a:r>
+                      <a:endParaRPr lang="en-US" sz="2200" dirty="0"/>
+                    </a:p>
+                  </a:txBody>
+                  <a:tcPr marL="113948" marR="113948" marT="56974" marB="56974">
+                    <a:noFill/>
+                  </a:tcPr>
+                </a:tc>
+                <a:tc>
+                  <a:txBody>
+                    <a:bodyPr/>
+                    <a:lstStyle/>
+                    <a:p>
+                      <a:r>
+                        <a:rPr lang="en-US" sz="2200" dirty="0" smtClean="0"/>
+                        <a:t>1</a:t>
+                      </a:r>
+                      <a:endParaRPr lang="en-US" sz="2200" dirty="0"/>
+                    </a:p>
+                  </a:txBody>
+                  <a:tcPr marL="113948" marR="113948" marT="56974" marB="56974">
+                    <a:noFill/>
+                  </a:tcPr>
+                </a:tc>
+                <a:tc>
+                  <a:txBody>
+                    <a:bodyPr/>
+                    <a:lstStyle/>
+                    <a:p>
+                      <a:r>
+                        <a:rPr lang="en-US" sz="2200" dirty="0" smtClean="0"/>
+                        <a:t>2</a:t>
+                      </a:r>
+                      <a:endParaRPr lang="en-US" sz="2200" dirty="0"/>
+                    </a:p>
+                  </a:txBody>
+                  <a:tcPr marL="113948" marR="113948" marT="56974" marB="56974">
+                    <a:noFill/>
+                  </a:tcPr>
+                </a:tc>
+                <a:tc>
+                  <a:txBody>
+                    <a:bodyPr/>
+                    <a:lstStyle/>
+                    <a:p>
+                      <a:r>
+                        <a:rPr lang="en-US" sz="2200" dirty="0" smtClean="0"/>
+                        <a:t>3</a:t>
+                      </a:r>
+                      <a:endParaRPr lang="en-US" sz="2200" dirty="0"/>
+                    </a:p>
+                  </a:txBody>
+                  <a:tcPr marL="113948" marR="113948" marT="56974" marB="56974">
+                    <a:noFill/>
+                  </a:tcPr>
+                </a:tc>
+                <a:tc>
+                  <a:txBody>
+                    <a:bodyPr/>
+                    <a:lstStyle/>
+                    <a:p>
+                      <a:r>
+                        <a:rPr lang="en-US" sz="2200" dirty="0" smtClean="0"/>
+                        <a:t>4</a:t>
+                      </a:r>
+                      <a:endParaRPr lang="en-US" sz="2200" dirty="0"/>
+                    </a:p>
+                  </a:txBody>
+                  <a:tcPr marL="113948" marR="113948" marT="56974" marB="56974">
+                    <a:noFill/>
+                  </a:tcPr>
+                </a:tc>
+                <a:tc>
+                  <a:txBody>
+                    <a:bodyPr/>
+                    <a:lstStyle/>
+                    <a:p>
+                      <a:r>
+                        <a:rPr lang="en-US" sz="2200" dirty="0" smtClean="0"/>
+                        <a:t>5</a:t>
+                      </a:r>
+                      <a:endParaRPr lang="en-US" sz="2200" dirty="0"/>
+                    </a:p>
+                  </a:txBody>
+                  <a:tcPr marL="113948" marR="113948" marT="56974" marB="56974">
+                    <a:noFill/>
+                  </a:tcPr>
+                </a:tc>
+                <a:tc>
+                  <a:txBody>
+                    <a:bodyPr/>
+                    <a:lstStyle/>
+                    <a:p>
+                      <a:r>
+                        <a:rPr lang="en-US" sz="2200" dirty="0" smtClean="0"/>
+                        <a:t>6</a:t>
+                      </a:r>
+                      <a:endParaRPr lang="en-US" sz="2200" dirty="0"/>
+                    </a:p>
+                  </a:txBody>
+                  <a:tcPr marL="113948" marR="113948" marT="56974" marB="56974">
+                    <a:noFill/>
+                  </a:tcPr>
+                </a:tc>
+                <a:tc>
+                  <a:txBody>
+                    <a:bodyPr/>
+                    <a:lstStyle/>
+                    <a:p>
+                      <a:r>
+                        <a:rPr lang="en-US" sz="2200" dirty="0" smtClean="0"/>
+                        <a:t>…</a:t>
+                      </a:r>
+                      <a:endParaRPr lang="en-US" sz="2200" dirty="0"/>
+                    </a:p>
+                  </a:txBody>
+                  <a:tcPr marL="113948" marR="113948" marT="56974" marB="56974">
+                    <a:noFill/>
+                  </a:tcPr>
+                </a:tc>
+                <a:tc>
+                  <a:txBody>
+                    <a:bodyPr/>
+                    <a:lstStyle/>
+                    <a:p>
+                      <a:r>
+                        <a:rPr lang="en-US" sz="2200" dirty="0" smtClean="0"/>
+                        <a:t>x</a:t>
+                      </a:r>
+                      <a:endParaRPr lang="en-US" sz="2200" dirty="0"/>
+                    </a:p>
+                  </a:txBody>
+                  <a:tcPr marL="113948" marR="113948" marT="56974" marB="56974">
+                    <a:noFill/>
+                  </a:tcPr>
+                </a:tc>
+                <a:tc>
+                  <a:txBody>
+                    <a:bodyPr/>
+                    <a:lstStyle/>
+                    <a:p>
+                      <a:r>
+                        <a:rPr lang="en-US" sz="2200" dirty="0" smtClean="0"/>
+                        <a:t>x+1</a:t>
+                      </a:r>
+                      <a:endParaRPr lang="en-US" sz="2200" dirty="0"/>
+                    </a:p>
+                  </a:txBody>
+                  <a:tcPr marL="113948" marR="113948" marT="56974" marB="56974">
+                    <a:noFill/>
+                  </a:tcPr>
+                </a:tc>
+                <a:extLst>
+                  <a:ext uri="{0D108BD9-81ED-4DB2-BD59-A6C34878D82A}">
+                    <a16:rowId xmlns:a16="http://schemas.microsoft.com/office/drawing/2014/main" val="2165533412"/>
+                  </a:ext>
+                </a:extLst>
+              </a:tr>
+            </a:tbl>
+          </a:graphicData>
+        </a:graphic>
+      </p:graphicFrame>
+      <p:sp>
+        <p:nvSpPr>
+          <p:cNvPr id="6" name="Oval 5"/>
+          <p:cNvSpPr/>
+          <p:nvPr/>
         </p:nvSpPr>
-        <p:spPr/>
+        <p:spPr>
+          <a:xfrm>
+            <a:off x="2489200" y="3619500"/>
+            <a:ext cx="1257300" cy="533400"/>
+          </a:xfrm>
+          <a:prstGeom prst="ellipse">
+            <a:avLst/>
+          </a:prstGeom>
+          <a:noFill/>
+        </p:spPr>
+        <p:style>
+          <a:lnRef idx="2">
+            <a:schemeClr val="accent2"/>
+          </a:lnRef>
+          <a:fillRef idx="1">
+            <a:schemeClr val="lt1"/>
+          </a:fillRef>
+          <a:effectRef idx="0">
+            <a:schemeClr val="accent2"/>
+          </a:effectRef>
+          <a:fontRef idx="minor">
+            <a:schemeClr val="dk1"/>
+          </a:fontRef>
+        </p:style>
         <p:txBody>
-          <a:bodyPr/>
+          <a:bodyPr rtlCol="0" anchor="ctr"/>
           <a:lstStyle/>
           <a:p>
+            <a:pPr algn="ctr"/>
             <a:endParaRPr lang="en-US"/>
+          </a:p>
+        </p:txBody>
+      </p:sp>
+      <p:sp>
+        <p:nvSpPr>
+          <p:cNvPr id="13" name="Oval 12"/>
+          <p:cNvSpPr/>
+          <p:nvPr/>
+        </p:nvSpPr>
+        <p:spPr>
+          <a:xfrm>
+            <a:off x="3483535" y="4406900"/>
+            <a:ext cx="943370" cy="533400"/>
+          </a:xfrm>
+          <a:prstGeom prst="ellipse">
+            <a:avLst/>
+          </a:prstGeom>
+          <a:noFill/>
+        </p:spPr>
+        <p:style>
+          <a:lnRef idx="2">
+            <a:schemeClr val="accent1"/>
+          </a:lnRef>
+          <a:fillRef idx="1">
+            <a:schemeClr val="lt1"/>
+          </a:fillRef>
+          <a:effectRef idx="0">
+            <a:schemeClr val="accent1"/>
+          </a:effectRef>
+          <a:fontRef idx="minor">
+            <a:schemeClr val="dk1"/>
+          </a:fontRef>
+        </p:style>
+        <p:txBody>
+          <a:bodyPr rtlCol="0" anchor="ctr"/>
+          <a:lstStyle/>
+          <a:p>
+            <a:pPr algn="ctr"/>
+            <a:endParaRPr lang="en-US"/>
+          </a:p>
+        </p:txBody>
+      </p:sp>
+      <p:sp>
+        <p:nvSpPr>
+          <p:cNvPr id="14" name="Oval 13"/>
+          <p:cNvSpPr/>
+          <p:nvPr/>
+        </p:nvSpPr>
+        <p:spPr>
+          <a:xfrm>
+            <a:off x="4620698" y="4406900"/>
+            <a:ext cx="943370" cy="533400"/>
+          </a:xfrm>
+          <a:prstGeom prst="ellipse">
+            <a:avLst/>
+          </a:prstGeom>
+          <a:noFill/>
+        </p:spPr>
+        <p:style>
+          <a:lnRef idx="2">
+            <a:schemeClr val="accent1"/>
+          </a:lnRef>
+          <a:fillRef idx="1">
+            <a:schemeClr val="lt1"/>
+          </a:fillRef>
+          <a:effectRef idx="0">
+            <a:schemeClr val="accent1"/>
+          </a:effectRef>
+          <a:fontRef idx="minor">
+            <a:schemeClr val="dk1"/>
+          </a:fontRef>
+        </p:style>
+        <p:txBody>
+          <a:bodyPr rtlCol="0" anchor="ctr"/>
+          <a:lstStyle/>
+          <a:p>
+            <a:pPr algn="ctr"/>
+            <a:endParaRPr lang="en-US"/>
+          </a:p>
+        </p:txBody>
+      </p:sp>
+      <p:sp>
+        <p:nvSpPr>
+          <p:cNvPr id="15" name="TextBox 14"/>
+          <p:cNvSpPr txBox="1"/>
+          <p:nvPr/>
+        </p:nvSpPr>
+        <p:spPr>
+          <a:xfrm>
+            <a:off x="3311699" y="3332202"/>
+            <a:ext cx="1605376" cy="369332"/>
+          </a:xfrm>
+          <a:prstGeom prst="rect">
+            <a:avLst/>
+          </a:prstGeom>
+        </p:spPr>
+        <p:style>
+          <a:lnRef idx="2">
+            <a:schemeClr val="accent2">
+              <a:shade val="50000"/>
+            </a:schemeClr>
+          </a:lnRef>
+          <a:fillRef idx="1">
+            <a:schemeClr val="accent2"/>
+          </a:fillRef>
+          <a:effectRef idx="0">
+            <a:schemeClr val="accent2"/>
+          </a:effectRef>
+          <a:fontRef idx="minor">
+            <a:schemeClr val="lt1"/>
+          </a:fontRef>
+        </p:style>
+        <p:txBody>
+          <a:bodyPr wrap="none" rtlCol="0">
+            <a:spAutoFit/>
+          </a:bodyPr>
+          <a:lstStyle/>
+          <a:p>
+            <a:r>
+              <a:rPr lang="en-US" dirty="0" smtClean="0"/>
+              <a:t>“</a:t>
+            </a:r>
+            <a:r>
+              <a:rPr lang="en-US" dirty="0" err="1" smtClean="0"/>
+              <a:t>memoization</a:t>
+            </a:r>
+            <a:r>
+              <a:rPr lang="en-US" dirty="0" smtClean="0"/>
+              <a:t>”</a:t>
+            </a:r>
+            <a:endParaRPr lang="en-US" dirty="0"/>
+          </a:p>
+        </p:txBody>
+      </p:sp>
+      <p:sp>
+        <p:nvSpPr>
+          <p:cNvPr id="16" name="TextBox 15"/>
+          <p:cNvSpPr txBox="1"/>
+          <p:nvPr/>
+        </p:nvSpPr>
+        <p:spPr>
+          <a:xfrm>
+            <a:off x="934624" y="4488934"/>
+            <a:ext cx="1605376" cy="369332"/>
+          </a:xfrm>
+          <a:prstGeom prst="rect">
+            <a:avLst/>
+          </a:prstGeom>
+        </p:spPr>
+        <p:style>
+          <a:lnRef idx="2">
+            <a:schemeClr val="accent2">
+              <a:shade val="50000"/>
+            </a:schemeClr>
+          </a:lnRef>
+          <a:fillRef idx="1">
+            <a:schemeClr val="accent2"/>
+          </a:fillRef>
+          <a:effectRef idx="0">
+            <a:schemeClr val="accent2"/>
+          </a:effectRef>
+          <a:fontRef idx="minor">
+            <a:schemeClr val="lt1"/>
+          </a:fontRef>
+        </p:style>
+        <p:txBody>
+          <a:bodyPr wrap="none" rtlCol="0">
+            <a:spAutoFit/>
+          </a:bodyPr>
+          <a:lstStyle/>
+          <a:p>
+            <a:r>
+              <a:rPr lang="en-US" dirty="0" smtClean="0"/>
+              <a:t>“</a:t>
+            </a:r>
+            <a:r>
+              <a:rPr lang="en-US" dirty="0" err="1" smtClean="0"/>
+              <a:t>memoization</a:t>
+            </a:r>
+            <a:r>
+              <a:rPr lang="en-US" dirty="0" smtClean="0"/>
+              <a:t>”</a:t>
+            </a:r>
+            <a:endParaRPr lang="en-US" dirty="0"/>
+          </a:p>
+        </p:txBody>
+      </p:sp>
+      <p:sp>
+        <p:nvSpPr>
+          <p:cNvPr id="17" name="TextBox 16"/>
+          <p:cNvSpPr txBox="1"/>
+          <p:nvPr/>
+        </p:nvSpPr>
+        <p:spPr>
+          <a:xfrm>
+            <a:off x="3887347" y="4037568"/>
+            <a:ext cx="1074333" cy="369332"/>
+          </a:xfrm>
+          <a:prstGeom prst="rect">
+            <a:avLst/>
+          </a:prstGeom>
+        </p:spPr>
+        <p:style>
+          <a:lnRef idx="3">
+            <a:schemeClr val="lt1"/>
+          </a:lnRef>
+          <a:fillRef idx="1">
+            <a:schemeClr val="accent1"/>
+          </a:fillRef>
+          <a:effectRef idx="1">
+            <a:schemeClr val="accent1"/>
+          </a:effectRef>
+          <a:fontRef idx="minor">
+            <a:schemeClr val="lt1"/>
+          </a:fontRef>
+        </p:style>
+        <p:txBody>
+          <a:bodyPr wrap="none" rtlCol="0">
+            <a:spAutoFit/>
+          </a:bodyPr>
+          <a:lstStyle/>
+          <a:p>
+            <a:r>
+              <a:rPr lang="en-US" dirty="0" smtClean="0"/>
+              <a:t>“look up”</a:t>
+            </a:r>
+            <a:endParaRPr lang="en-US" dirty="0"/>
+          </a:p>
+        </p:txBody>
+      </p:sp>
+      <p:sp>
+        <p:nvSpPr>
+          <p:cNvPr id="18" name="TextBox 17"/>
+          <p:cNvSpPr txBox="1"/>
+          <p:nvPr/>
+        </p:nvSpPr>
+        <p:spPr>
+          <a:xfrm>
+            <a:off x="5905500" y="1690689"/>
+            <a:ext cx="2895600" cy="2308324"/>
+          </a:xfrm>
+          <a:prstGeom prst="rect">
+            <a:avLst/>
+          </a:prstGeom>
+          <a:noFill/>
+        </p:spPr>
+        <p:txBody>
+          <a:bodyPr wrap="square" rtlCol="0">
+            <a:spAutoFit/>
+          </a:bodyPr>
+          <a:lstStyle/>
+          <a:p>
+            <a:r>
+              <a:rPr lang="en-US" b="1" i="1" dirty="0" err="1" smtClean="0">
+                <a:solidFill>
+                  <a:schemeClr val="accent2">
+                    <a:lumMod val="75000"/>
+                  </a:schemeClr>
+                </a:solidFill>
+              </a:rPr>
+              <a:t>memoization</a:t>
+            </a:r>
+            <a:endParaRPr lang="en-US" b="1" i="1" dirty="0" smtClean="0">
+              <a:solidFill>
+                <a:schemeClr val="accent2">
+                  <a:lumMod val="75000"/>
+                </a:schemeClr>
+              </a:solidFill>
+            </a:endParaRPr>
+          </a:p>
+          <a:p>
+            <a:r>
+              <a:rPr lang="en-US" dirty="0" smtClean="0"/>
+              <a:t>saving sub-problems solution into a “memo”</a:t>
+            </a:r>
+          </a:p>
+          <a:p>
+            <a:endParaRPr lang="en-US" dirty="0"/>
+          </a:p>
+          <a:p>
+            <a:r>
+              <a:rPr lang="en-US" b="1" i="1" dirty="0" smtClean="0">
+                <a:solidFill>
+                  <a:srgbClr val="0070C0"/>
+                </a:solidFill>
+              </a:rPr>
+              <a:t>look up</a:t>
+            </a:r>
+          </a:p>
+          <a:p>
+            <a:r>
+              <a:rPr lang="en-US" dirty="0" smtClean="0"/>
+              <a:t>look up the “memo” for </a:t>
+            </a:r>
+            <a:r>
+              <a:rPr lang="en-US" b="1" dirty="0" smtClean="0"/>
+              <a:t>sub-problem</a:t>
+            </a:r>
+            <a:r>
+              <a:rPr lang="en-US" dirty="0" smtClean="0"/>
+              <a:t> </a:t>
+            </a:r>
+            <a:r>
+              <a:rPr lang="en-US" b="1" dirty="0" smtClean="0"/>
+              <a:t>solutions if it is exist</a:t>
+            </a:r>
           </a:p>
         </p:txBody>
       </p:sp>
@@ -14214,6 +15698,13 @@
   <p:clrMapOvr>
     <a:masterClrMapping/>
   </p:clrMapOvr>
+  <p:timing>
+    <p:tnLst>
+      <p:par>
+        <p:cTn id="1" dur="indefinite" restart="never" nodeType="tmRoot"/>
+      </p:par>
+    </p:tnLst>
+  </p:timing>
 </p:sld>
 </file>
 
@@ -14355,7 +15846,7 @@
           <a:graphicData uri="http://schemas.openxmlformats.org/presentationml/2006/ole">
             <mc:AlternateContent xmlns:mc="http://schemas.openxmlformats.org/markup-compatibility/2006">
               <mc:Choice xmlns:v="urn:schemas-microsoft-com:vml" Requires="v">
-                <p:oleObj spid="_x0000_s6202" name="Equation" r:id="rId3" imgW="914400" imgH="190440" progId="Equation.DSMT4">
+                <p:oleObj spid="_x0000_s6227" name="Equation" r:id="rId3" imgW="914400" imgH="190440" progId="Equation.DSMT4">
                   <p:embed/>
                 </p:oleObj>
               </mc:Choice>
@@ -14681,6 +16172,13 @@
   <p:clrMapOvr>
     <a:masterClrMapping/>
   </p:clrMapOvr>
+  <p:timing>
+    <p:tnLst>
+      <p:par>
+        <p:cTn id="1" dur="indefinite" restart="never" nodeType="tmRoot"/>
+      </p:par>
+    </p:tnLst>
+  </p:timing>
 </p:sld>
 </file>
 
@@ -14753,6 +16251,13 @@
   <p:clrMapOvr>
     <a:masterClrMapping/>
   </p:clrMapOvr>
+  <p:timing>
+    <p:tnLst>
+      <p:par>
+        <p:cTn id="1" dur="indefinite" restart="never" nodeType="tmRoot"/>
+      </p:par>
+    </p:tnLst>
+  </p:timing>
 </p:sld>
 </file>
 
@@ -15026,7 +16531,6 @@
               <a:rPr lang="en-US" dirty="0" smtClean="0"/>
               <a:t>Asymptotic notation</a:t>
             </a:r>
-            <a:endParaRPr lang="en-US" dirty="0" smtClean="0"/>
           </a:p>
           <a:p>
             <a:r>
@@ -15064,116 +16568,6 @@
       </p:par>
     </p:tnLst>
   </p:timing>
-</p:sld>
-</file>
-
-<file path=ppt/slides/slide35.xml><?xml version="1.0" encoding="utf-8"?>
-<p:sld xmlns:a="http://schemas.openxmlformats.org/drawingml/2006/main" xmlns:r="http://schemas.openxmlformats.org/officeDocument/2006/relationships" xmlns:p="http://schemas.openxmlformats.org/presentationml/2006/main">
-  <p:cSld>
-    <p:spTree>
-      <p:nvGrpSpPr>
-        <p:cNvPr id="1" name=""/>
-        <p:cNvGrpSpPr/>
-        <p:nvPr/>
-      </p:nvGrpSpPr>
-      <p:grpSpPr>
-        <a:xfrm>
-          <a:off x="0" y="0"/>
-          <a:ext cx="0" cy="0"/>
-          <a:chOff x="0" y="0"/>
-          <a:chExt cx="0" cy="0"/>
-        </a:xfrm>
-      </p:grpSpPr>
-      <p:sp>
-        <p:nvSpPr>
-          <p:cNvPr id="2" name="Title 1"/>
-          <p:cNvSpPr>
-            <a:spLocks noGrp="1"/>
-          </p:cNvSpPr>
-          <p:nvPr>
-            <p:ph type="title"/>
-          </p:nvPr>
-        </p:nvSpPr>
-        <p:spPr/>
-        <p:txBody>
-          <a:bodyPr/>
-          <a:lstStyle/>
-          <a:p>
-            <a:r>
-              <a:rPr lang="en-US" dirty="0" smtClean="0"/>
-              <a:t>Exercise</a:t>
-            </a:r>
-            <a:endParaRPr lang="en-US" dirty="0"/>
-          </a:p>
-        </p:txBody>
-      </p:sp>
-      <p:sp>
-        <p:nvSpPr>
-          <p:cNvPr id="3" name="Content Placeholder 2"/>
-          <p:cNvSpPr>
-            <a:spLocks noGrp="1"/>
-          </p:cNvSpPr>
-          <p:nvPr>
-            <p:ph idx="1"/>
-          </p:nvPr>
-        </p:nvSpPr>
-        <p:spPr/>
-        <p:txBody>
-          <a:bodyPr/>
-          <a:lstStyle/>
-          <a:p>
-            <a:r>
-              <a:rPr lang="en-US" dirty="0" smtClean="0"/>
-              <a:t>Create </a:t>
-            </a:r>
-            <a:r>
-              <a:rPr lang="en-US" dirty="0"/>
-              <a:t>an account on SPOJ (</a:t>
-            </a:r>
-            <a:r>
-              <a:rPr lang="en-US" dirty="0">
-                <a:hlinkClick r:id="rId2"/>
-              </a:rPr>
-              <a:t>http://www.spoj.com</a:t>
-            </a:r>
-            <a:r>
-              <a:rPr lang="en-US" dirty="0" smtClean="0">
-                <a:hlinkClick r:id="rId2"/>
-              </a:rPr>
-              <a:t>/</a:t>
-            </a:r>
-            <a:r>
-              <a:rPr lang="en-US" dirty="0" smtClean="0"/>
-              <a:t>) </a:t>
-            </a:r>
-          </a:p>
-          <a:p>
-            <a:r>
-              <a:rPr lang="en-US" dirty="0" smtClean="0"/>
-              <a:t>Solve </a:t>
-            </a:r>
-            <a:r>
-              <a:rPr lang="en-US" b="1" dirty="0" smtClean="0"/>
-              <a:t>SMPSEQ4</a:t>
-            </a:r>
-            <a:r>
-              <a:rPr lang="en-US" dirty="0" smtClean="0"/>
-              <a:t> and submit your code</a:t>
-            </a:r>
-            <a:endParaRPr lang="en-US" dirty="0"/>
-          </a:p>
-        </p:txBody>
-      </p:sp>
-    </p:spTree>
-    <p:extLst>
-      <p:ext uri="{BB962C8B-B14F-4D97-AF65-F5344CB8AC3E}">
-        <p14:creationId xmlns:p14="http://schemas.microsoft.com/office/powerpoint/2010/main" val="947968129"/>
-      </p:ext>
-    </p:extLst>
-  </p:cSld>
-  <p:clrMapOvr>
-    <a:masterClrMapping/>
-  </p:clrMapOvr>
 </p:sld>
 </file>
 
@@ -15352,7 +16746,7 @@
       </p:grpSpPr>
       <p:sp>
         <p:nvSpPr>
-          <p:cNvPr id="4" name="Title 3"/>
+          <p:cNvPr id="2" name="Title 1"/>
           <p:cNvSpPr>
             <a:spLocks noGrp="1"/>
           </p:cNvSpPr>
@@ -15367,7 +16761,7 @@
           <a:p>
             <a:r>
               <a:rPr lang="en-US" dirty="0" smtClean="0"/>
-              <a:t>Introduction</a:t>
+              <a:t>Marking</a:t>
             </a:r>
             <a:endParaRPr lang="en-US" dirty="0"/>
           </a:p>
@@ -15375,12 +16769,12 @@
       </p:sp>
       <p:sp>
         <p:nvSpPr>
-          <p:cNvPr id="5" name="Text Placeholder 4"/>
+          <p:cNvPr id="3" name="Content Placeholder 2"/>
           <p:cNvSpPr>
             <a:spLocks noGrp="1"/>
           </p:cNvSpPr>
           <p:nvPr>
-            <p:ph type="body" idx="1"/>
+            <p:ph idx="1"/>
           </p:nvPr>
         </p:nvSpPr>
         <p:spPr/>
@@ -15388,14 +16782,42 @@
           <a:bodyPr/>
           <a:lstStyle/>
           <a:p>
-            <a:endParaRPr lang="en-US"/>
+            <a:r>
+              <a:rPr lang="en-US" dirty="0" smtClean="0"/>
+              <a:t>Quiz 1: 			20%</a:t>
+            </a:r>
+          </a:p>
+          <a:p>
+            <a:r>
+              <a:rPr lang="en-US" dirty="0" smtClean="0"/>
+              <a:t>Quiz 2: 			20%</a:t>
+            </a:r>
+          </a:p>
+          <a:p>
+            <a:r>
+              <a:rPr lang="en-US" dirty="0" smtClean="0"/>
+              <a:t>Midterm Exam: 	25%</a:t>
+            </a:r>
+          </a:p>
+          <a:p>
+            <a:r>
+              <a:rPr lang="en-US" dirty="0" smtClean="0"/>
+              <a:t>Final Exam: 		25%</a:t>
+            </a:r>
+          </a:p>
+          <a:p>
+            <a:r>
+              <a:rPr lang="en-US" dirty="0" smtClean="0"/>
+              <a:t>Exercise: 		10%</a:t>
+            </a:r>
+            <a:endParaRPr lang="en-US" dirty="0"/>
           </a:p>
         </p:txBody>
       </p:sp>
     </p:spTree>
     <p:extLst>
       <p:ext uri="{BB962C8B-B14F-4D97-AF65-F5344CB8AC3E}">
-        <p14:creationId xmlns:p14="http://schemas.microsoft.com/office/powerpoint/2010/main" val="3809092340"/>
+        <p14:creationId xmlns:p14="http://schemas.microsoft.com/office/powerpoint/2010/main" val="2476832878"/>
       </p:ext>
     </p:extLst>
   </p:cSld>
@@ -15431,7 +16853,7 @@
       </p:grpSpPr>
       <p:sp>
         <p:nvSpPr>
-          <p:cNvPr id="2" name="Title 1"/>
+          <p:cNvPr id="4" name="Title 3"/>
           <p:cNvSpPr>
             <a:spLocks noGrp="1"/>
           </p:cNvSpPr>
@@ -15446,7 +16868,7 @@
           <a:p>
             <a:r>
               <a:rPr lang="en-US" dirty="0" smtClean="0"/>
-              <a:t>What will I learn?</a:t>
+              <a:t>Introduction</a:t>
             </a:r>
             <a:endParaRPr lang="en-US" dirty="0"/>
           </a:p>
@@ -15454,12 +16876,12 @@
       </p:sp>
       <p:sp>
         <p:nvSpPr>
-          <p:cNvPr id="3" name="Content Placeholder 2"/>
+          <p:cNvPr id="5" name="Text Placeholder 4"/>
           <p:cNvSpPr>
             <a:spLocks noGrp="1"/>
           </p:cNvSpPr>
           <p:nvPr>
-            <p:ph idx="1"/>
+            <p:ph type="body" idx="1"/>
           </p:nvPr>
         </p:nvSpPr>
         <p:spPr/>
@@ -15467,50 +16889,14 @@
           <a:bodyPr/>
           <a:lstStyle/>
           <a:p>
-            <a:pPr marL="0" indent="0">
-              <a:buNone/>
-            </a:pPr>
-            <a:r>
-              <a:rPr lang="en-US" dirty="0" smtClean="0"/>
-              <a:t>In this lesson, you will learn several topics, including:</a:t>
-            </a:r>
-          </a:p>
-          <a:p>
-            <a:pPr marL="357188" indent="-357188"/>
-            <a:r>
-              <a:rPr lang="en-US" dirty="0" smtClean="0"/>
-              <a:t>Syllabus</a:t>
-            </a:r>
-          </a:p>
-          <a:p>
-            <a:pPr marL="357188" indent="-357188"/>
-            <a:r>
-              <a:rPr lang="en-US" dirty="0" smtClean="0"/>
-              <a:t>Review of </a:t>
-            </a:r>
-            <a:r>
-              <a:rPr lang="en-US" dirty="0" smtClean="0"/>
-              <a:t>DAA </a:t>
-            </a:r>
-            <a:r>
-              <a:rPr lang="en-US" dirty="0" smtClean="0"/>
-              <a:t>1</a:t>
-            </a:r>
-          </a:p>
-          <a:p>
-            <a:pPr marL="357188" indent="-357188"/>
-            <a:r>
-              <a:rPr lang="en-US" dirty="0" smtClean="0"/>
-              <a:t>Problem solving approach</a:t>
-            </a:r>
-            <a:endParaRPr lang="en-US" dirty="0"/>
+            <a:endParaRPr lang="en-US"/>
           </a:p>
         </p:txBody>
       </p:sp>
     </p:spTree>
     <p:extLst>
       <p:ext uri="{BB962C8B-B14F-4D97-AF65-F5344CB8AC3E}">
-        <p14:creationId xmlns:p14="http://schemas.microsoft.com/office/powerpoint/2010/main" val="2296825356"/>
+        <p14:creationId xmlns:p14="http://schemas.microsoft.com/office/powerpoint/2010/main" val="3809092340"/>
       </p:ext>
     </p:extLst>
   </p:cSld>
@@ -15561,7 +16947,7 @@
           <a:p>
             <a:r>
               <a:rPr lang="en-US" dirty="0" smtClean="0"/>
-              <a:t>Why learn it?</a:t>
+              <a:t>What will I learn?</a:t>
             </a:r>
             <a:endParaRPr lang="en-US" dirty="0"/>
           </a:p>
@@ -15579,103 +16965,45 @@
         </p:nvSpPr>
         <p:spPr/>
         <p:txBody>
-          <a:bodyPr>
-            <a:normAutofit fontScale="70000" lnSpcReduction="20000"/>
-          </a:bodyPr>
+          <a:bodyPr/>
           <a:lstStyle/>
           <a:p>
             <a:pPr marL="0" indent="0">
               <a:buNone/>
             </a:pPr>
             <a:r>
-              <a:rPr lang="en-US" sz="5000" b="1" dirty="0" smtClean="0"/>
-              <a:t>Purpose</a:t>
-            </a:r>
-          </a:p>
-          <a:p>
-            <a:pPr>
-              <a:spcAft>
-                <a:spcPts val="1200"/>
-              </a:spcAft>
-            </a:pPr>
-            <a:r>
-              <a:rPr lang="en-US" sz="4300" dirty="0" smtClean="0"/>
-              <a:t>By knowing the syllabus, you will know the ‘</a:t>
-            </a:r>
-            <a:r>
-              <a:rPr lang="en-US" sz="4300" b="1" dirty="0" smtClean="0">
-                <a:solidFill>
-                  <a:srgbClr val="0070C0"/>
-                </a:solidFill>
-              </a:rPr>
-              <a:t>big picture</a:t>
-            </a:r>
-            <a:r>
-              <a:rPr lang="en-US" sz="4300" dirty="0" smtClean="0"/>
-              <a:t>’ of what we learn in this lecture.</a:t>
-            </a:r>
-          </a:p>
-          <a:p>
-            <a:pPr>
-              <a:spcAft>
-                <a:spcPts val="1200"/>
-              </a:spcAft>
-            </a:pPr>
-            <a:r>
-              <a:rPr lang="en-US" sz="4300" dirty="0" smtClean="0"/>
-              <a:t>Recap from </a:t>
-            </a:r>
-            <a:r>
-              <a:rPr lang="en-US" sz="4300" dirty="0" smtClean="0"/>
-              <a:t>DAA 1, </a:t>
-            </a:r>
-            <a:r>
-              <a:rPr lang="en-US" sz="4300" dirty="0" smtClean="0"/>
-              <a:t>we will use </a:t>
-            </a:r>
-            <a:r>
-              <a:rPr lang="en-US" sz="4300" b="1" dirty="0" smtClean="0">
-                <a:solidFill>
-                  <a:srgbClr val="0070C0"/>
-                </a:solidFill>
-              </a:rPr>
-              <a:t>complexity analysis</a:t>
-            </a:r>
-            <a:r>
-              <a:rPr lang="en-US" sz="4300" dirty="0" smtClean="0"/>
-              <a:t> to determine the efficiency of algorithm.</a:t>
-            </a:r>
-          </a:p>
-          <a:p>
-            <a:pPr>
-              <a:spcAft>
-                <a:spcPts val="1200"/>
-              </a:spcAft>
-            </a:pPr>
-            <a:r>
-              <a:rPr lang="en-US" sz="4300" dirty="0" smtClean="0"/>
-              <a:t>We will have new approaches to solve computing problems: </a:t>
-            </a:r>
-            <a:r>
-              <a:rPr lang="en-US" sz="4300" b="1" dirty="0" smtClean="0">
-                <a:solidFill>
-                  <a:srgbClr val="0070C0"/>
-                </a:solidFill>
-              </a:rPr>
-              <a:t>DP (dynamic programming), Greedy algorithm</a:t>
-            </a:r>
-            <a:endParaRPr lang="en-US" sz="4300" b="1" dirty="0">
-              <a:solidFill>
-                <a:srgbClr val="0070C0"/>
-              </a:solidFill>
-            </a:endParaRPr>
+              <a:rPr lang="en-US" dirty="0" smtClean="0"/>
+              <a:t>In this lesson, you will learn several topics, including:</a:t>
+            </a:r>
+          </a:p>
+          <a:p>
+            <a:pPr marL="357188" indent="-357188"/>
+            <a:r>
+              <a:rPr lang="en-US" dirty="0" smtClean="0"/>
+              <a:t>Syllabus</a:t>
+            </a:r>
+          </a:p>
+          <a:p>
+            <a:pPr marL="357188" indent="-357188"/>
+            <a:r>
+              <a:rPr lang="en-US" dirty="0" smtClean="0"/>
+              <a:t>Review of DAA 1</a:t>
+            </a:r>
+          </a:p>
+          <a:p>
+            <a:pPr marL="357188" indent="-357188"/>
+            <a:r>
+              <a:rPr lang="en-US" dirty="0" smtClean="0"/>
+              <a:t>Problem solving approach</a:t>
+            </a:r>
+            <a:endParaRPr lang="en-US" dirty="0"/>
           </a:p>
         </p:txBody>
       </p:sp>
     </p:spTree>
     <p:extLst>
       <p:ext uri="{BB962C8B-B14F-4D97-AF65-F5344CB8AC3E}">
-        <p14:creationId xmlns:p14="http://schemas.microsoft.com/office/powerpoint/2010/main" val="2642627184"/>
+        <p14:creationId xmlns:p14="http://schemas.microsoft.com/office/powerpoint/2010/main" val="2296825356"/>
       </p:ext>
     </p:extLst>
   </p:cSld>
@@ -15726,7 +17054,7 @@
           <a:p>
             <a:r>
               <a:rPr lang="en-US" dirty="0" smtClean="0"/>
-              <a:t>Marking</a:t>
+              <a:t>Why learn it?</a:t>
             </a:r>
             <a:endParaRPr lang="en-US" dirty="0"/>
           </a:p>
@@ -15744,45 +17072,95 @@
         </p:nvSpPr>
         <p:spPr/>
         <p:txBody>
-          <a:bodyPr/>
+          <a:bodyPr>
+            <a:normAutofit fontScale="70000" lnSpcReduction="20000"/>
+          </a:bodyPr>
           <a:lstStyle/>
           <a:p>
-            <a:r>
-              <a:rPr lang="en-US" dirty="0" smtClean="0"/>
-              <a:t>Quiz 1: 			20%</a:t>
-            </a:r>
-          </a:p>
-          <a:p>
-            <a:r>
-              <a:rPr lang="en-US" dirty="0" smtClean="0"/>
-              <a:t>Quiz 2: 			20%</a:t>
-            </a:r>
-          </a:p>
-          <a:p>
-            <a:r>
-              <a:rPr lang="en-US" dirty="0" smtClean="0"/>
-              <a:t>Midterm Exam: 	25%</a:t>
-            </a:r>
-          </a:p>
-          <a:p>
-            <a:r>
-              <a:rPr lang="en-US" dirty="0" smtClean="0"/>
-              <a:t>Final Exam: 		25%</a:t>
-            </a:r>
-          </a:p>
-          <a:p>
-            <a:r>
-              <a:rPr lang="en-US" dirty="0" smtClean="0"/>
-              <a:t>Exercise: 		10%</a:t>
-            </a:r>
-            <a:endParaRPr lang="en-US" dirty="0"/>
+            <a:pPr marL="0" indent="0">
+              <a:buNone/>
+            </a:pPr>
+            <a:r>
+              <a:rPr lang="en-US" sz="5000" b="1" dirty="0" smtClean="0"/>
+              <a:t>Purpose</a:t>
+            </a:r>
+          </a:p>
+          <a:p>
+            <a:pPr>
+              <a:spcAft>
+                <a:spcPts val="1200"/>
+              </a:spcAft>
+            </a:pPr>
+            <a:r>
+              <a:rPr lang="en-US" sz="4300" dirty="0" smtClean="0"/>
+              <a:t>By knowing the syllabus, you will know the ‘</a:t>
+            </a:r>
+            <a:r>
+              <a:rPr lang="en-US" sz="4300" b="1" dirty="0" smtClean="0">
+                <a:solidFill>
+                  <a:srgbClr val="0070C0"/>
+                </a:solidFill>
+              </a:rPr>
+              <a:t>big picture</a:t>
+            </a:r>
+            <a:r>
+              <a:rPr lang="en-US" sz="4300" dirty="0" smtClean="0"/>
+              <a:t>’ of what we learn in this lecture.</a:t>
+            </a:r>
+          </a:p>
+          <a:p>
+            <a:pPr>
+              <a:spcAft>
+                <a:spcPts val="1200"/>
+              </a:spcAft>
+            </a:pPr>
+            <a:r>
+              <a:rPr lang="en-US" sz="4300" dirty="0" smtClean="0"/>
+              <a:t>Recap from DAA 1, we will use </a:t>
+            </a:r>
+            <a:r>
+              <a:rPr lang="en-US" sz="4300" b="1" dirty="0" smtClean="0">
+                <a:solidFill>
+                  <a:srgbClr val="0070C0"/>
+                </a:solidFill>
+              </a:rPr>
+              <a:t>complexity analysis</a:t>
+            </a:r>
+            <a:r>
+              <a:rPr lang="en-US" sz="4300" dirty="0" smtClean="0"/>
+              <a:t> to determine the efficiency of algorithm.</a:t>
+            </a:r>
+          </a:p>
+          <a:p>
+            <a:pPr>
+              <a:spcAft>
+                <a:spcPts val="1200"/>
+              </a:spcAft>
+            </a:pPr>
+            <a:r>
+              <a:rPr lang="en-US" sz="4300" dirty="0" smtClean="0"/>
+              <a:t>We will have new approaches to solve computing problems: </a:t>
+            </a:r>
+            <a:r>
+              <a:rPr lang="en-US" sz="4300" b="1" dirty="0" smtClean="0">
+                <a:solidFill>
+                  <a:srgbClr val="0070C0"/>
+                </a:solidFill>
+              </a:rPr>
+              <a:t>DP (dynamic programming), Greedy algorithm</a:t>
+            </a:r>
+            <a:endParaRPr lang="en-US" sz="4300" b="1" dirty="0">
+              <a:solidFill>
+                <a:srgbClr val="0070C0"/>
+              </a:solidFill>
+            </a:endParaRPr>
           </a:p>
         </p:txBody>
       </p:sp>
     </p:spTree>
     <p:extLst>
       <p:ext uri="{BB962C8B-B14F-4D97-AF65-F5344CB8AC3E}">
-        <p14:creationId xmlns:p14="http://schemas.microsoft.com/office/powerpoint/2010/main" val="2476832878"/>
+        <p14:creationId xmlns:p14="http://schemas.microsoft.com/office/powerpoint/2010/main" val="2642627184"/>
       </p:ext>
     </p:extLst>
   </p:cSld>

</xml_diff>

<commit_message>
Adding example from class E
</commit_message>
<xml_diff>
--- a/161702/presentation/01 - Syllabus, Review of PAA 1/01. Syllabus, Review of PAA 1.pptx
+++ b/161702/presentation/01 - Syllabus, Review of PAA 1/01. Syllabus, Review of PAA 1.pptx
@@ -12338,7 +12338,7 @@
           <a:graphicData uri="http://schemas.openxmlformats.org/presentationml/2006/ole">
             <mc:AlternateContent xmlns:mc="http://schemas.openxmlformats.org/markup-compatibility/2006">
               <mc:Choice xmlns:v="urn:schemas-microsoft-com:vml" Requires="v">
-                <p:oleObj spid="_x0000_s3428" name="Equation" r:id="rId3" imgW="1346040" imgH="253800" progId="Equation.DSMT4">
+                <p:oleObj spid="_x0000_s3440" name="Equation" r:id="rId3" imgW="1346040" imgH="253800" progId="Equation.DSMT4">
                   <p:embed/>
                 </p:oleObj>
               </mc:Choice>
@@ -12395,7 +12395,7 @@
           <a:graphicData uri="http://schemas.openxmlformats.org/presentationml/2006/ole">
             <mc:AlternateContent xmlns:mc="http://schemas.openxmlformats.org/markup-compatibility/2006">
               <mc:Choice xmlns:v="urn:schemas-microsoft-com:vml" Requires="v">
-                <p:oleObj spid="_x0000_s3429" name="Equation" r:id="rId5" imgW="1549080" imgH="1523880" progId="Equation.DSMT4">
+                <p:oleObj spid="_x0000_s3441" name="Equation" r:id="rId5" imgW="1549080" imgH="1523880" progId="Equation.DSMT4">
                   <p:embed/>
                 </p:oleObj>
               </mc:Choice>
@@ -12452,7 +12452,7 @@
           <a:graphicData uri="http://schemas.openxmlformats.org/presentationml/2006/ole">
             <mc:AlternateContent xmlns:mc="http://schemas.openxmlformats.org/markup-compatibility/2006">
               <mc:Choice xmlns:v="urn:schemas-microsoft-com:vml" Requires="v">
-                <p:oleObj spid="_x0000_s3430" name="Equation" r:id="rId7" imgW="2361960" imgH="253800" progId="Equation.DSMT4">
+                <p:oleObj spid="_x0000_s3442" name="Equation" r:id="rId7" imgW="2361960" imgH="253800" progId="Equation.DSMT4">
                   <p:embed/>
                 </p:oleObj>
               </mc:Choice>
@@ -12598,7 +12598,7 @@
           <a:graphicData uri="http://schemas.openxmlformats.org/presentationml/2006/ole">
             <mc:AlternateContent xmlns:mc="http://schemas.openxmlformats.org/markup-compatibility/2006">
               <mc:Choice xmlns:v="urn:schemas-microsoft-com:vml" Requires="v">
-                <p:oleObj spid="_x0000_s1161" name="Equation" r:id="rId4" imgW="1346040" imgH="253800" progId="Equation.DSMT4">
+                <p:oleObj spid="_x0000_s1165" name="Equation" r:id="rId4" imgW="1346040" imgH="253800" progId="Equation.DSMT4">
                   <p:embed/>
                 </p:oleObj>
               </mc:Choice>
@@ -12799,7 +12799,7 @@
           <a:graphicData uri="http://schemas.openxmlformats.org/presentationml/2006/ole">
             <mc:AlternateContent xmlns:mc="http://schemas.openxmlformats.org/markup-compatibility/2006">
               <mc:Choice xmlns:v="urn:schemas-microsoft-com:vml" Requires="v">
-                <p:oleObj spid="_x0000_s2306" name="Equation" r:id="rId3" imgW="1346040" imgH="1638000" progId="Equation.DSMT4">
+                <p:oleObj spid="_x0000_s2314" name="Equation" r:id="rId3" imgW="1346040" imgH="1638000" progId="Equation.DSMT4">
                   <p:embed/>
                 </p:oleObj>
               </mc:Choice>
@@ -12856,7 +12856,7 @@
           <a:graphicData uri="http://schemas.openxmlformats.org/presentationml/2006/ole">
             <mc:AlternateContent xmlns:mc="http://schemas.openxmlformats.org/markup-compatibility/2006">
               <mc:Choice xmlns:v="urn:schemas-microsoft-com:vml" Requires="v">
-                <p:oleObj spid="_x0000_s2307" name="Equation" r:id="rId5" imgW="1104840" imgH="482400" progId="Equation.DSMT4">
+                <p:oleObj spid="_x0000_s2315" name="Equation" r:id="rId5" imgW="1104840" imgH="482400" progId="Equation.DSMT4">
                   <p:embed/>
                 </p:oleObj>
               </mc:Choice>
@@ -12973,7 +12973,7 @@
           <a:graphicData uri="http://schemas.openxmlformats.org/presentationml/2006/ole">
             <mc:AlternateContent xmlns:mc="http://schemas.openxmlformats.org/markup-compatibility/2006">
               <mc:Choice xmlns:v="urn:schemas-microsoft-com:vml" Requires="v">
-                <p:oleObj spid="_x0000_s4404" name="Equation" r:id="rId3" imgW="4368600" imgH="533160" progId="Equation.DSMT4">
+                <p:oleObj spid="_x0000_s4416" name="Equation" r:id="rId3" imgW="4368600" imgH="533160" progId="Equation.DSMT4">
                   <p:embed/>
                 </p:oleObj>
               </mc:Choice>
@@ -13030,7 +13030,7 @@
           <a:graphicData uri="http://schemas.openxmlformats.org/presentationml/2006/ole">
             <mc:AlternateContent xmlns:mc="http://schemas.openxmlformats.org/markup-compatibility/2006">
               <mc:Choice xmlns:v="urn:schemas-microsoft-com:vml" Requires="v">
-                <p:oleObj spid="_x0000_s4405" name="Equation" r:id="rId5" imgW="4089240" imgH="533160" progId="Equation.DSMT4">
+                <p:oleObj spid="_x0000_s4417" name="Equation" r:id="rId5" imgW="4089240" imgH="533160" progId="Equation.DSMT4">
                   <p:embed/>
                 </p:oleObj>
               </mc:Choice>
@@ -13087,7 +13087,7 @@
           <a:graphicData uri="http://schemas.openxmlformats.org/presentationml/2006/ole">
             <mc:AlternateContent xmlns:mc="http://schemas.openxmlformats.org/markup-compatibility/2006">
               <mc:Choice xmlns:v="urn:schemas-microsoft-com:vml" Requires="v">
-                <p:oleObj spid="_x0000_s4406" name="Equation" r:id="rId7" imgW="4101840" imgH="533160" progId="Equation.DSMT4">
+                <p:oleObj spid="_x0000_s4418" name="Equation" r:id="rId7" imgW="4101840" imgH="533160" progId="Equation.DSMT4">
                   <p:embed/>
                 </p:oleObj>
               </mc:Choice>
@@ -13204,7 +13204,7 @@
           <a:graphicData uri="http://schemas.openxmlformats.org/presentationml/2006/ole">
             <mc:AlternateContent xmlns:mc="http://schemas.openxmlformats.org/markup-compatibility/2006">
               <mc:Choice xmlns:v="urn:schemas-microsoft-com:vml" Requires="v">
-                <p:oleObj spid="_x0000_s5324" name="Equation" r:id="rId3" imgW="4470120" imgH="1244520" progId="Equation.DSMT4">
+                <p:oleObj spid="_x0000_s5332" name="Equation" r:id="rId3" imgW="4470120" imgH="1244520" progId="Equation.DSMT4">
                   <p:embed/>
                 </p:oleObj>
               </mc:Choice>
@@ -13261,7 +13261,7 @@
           <a:graphicData uri="http://schemas.openxmlformats.org/presentationml/2006/ole">
             <mc:AlternateContent xmlns:mc="http://schemas.openxmlformats.org/markup-compatibility/2006">
               <mc:Choice xmlns:v="urn:schemas-microsoft-com:vml" Requires="v">
-                <p:oleObj spid="_x0000_s5325" name="Equation" r:id="rId5" imgW="4495680" imgH="1244520" progId="Equation.DSMT4">
+                <p:oleObj spid="_x0000_s5333" name="Equation" r:id="rId5" imgW="4495680" imgH="1244520" progId="Equation.DSMT4">
                   <p:embed/>
                 </p:oleObj>
               </mc:Choice>
@@ -15846,7 +15846,7 @@
           <a:graphicData uri="http://schemas.openxmlformats.org/presentationml/2006/ole">
             <mc:AlternateContent xmlns:mc="http://schemas.openxmlformats.org/markup-compatibility/2006">
               <mc:Choice xmlns:v="urn:schemas-microsoft-com:vml" Requires="v">
-                <p:oleObj spid="_x0000_s6227" name="Equation" r:id="rId3" imgW="914400" imgH="190440" progId="Equation.DSMT4">
+                <p:oleObj spid="_x0000_s6231" name="Equation" r:id="rId3" imgW="914400" imgH="190440" progId="Equation.DSMT4">
                   <p:embed/>
                 </p:oleObj>
               </mc:Choice>

</xml_diff>

<commit_message>
Adding presentation week 2
</commit_message>
<xml_diff>
--- a/161702/presentation/01 - Syllabus, Review of PAA 1/01. Syllabus, Review of PAA 1.pptx
+++ b/161702/presentation/01 - Syllabus, Review of PAA 1/01. Syllabus, Review of PAA 1.pptx
@@ -2713,6 +2713,13 @@
         </dgm:presLayoutVars>
       </dgm:prSet>
       <dgm:spPr/>
+      <dgm:t>
+        <a:bodyPr/>
+        <a:lstStyle/>
+        <a:p>
+          <a:endParaRPr lang="en-US"/>
+        </a:p>
+      </dgm:t>
     </dgm:pt>
     <dgm:pt modelId="{445500B0-F324-410D-9A19-38DE8615FAE0}" type="pres">
       <dgm:prSet presAssocID="{9BBFAAE6-258D-45BE-83EF-4CC1C1B53B48}" presName="tSp" presStyleCnt="0"/>
@@ -2741,6 +2748,13 @@
         </dgm:presLayoutVars>
       </dgm:prSet>
       <dgm:spPr/>
+      <dgm:t>
+        <a:bodyPr/>
+        <a:lstStyle/>
+        <a:p>
+          <a:endParaRPr lang="en-US"/>
+        </a:p>
+      </dgm:t>
     </dgm:pt>
     <dgm:pt modelId="{C5C3795D-9639-446E-B772-21DF6A1AE184}" type="pres">
       <dgm:prSet presAssocID="{78FE7DA1-9E59-4351-A0C3-840B4CEC6B8B}" presName="childNode1tx" presStyleLbl="bgAcc1" presStyleIdx="0" presStyleCnt="3">
@@ -2749,6 +2763,13 @@
         </dgm:presLayoutVars>
       </dgm:prSet>
       <dgm:spPr/>
+      <dgm:t>
+        <a:bodyPr/>
+        <a:lstStyle/>
+        <a:p>
+          <a:endParaRPr lang="en-US"/>
+        </a:p>
+      </dgm:t>
     </dgm:pt>
     <dgm:pt modelId="{47C95866-64A5-47E9-80F8-FDB6E18B76FC}" type="pres">
       <dgm:prSet presAssocID="{78FE7DA1-9E59-4351-A0C3-840B4CEC6B8B}" presName="parentNode1" presStyleLbl="node1" presStyleIdx="0" presStyleCnt="3">
@@ -2758,6 +2779,13 @@
         </dgm:presLayoutVars>
       </dgm:prSet>
       <dgm:spPr/>
+      <dgm:t>
+        <a:bodyPr/>
+        <a:lstStyle/>
+        <a:p>
+          <a:endParaRPr lang="en-US"/>
+        </a:p>
+      </dgm:t>
     </dgm:pt>
     <dgm:pt modelId="{86104BD7-7E25-4710-87D2-17722B37CAE2}" type="pres">
       <dgm:prSet presAssocID="{78FE7DA1-9E59-4351-A0C3-840B4CEC6B8B}" presName="connSite1" presStyleCnt="0"/>
@@ -2766,6 +2794,13 @@
     <dgm:pt modelId="{9E995594-4D40-425B-B6C3-5192722DD04E}" type="pres">
       <dgm:prSet presAssocID="{42409908-29D1-4CE0-96E0-2193869AD446}" presName="Name9" presStyleLbl="sibTrans2D1" presStyleIdx="0" presStyleCnt="2"/>
       <dgm:spPr/>
+      <dgm:t>
+        <a:bodyPr/>
+        <a:lstStyle/>
+        <a:p>
+          <a:endParaRPr lang="en-US"/>
+        </a:p>
+      </dgm:t>
     </dgm:pt>
     <dgm:pt modelId="{547200FE-EAA2-4EF2-BFAB-8B03E5C4A54C}" type="pres">
       <dgm:prSet presAssocID="{F1AE3206-75CB-4280-A0BF-FBD4E28FFC84}" presName="composite2" presStyleCnt="0"/>
@@ -2782,6 +2817,13 @@
         </dgm:presLayoutVars>
       </dgm:prSet>
       <dgm:spPr/>
+      <dgm:t>
+        <a:bodyPr/>
+        <a:lstStyle/>
+        <a:p>
+          <a:endParaRPr lang="en-US"/>
+        </a:p>
+      </dgm:t>
     </dgm:pt>
     <dgm:pt modelId="{C833A0CD-1554-4189-9DEE-7765ED5001B0}" type="pres">
       <dgm:prSet presAssocID="{F1AE3206-75CB-4280-A0BF-FBD4E28FFC84}" presName="childNode2tx" presStyleLbl="bgAcc1" presStyleIdx="1" presStyleCnt="3">
@@ -2790,6 +2832,13 @@
         </dgm:presLayoutVars>
       </dgm:prSet>
       <dgm:spPr/>
+      <dgm:t>
+        <a:bodyPr/>
+        <a:lstStyle/>
+        <a:p>
+          <a:endParaRPr lang="en-US"/>
+        </a:p>
+      </dgm:t>
     </dgm:pt>
     <dgm:pt modelId="{72CDD254-7DB9-47C3-BDAB-1749354C558B}" type="pres">
       <dgm:prSet presAssocID="{F1AE3206-75CB-4280-A0BF-FBD4E28FFC84}" presName="parentNode2" presStyleLbl="node1" presStyleIdx="1" presStyleCnt="3">
@@ -2799,6 +2848,13 @@
         </dgm:presLayoutVars>
       </dgm:prSet>
       <dgm:spPr/>
+      <dgm:t>
+        <a:bodyPr/>
+        <a:lstStyle/>
+        <a:p>
+          <a:endParaRPr lang="en-US"/>
+        </a:p>
+      </dgm:t>
     </dgm:pt>
     <dgm:pt modelId="{2D235F5F-A454-4F8F-BC53-B8FFB8CC7BEB}" type="pres">
       <dgm:prSet presAssocID="{F1AE3206-75CB-4280-A0BF-FBD4E28FFC84}" presName="connSite2" presStyleCnt="0"/>
@@ -2807,6 +2863,13 @@
     <dgm:pt modelId="{17B402CA-3C9E-4FE9-BFE7-F11FFC449096}" type="pres">
       <dgm:prSet presAssocID="{C913CB2B-7253-4823-813D-F140198DFF7F}" presName="Name18" presStyleLbl="sibTrans2D1" presStyleIdx="1" presStyleCnt="2"/>
       <dgm:spPr/>
+      <dgm:t>
+        <a:bodyPr/>
+        <a:lstStyle/>
+        <a:p>
+          <a:endParaRPr lang="en-US"/>
+        </a:p>
+      </dgm:t>
     </dgm:pt>
     <dgm:pt modelId="{26AB677A-0428-4009-A77F-6009D46BFF40}" type="pres">
       <dgm:prSet presAssocID="{07ACBF5B-41EE-45BC-9F26-0C59BEB8E720}" presName="composite1" presStyleCnt="0"/>
@@ -2823,6 +2886,13 @@
         </dgm:presLayoutVars>
       </dgm:prSet>
       <dgm:spPr/>
+      <dgm:t>
+        <a:bodyPr/>
+        <a:lstStyle/>
+        <a:p>
+          <a:endParaRPr lang="en-US"/>
+        </a:p>
+      </dgm:t>
     </dgm:pt>
     <dgm:pt modelId="{DF91D674-87D8-43E1-B096-AF82EC896719}" type="pres">
       <dgm:prSet presAssocID="{07ACBF5B-41EE-45BC-9F26-0C59BEB8E720}" presName="childNode1tx" presStyleLbl="bgAcc1" presStyleIdx="2" presStyleCnt="3">
@@ -2831,6 +2901,13 @@
         </dgm:presLayoutVars>
       </dgm:prSet>
       <dgm:spPr/>
+      <dgm:t>
+        <a:bodyPr/>
+        <a:lstStyle/>
+        <a:p>
+          <a:endParaRPr lang="en-US"/>
+        </a:p>
+      </dgm:t>
     </dgm:pt>
     <dgm:pt modelId="{60055938-3D5E-4F77-8B65-9CC7ABF71EC1}" type="pres">
       <dgm:prSet presAssocID="{07ACBF5B-41EE-45BC-9F26-0C59BEB8E720}" presName="parentNode1" presStyleLbl="node1" presStyleIdx="2" presStyleCnt="3">
@@ -2840,6 +2917,13 @@
         </dgm:presLayoutVars>
       </dgm:prSet>
       <dgm:spPr/>
+      <dgm:t>
+        <a:bodyPr/>
+        <a:lstStyle/>
+        <a:p>
+          <a:endParaRPr lang="en-US"/>
+        </a:p>
+      </dgm:t>
     </dgm:pt>
     <dgm:pt modelId="{1B970AE4-B878-44C5-AC42-895103D3D5C1}" type="pres">
       <dgm:prSet presAssocID="{07ACBF5B-41EE-45BC-9F26-0C59BEB8E720}" presName="connSite1" presStyleCnt="0"/>
@@ -2847,27 +2931,27 @@
     </dgm:pt>
   </dgm:ptLst>
   <dgm:cxnLst>
+    <dgm:cxn modelId="{6E0F4F21-D8E1-4ECC-A0BE-B007C3A542A8}" type="presOf" srcId="{78FE7DA1-9E59-4351-A0C3-840B4CEC6B8B}" destId="{47C95866-64A5-47E9-80F8-FDB6E18B76FC}" srcOrd="0" destOrd="0" presId="urn:microsoft.com/office/officeart/2005/8/layout/hProcess4"/>
+    <dgm:cxn modelId="{2AD9506D-8678-4463-8BEE-674171AF029F}" type="presOf" srcId="{42409908-29D1-4CE0-96E0-2193869AD446}" destId="{9E995594-4D40-425B-B6C3-5192722DD04E}" srcOrd="0" destOrd="0" presId="urn:microsoft.com/office/officeart/2005/8/layout/hProcess4"/>
+    <dgm:cxn modelId="{9A03DF29-D4A9-43C6-87A3-654F141ACB50}" type="presOf" srcId="{DAD88AB1-D040-48C3-9C8A-C5BD0814DF57}" destId="{E89BAE0A-F2AE-4D7B-85FE-6E7861DA1276}" srcOrd="0" destOrd="1" presId="urn:microsoft.com/office/officeart/2005/8/layout/hProcess4"/>
+    <dgm:cxn modelId="{1BF90691-69FA-4B3C-9BFB-124A9070CC76}" srcId="{F1AE3206-75CB-4280-A0BF-FBD4E28FFC84}" destId="{5579AFF2-84FC-47E4-8BA4-5409DA1E0F8A}" srcOrd="0" destOrd="0" parTransId="{6147226A-24FC-4C60-A1E7-6F0211288257}" sibTransId="{C6A3F0BA-9969-4572-AA27-4A870FCACA99}"/>
+    <dgm:cxn modelId="{55E475BA-AED7-4BBB-9062-40C435BFB6BF}" type="presOf" srcId="{5579AFF2-84FC-47E4-8BA4-5409DA1E0F8A}" destId="{C833A0CD-1554-4189-9DEE-7765ED5001B0}" srcOrd="1" destOrd="0" presId="urn:microsoft.com/office/officeart/2005/8/layout/hProcess4"/>
+    <dgm:cxn modelId="{4B6E621A-9667-4643-A502-115AC47950EF}" type="presOf" srcId="{F1AE3206-75CB-4280-A0BF-FBD4E28FFC84}" destId="{72CDD254-7DB9-47C3-BDAB-1749354C558B}" srcOrd="0" destOrd="0" presId="urn:microsoft.com/office/officeart/2005/8/layout/hProcess4"/>
+    <dgm:cxn modelId="{4F925B48-E3E2-4575-A982-EA3C673A7878}" type="presOf" srcId="{76D81896-1C46-42DE-87D3-5A45E28CE80C}" destId="{E89BAE0A-F2AE-4D7B-85FE-6E7861DA1276}" srcOrd="0" destOrd="0" presId="urn:microsoft.com/office/officeart/2005/8/layout/hProcess4"/>
+    <dgm:cxn modelId="{57AFEE38-E877-4A2E-8EDD-6A59F3DAA36B}" type="presOf" srcId="{07ACBF5B-41EE-45BC-9F26-0C59BEB8E720}" destId="{60055938-3D5E-4F77-8B65-9CC7ABF71EC1}" srcOrd="0" destOrd="0" presId="urn:microsoft.com/office/officeart/2005/8/layout/hProcess4"/>
+    <dgm:cxn modelId="{81DF4524-15C8-4BC1-AFA2-39D58DBB5BD9}" srcId="{9BBFAAE6-258D-45BE-83EF-4CC1C1B53B48}" destId="{F1AE3206-75CB-4280-A0BF-FBD4E28FFC84}" srcOrd="1" destOrd="0" parTransId="{DD14A4E8-9146-447B-9D4F-BD7940A60ED5}" sibTransId="{C913CB2B-7253-4823-813D-F140198DFF7F}"/>
     <dgm:cxn modelId="{4044DEB9-691C-4B5E-94E7-BB340DA9878E}" type="presOf" srcId="{9BBFAAE6-258D-45BE-83EF-4CC1C1B53B48}" destId="{C547005F-C70B-42E0-98DD-253002E640A0}" srcOrd="0" destOrd="0" presId="urn:microsoft.com/office/officeart/2005/8/layout/hProcess4"/>
-    <dgm:cxn modelId="{9B8B33AF-C9FF-4CB0-805E-3818BD96E2EA}" type="presOf" srcId="{6D643C8B-D23F-468C-8A3A-6D9C4F65202B}" destId="{C5C3795D-9639-446E-B772-21DF6A1AE184}" srcOrd="1" destOrd="0" presId="urn:microsoft.com/office/officeart/2005/8/layout/hProcess4"/>
+    <dgm:cxn modelId="{C419C141-0DA2-4652-B644-626B5ADDE819}" srcId="{07ACBF5B-41EE-45BC-9F26-0C59BEB8E720}" destId="{DAD88AB1-D040-48C3-9C8A-C5BD0814DF57}" srcOrd="1" destOrd="0" parTransId="{57F1F36D-4BCB-46EE-8070-28BF61EB7FA9}" sibTransId="{26EA948E-21DD-4D97-950B-3897246E1E8C}"/>
+    <dgm:cxn modelId="{1984DA53-B032-42BA-8C18-668DB615D106}" srcId="{9BBFAAE6-258D-45BE-83EF-4CC1C1B53B48}" destId="{07ACBF5B-41EE-45BC-9F26-0C59BEB8E720}" srcOrd="2" destOrd="0" parTransId="{9789B8F6-2FE2-460A-95DE-572065C04CB2}" sibTransId="{5132266D-CE6E-4715-BB65-9A9D0BCDF2EB}"/>
+    <dgm:cxn modelId="{CB30325B-E022-417C-B6A5-90DC48FD5215}" type="presOf" srcId="{5579AFF2-84FC-47E4-8BA4-5409DA1E0F8A}" destId="{DDC744F6-E538-44A1-8F96-92ACE8690B9B}" srcOrd="0" destOrd="0" presId="urn:microsoft.com/office/officeart/2005/8/layout/hProcess4"/>
     <dgm:cxn modelId="{75AE2E8B-629F-4076-9E27-9EDE7570E091}" type="presOf" srcId="{C913CB2B-7253-4823-813D-F140198DFF7F}" destId="{17B402CA-3C9E-4FE9-BFE7-F11FFC449096}" srcOrd="0" destOrd="0" presId="urn:microsoft.com/office/officeart/2005/8/layout/hProcess4"/>
     <dgm:cxn modelId="{A383C5A5-2490-432D-9838-67CB132EE4A4}" srcId="{78FE7DA1-9E59-4351-A0C3-840B4CEC6B8B}" destId="{6D643C8B-D23F-468C-8A3A-6D9C4F65202B}" srcOrd="0" destOrd="0" parTransId="{601B77FF-C486-4C1A-9A99-A4428C52C768}" sibTransId="{81156465-3098-4FBF-8422-ED00F14E8B6C}"/>
-    <dgm:cxn modelId="{81DF4524-15C8-4BC1-AFA2-39D58DBB5BD9}" srcId="{9BBFAAE6-258D-45BE-83EF-4CC1C1B53B48}" destId="{F1AE3206-75CB-4280-A0BF-FBD4E28FFC84}" srcOrd="1" destOrd="0" parTransId="{DD14A4E8-9146-447B-9D4F-BD7940A60ED5}" sibTransId="{C913CB2B-7253-4823-813D-F140198DFF7F}"/>
-    <dgm:cxn modelId="{57AFEE38-E877-4A2E-8EDD-6A59F3DAA36B}" type="presOf" srcId="{07ACBF5B-41EE-45BC-9F26-0C59BEB8E720}" destId="{60055938-3D5E-4F77-8B65-9CC7ABF71EC1}" srcOrd="0" destOrd="0" presId="urn:microsoft.com/office/officeart/2005/8/layout/hProcess4"/>
-    <dgm:cxn modelId="{1984DA53-B032-42BA-8C18-668DB615D106}" srcId="{9BBFAAE6-258D-45BE-83EF-4CC1C1B53B48}" destId="{07ACBF5B-41EE-45BC-9F26-0C59BEB8E720}" srcOrd="2" destOrd="0" parTransId="{9789B8F6-2FE2-460A-95DE-572065C04CB2}" sibTransId="{5132266D-CE6E-4715-BB65-9A9D0BCDF2EB}"/>
-    <dgm:cxn modelId="{4B6E621A-9667-4643-A502-115AC47950EF}" type="presOf" srcId="{F1AE3206-75CB-4280-A0BF-FBD4E28FFC84}" destId="{72CDD254-7DB9-47C3-BDAB-1749354C558B}" srcOrd="0" destOrd="0" presId="urn:microsoft.com/office/officeart/2005/8/layout/hProcess4"/>
+    <dgm:cxn modelId="{369298E0-B03F-4393-ABCB-D96AE4B1CDC7}" srcId="{9BBFAAE6-258D-45BE-83EF-4CC1C1B53B48}" destId="{78FE7DA1-9E59-4351-A0C3-840B4CEC6B8B}" srcOrd="0" destOrd="0" parTransId="{ECF79735-E5EC-4733-BC81-A8A28CC7A6FF}" sibTransId="{42409908-29D1-4CE0-96E0-2193869AD446}"/>
+    <dgm:cxn modelId="{1D005D69-BC60-4D82-AE4C-07DA63AA60FF}" type="presOf" srcId="{DAD88AB1-D040-48C3-9C8A-C5BD0814DF57}" destId="{DF91D674-87D8-43E1-B096-AF82EC896719}" srcOrd="1" destOrd="1" presId="urn:microsoft.com/office/officeart/2005/8/layout/hProcess4"/>
+    <dgm:cxn modelId="{9B8B33AF-C9FF-4CB0-805E-3818BD96E2EA}" type="presOf" srcId="{6D643C8B-D23F-468C-8A3A-6D9C4F65202B}" destId="{C5C3795D-9639-446E-B772-21DF6A1AE184}" srcOrd="1" destOrd="0" presId="urn:microsoft.com/office/officeart/2005/8/layout/hProcess4"/>
+    <dgm:cxn modelId="{067FDA65-92B1-4E83-8827-9FC8FEBFB00E}" type="presOf" srcId="{76D81896-1C46-42DE-87D3-5A45E28CE80C}" destId="{DF91D674-87D8-43E1-B096-AF82EC896719}" srcOrd="1" destOrd="0" presId="urn:microsoft.com/office/officeart/2005/8/layout/hProcess4"/>
     <dgm:cxn modelId="{16D1C678-B8E9-4387-95EB-916E8C5D300C}" srcId="{07ACBF5B-41EE-45BC-9F26-0C59BEB8E720}" destId="{76D81896-1C46-42DE-87D3-5A45E28CE80C}" srcOrd="0" destOrd="0" parTransId="{30AF906F-9AC3-4441-881D-77F5666055FD}" sibTransId="{BEA812B5-BB26-4762-ADE9-6F862D145942}"/>
-    <dgm:cxn modelId="{55E475BA-AED7-4BBB-9062-40C435BFB6BF}" type="presOf" srcId="{5579AFF2-84FC-47E4-8BA4-5409DA1E0F8A}" destId="{C833A0CD-1554-4189-9DEE-7765ED5001B0}" srcOrd="1" destOrd="0" presId="urn:microsoft.com/office/officeart/2005/8/layout/hProcess4"/>
-    <dgm:cxn modelId="{1BF90691-69FA-4B3C-9BFB-124A9070CC76}" srcId="{F1AE3206-75CB-4280-A0BF-FBD4E28FFC84}" destId="{5579AFF2-84FC-47E4-8BA4-5409DA1E0F8A}" srcOrd="0" destOrd="0" parTransId="{6147226A-24FC-4C60-A1E7-6F0211288257}" sibTransId="{C6A3F0BA-9969-4572-AA27-4A870FCACA99}"/>
-    <dgm:cxn modelId="{6E0F4F21-D8E1-4ECC-A0BE-B007C3A542A8}" type="presOf" srcId="{78FE7DA1-9E59-4351-A0C3-840B4CEC6B8B}" destId="{47C95866-64A5-47E9-80F8-FDB6E18B76FC}" srcOrd="0" destOrd="0" presId="urn:microsoft.com/office/officeart/2005/8/layout/hProcess4"/>
-    <dgm:cxn modelId="{CB30325B-E022-417C-B6A5-90DC48FD5215}" type="presOf" srcId="{5579AFF2-84FC-47E4-8BA4-5409DA1E0F8A}" destId="{DDC744F6-E538-44A1-8F96-92ACE8690B9B}" srcOrd="0" destOrd="0" presId="urn:microsoft.com/office/officeart/2005/8/layout/hProcess4"/>
-    <dgm:cxn modelId="{1D005D69-BC60-4D82-AE4C-07DA63AA60FF}" type="presOf" srcId="{DAD88AB1-D040-48C3-9C8A-C5BD0814DF57}" destId="{DF91D674-87D8-43E1-B096-AF82EC896719}" srcOrd="1" destOrd="1" presId="urn:microsoft.com/office/officeart/2005/8/layout/hProcess4"/>
-    <dgm:cxn modelId="{9A03DF29-D4A9-43C6-87A3-654F141ACB50}" type="presOf" srcId="{DAD88AB1-D040-48C3-9C8A-C5BD0814DF57}" destId="{E89BAE0A-F2AE-4D7B-85FE-6E7861DA1276}" srcOrd="0" destOrd="1" presId="urn:microsoft.com/office/officeart/2005/8/layout/hProcess4"/>
     <dgm:cxn modelId="{EDB19DA6-8BEE-4626-9FC4-A68D1069A869}" type="presOf" srcId="{6D643C8B-D23F-468C-8A3A-6D9C4F65202B}" destId="{3FD38DDF-DF88-4B13-841F-7C239A8C582F}" srcOrd="0" destOrd="0" presId="urn:microsoft.com/office/officeart/2005/8/layout/hProcess4"/>
-    <dgm:cxn modelId="{C419C141-0DA2-4652-B644-626B5ADDE819}" srcId="{07ACBF5B-41EE-45BC-9F26-0C59BEB8E720}" destId="{DAD88AB1-D040-48C3-9C8A-C5BD0814DF57}" srcOrd="1" destOrd="0" parTransId="{57F1F36D-4BCB-46EE-8070-28BF61EB7FA9}" sibTransId="{26EA948E-21DD-4D97-950B-3897246E1E8C}"/>
-    <dgm:cxn modelId="{2AD9506D-8678-4463-8BEE-674171AF029F}" type="presOf" srcId="{42409908-29D1-4CE0-96E0-2193869AD446}" destId="{9E995594-4D40-425B-B6C3-5192722DD04E}" srcOrd="0" destOrd="0" presId="urn:microsoft.com/office/officeart/2005/8/layout/hProcess4"/>
-    <dgm:cxn modelId="{4F925B48-E3E2-4575-A982-EA3C673A7878}" type="presOf" srcId="{76D81896-1C46-42DE-87D3-5A45E28CE80C}" destId="{E89BAE0A-F2AE-4D7B-85FE-6E7861DA1276}" srcOrd="0" destOrd="0" presId="urn:microsoft.com/office/officeart/2005/8/layout/hProcess4"/>
-    <dgm:cxn modelId="{369298E0-B03F-4393-ABCB-D96AE4B1CDC7}" srcId="{9BBFAAE6-258D-45BE-83EF-4CC1C1B53B48}" destId="{78FE7DA1-9E59-4351-A0C3-840B4CEC6B8B}" srcOrd="0" destOrd="0" parTransId="{ECF79735-E5EC-4733-BC81-A8A28CC7A6FF}" sibTransId="{42409908-29D1-4CE0-96E0-2193869AD446}"/>
-    <dgm:cxn modelId="{067FDA65-92B1-4E83-8827-9FC8FEBFB00E}" type="presOf" srcId="{76D81896-1C46-42DE-87D3-5A45E28CE80C}" destId="{DF91D674-87D8-43E1-B096-AF82EC896719}" srcOrd="1" destOrd="0" presId="urn:microsoft.com/office/officeart/2005/8/layout/hProcess4"/>
     <dgm:cxn modelId="{CFA2BAA9-22F0-4B27-82E2-782E822111FE}" type="presParOf" srcId="{C547005F-C70B-42E0-98DD-253002E640A0}" destId="{445500B0-F324-410D-9A19-38DE8615FAE0}" srcOrd="0" destOrd="0" presId="urn:microsoft.com/office/officeart/2005/8/layout/hProcess4"/>
     <dgm:cxn modelId="{CEDFB3DF-35B9-4F98-9D58-BD8D09C9C3AA}" type="presParOf" srcId="{C547005F-C70B-42E0-98DD-253002E640A0}" destId="{C222B8B3-271E-4191-9D8A-5E74AB504B1D}" srcOrd="1" destOrd="0" presId="urn:microsoft.com/office/officeart/2005/8/layout/hProcess4"/>
     <dgm:cxn modelId="{326AF4E5-006C-4A22-AD25-94CEC5828B60}" type="presParOf" srcId="{C547005F-C70B-42E0-98DD-253002E640A0}" destId="{FB7D34AD-BE76-4310-A51E-50FA1E8BF49B}" srcOrd="2" destOrd="0" presId="urn:microsoft.com/office/officeart/2005/8/layout/hProcess4"/>
@@ -3004,6 +3088,13 @@
         </dgm:presLayoutVars>
       </dgm:prSet>
       <dgm:spPr/>
+      <dgm:t>
+        <a:bodyPr/>
+        <a:lstStyle/>
+        <a:p>
+          <a:endParaRPr lang="en-US"/>
+        </a:p>
+      </dgm:t>
     </dgm:pt>
     <dgm:pt modelId="{59BEBBC8-2151-4B59-BA25-A8495CBB2170}" type="pres">
       <dgm:prSet presAssocID="{1A7B5DD4-8482-445B-8DEE-786314DD7AE5}" presName="node" presStyleLbl="node1" presStyleIdx="0" presStyleCnt="2">
@@ -3023,10 +3114,24 @@
     <dgm:pt modelId="{2640DD53-E18C-476B-8D00-62CF4361DCA0}" type="pres">
       <dgm:prSet presAssocID="{4CC63B35-E6E4-4BE7-B0DB-E1A2C0D1506D}" presName="sibTrans" presStyleLbl="sibTrans2D1" presStyleIdx="0" presStyleCnt="1"/>
       <dgm:spPr/>
+      <dgm:t>
+        <a:bodyPr/>
+        <a:lstStyle/>
+        <a:p>
+          <a:endParaRPr lang="en-US"/>
+        </a:p>
+      </dgm:t>
     </dgm:pt>
     <dgm:pt modelId="{FC92ACD2-DF3E-4B31-A225-935F55BF57F4}" type="pres">
       <dgm:prSet presAssocID="{4CC63B35-E6E4-4BE7-B0DB-E1A2C0D1506D}" presName="connectorText" presStyleLbl="sibTrans2D1" presStyleIdx="0" presStyleCnt="1"/>
       <dgm:spPr/>
+      <dgm:t>
+        <a:bodyPr/>
+        <a:lstStyle/>
+        <a:p>
+          <a:endParaRPr lang="en-US"/>
+        </a:p>
+      </dgm:t>
     </dgm:pt>
     <dgm:pt modelId="{1EE0288E-7DEE-4029-9523-5BB6B52E5940}" type="pres">
       <dgm:prSet presAssocID="{2B060916-2C74-4F54-B694-C5408B72CFD0}" presName="node" presStyleLbl="node1" presStyleIdx="1" presStyleCnt="2">
@@ -3045,13 +3150,13 @@
     </dgm:pt>
   </dgm:ptLst>
   <dgm:cxnLst>
+    <dgm:cxn modelId="{4E78C071-00DE-4084-BF74-03C90D20542F}" type="presOf" srcId="{4CC63B35-E6E4-4BE7-B0DB-E1A2C0D1506D}" destId="{FC92ACD2-DF3E-4B31-A225-935F55BF57F4}" srcOrd="1" destOrd="0" presId="urn:microsoft.com/office/officeart/2005/8/layout/process5"/>
+    <dgm:cxn modelId="{A0322CD6-DDB0-431D-BE5E-F0B3F0A1DC46}" type="presOf" srcId="{1A7B5DD4-8482-445B-8DEE-786314DD7AE5}" destId="{59BEBBC8-2151-4B59-BA25-A8495CBB2170}" srcOrd="0" destOrd="0" presId="urn:microsoft.com/office/officeart/2005/8/layout/process5"/>
+    <dgm:cxn modelId="{82DB7744-CDB6-45DE-A89C-AD6E919BFE1D}" type="presOf" srcId="{4CC63B35-E6E4-4BE7-B0DB-E1A2C0D1506D}" destId="{2640DD53-E18C-476B-8D00-62CF4361DCA0}" srcOrd="0" destOrd="0" presId="urn:microsoft.com/office/officeart/2005/8/layout/process5"/>
+    <dgm:cxn modelId="{677F8D9D-FD39-41BF-AB29-FDEBC372200A}" type="presOf" srcId="{2B060916-2C74-4F54-B694-C5408B72CFD0}" destId="{1EE0288E-7DEE-4029-9523-5BB6B52E5940}" srcOrd="0" destOrd="0" presId="urn:microsoft.com/office/officeart/2005/8/layout/process5"/>
     <dgm:cxn modelId="{96BB573A-D4CB-4488-8261-B9DC7B01A84F}" srcId="{1B7011AC-E756-440E-81AC-4DF9E16F9C52}" destId="{1A7B5DD4-8482-445B-8DEE-786314DD7AE5}" srcOrd="0" destOrd="0" parTransId="{7B412554-7DAD-48A8-8C12-D55AAD805B43}" sibTransId="{4CC63B35-E6E4-4BE7-B0DB-E1A2C0D1506D}"/>
     <dgm:cxn modelId="{3A37A281-A04C-4AF6-99F8-2FC117308EC3}" type="presOf" srcId="{1B7011AC-E756-440E-81AC-4DF9E16F9C52}" destId="{576A4653-B346-46C5-8C35-024745C9D83A}" srcOrd="0" destOrd="0" presId="urn:microsoft.com/office/officeart/2005/8/layout/process5"/>
-    <dgm:cxn modelId="{A0322CD6-DDB0-431D-BE5E-F0B3F0A1DC46}" type="presOf" srcId="{1A7B5DD4-8482-445B-8DEE-786314DD7AE5}" destId="{59BEBBC8-2151-4B59-BA25-A8495CBB2170}" srcOrd="0" destOrd="0" presId="urn:microsoft.com/office/officeart/2005/8/layout/process5"/>
-    <dgm:cxn modelId="{4E78C071-00DE-4084-BF74-03C90D20542F}" type="presOf" srcId="{4CC63B35-E6E4-4BE7-B0DB-E1A2C0D1506D}" destId="{FC92ACD2-DF3E-4B31-A225-935F55BF57F4}" srcOrd="1" destOrd="0" presId="urn:microsoft.com/office/officeart/2005/8/layout/process5"/>
     <dgm:cxn modelId="{D1EB4DBC-1D74-40FF-80FE-FE5C064FB0F2}" srcId="{1B7011AC-E756-440E-81AC-4DF9E16F9C52}" destId="{2B060916-2C74-4F54-B694-C5408B72CFD0}" srcOrd="1" destOrd="0" parTransId="{2B71E673-0AAA-4D41-9DF4-EEBB83AB31AB}" sibTransId="{9225931A-FC25-4F69-9597-716CFBEE9932}"/>
-    <dgm:cxn modelId="{82DB7744-CDB6-45DE-A89C-AD6E919BFE1D}" type="presOf" srcId="{4CC63B35-E6E4-4BE7-B0DB-E1A2C0D1506D}" destId="{2640DD53-E18C-476B-8D00-62CF4361DCA0}" srcOrd="0" destOrd="0" presId="urn:microsoft.com/office/officeart/2005/8/layout/process5"/>
-    <dgm:cxn modelId="{677F8D9D-FD39-41BF-AB29-FDEBC372200A}" type="presOf" srcId="{2B060916-2C74-4F54-B694-C5408B72CFD0}" destId="{1EE0288E-7DEE-4029-9523-5BB6B52E5940}" srcOrd="0" destOrd="0" presId="urn:microsoft.com/office/officeart/2005/8/layout/process5"/>
     <dgm:cxn modelId="{237F7912-A85E-4092-8C06-C748BB64B7D8}" type="presParOf" srcId="{576A4653-B346-46C5-8C35-024745C9D83A}" destId="{59BEBBC8-2151-4B59-BA25-A8495CBB2170}" srcOrd="0" destOrd="0" presId="urn:microsoft.com/office/officeart/2005/8/layout/process5"/>
     <dgm:cxn modelId="{55D2AA25-67F7-4A2F-9E23-F9992CF7EC7A}" type="presParOf" srcId="{576A4653-B346-46C5-8C35-024745C9D83A}" destId="{2640DD53-E18C-476B-8D00-62CF4361DCA0}" srcOrd="1" destOrd="0" presId="urn:microsoft.com/office/officeart/2005/8/layout/process5"/>
     <dgm:cxn modelId="{E4892C76-C02E-4618-931C-EF64137CABDA}" type="presParOf" srcId="{2640DD53-E18C-476B-8D00-62CF4361DCA0}" destId="{FC92ACD2-DF3E-4B31-A225-935F55BF57F4}" srcOrd="0" destOrd="0" presId="urn:microsoft.com/office/officeart/2005/8/layout/process5"/>
@@ -3169,6 +3274,13 @@
         </dgm:presLayoutVars>
       </dgm:prSet>
       <dgm:spPr/>
+      <dgm:t>
+        <a:bodyPr/>
+        <a:lstStyle/>
+        <a:p>
+          <a:endParaRPr lang="en-US"/>
+        </a:p>
+      </dgm:t>
     </dgm:pt>
     <dgm:pt modelId="{59BEBBC8-2151-4B59-BA25-A8495CBB2170}" type="pres">
       <dgm:prSet presAssocID="{1A7B5DD4-8482-445B-8DEE-786314DD7AE5}" presName="node" presStyleLbl="node1" presStyleIdx="0" presStyleCnt="2">
@@ -3188,10 +3300,24 @@
     <dgm:pt modelId="{2640DD53-E18C-476B-8D00-62CF4361DCA0}" type="pres">
       <dgm:prSet presAssocID="{4CC63B35-E6E4-4BE7-B0DB-E1A2C0D1506D}" presName="sibTrans" presStyleLbl="sibTrans2D1" presStyleIdx="0" presStyleCnt="1"/>
       <dgm:spPr/>
+      <dgm:t>
+        <a:bodyPr/>
+        <a:lstStyle/>
+        <a:p>
+          <a:endParaRPr lang="en-US"/>
+        </a:p>
+      </dgm:t>
     </dgm:pt>
     <dgm:pt modelId="{FC92ACD2-DF3E-4B31-A225-935F55BF57F4}" type="pres">
       <dgm:prSet presAssocID="{4CC63B35-E6E4-4BE7-B0DB-E1A2C0D1506D}" presName="connectorText" presStyleLbl="sibTrans2D1" presStyleIdx="0" presStyleCnt="1"/>
       <dgm:spPr/>
+      <dgm:t>
+        <a:bodyPr/>
+        <a:lstStyle/>
+        <a:p>
+          <a:endParaRPr lang="en-US"/>
+        </a:p>
+      </dgm:t>
     </dgm:pt>
     <dgm:pt modelId="{1EE0288E-7DEE-4029-9523-5BB6B52E5940}" type="pres">
       <dgm:prSet presAssocID="{2B060916-2C74-4F54-B694-C5408B72CFD0}" presName="node" presStyleLbl="node1" presStyleIdx="1" presStyleCnt="2">
@@ -8429,7 +8555,7 @@
           <a:p>
             <a:fld id="{54A0D01E-5226-49DB-B876-7FE474C4AC43}" type="datetimeFigureOut">
               <a:rPr lang="en-US" smtClean="0"/>
-              <a:t>2/6/2017</a:t>
+              <a:t>2/13/2017</a:t>
             </a:fld>
             <a:endParaRPr lang="en-US"/>
           </a:p>
@@ -8912,7 +9038,7 @@
           <a:p>
             <a:fld id="{98558AF6-4215-4AC6-9EE0-A56FB7B1541C}" type="datetimeFigureOut">
               <a:rPr lang="en-US" smtClean="0"/>
-              <a:t>2/6/2017</a:t>
+              <a:t>2/13/2017</a:t>
             </a:fld>
             <a:endParaRPr lang="en-US"/>
           </a:p>
@@ -9082,7 +9208,7 @@
           <a:p>
             <a:fld id="{98558AF6-4215-4AC6-9EE0-A56FB7B1541C}" type="datetimeFigureOut">
               <a:rPr lang="en-US" smtClean="0"/>
-              <a:t>2/6/2017</a:t>
+              <a:t>2/13/2017</a:t>
             </a:fld>
             <a:endParaRPr lang="en-US"/>
           </a:p>
@@ -9262,7 +9388,7 @@
           <a:p>
             <a:fld id="{98558AF6-4215-4AC6-9EE0-A56FB7B1541C}" type="datetimeFigureOut">
               <a:rPr lang="en-US" smtClean="0"/>
-              <a:t>2/6/2017</a:t>
+              <a:t>2/13/2017</a:t>
             </a:fld>
             <a:endParaRPr lang="en-US"/>
           </a:p>
@@ -9432,7 +9558,7 @@
           <a:p>
             <a:fld id="{98558AF6-4215-4AC6-9EE0-A56FB7B1541C}" type="datetimeFigureOut">
               <a:rPr lang="en-US" smtClean="0"/>
-              <a:t>2/6/2017</a:t>
+              <a:t>2/13/2017</a:t>
             </a:fld>
             <a:endParaRPr lang="en-US"/>
           </a:p>
@@ -9676,7 +9802,7 @@
           <a:p>
             <a:fld id="{98558AF6-4215-4AC6-9EE0-A56FB7B1541C}" type="datetimeFigureOut">
               <a:rPr lang="en-US" smtClean="0"/>
-              <a:t>2/6/2017</a:t>
+              <a:t>2/13/2017</a:t>
             </a:fld>
             <a:endParaRPr lang="en-US"/>
           </a:p>
@@ -9908,7 +10034,7 @@
           <a:p>
             <a:fld id="{98558AF6-4215-4AC6-9EE0-A56FB7B1541C}" type="datetimeFigureOut">
               <a:rPr lang="en-US" smtClean="0"/>
-              <a:t>2/6/2017</a:t>
+              <a:t>2/13/2017</a:t>
             </a:fld>
             <a:endParaRPr lang="en-US"/>
           </a:p>
@@ -10275,7 +10401,7 @@
           <a:p>
             <a:fld id="{98558AF6-4215-4AC6-9EE0-A56FB7B1541C}" type="datetimeFigureOut">
               <a:rPr lang="en-US" smtClean="0"/>
-              <a:t>2/6/2017</a:t>
+              <a:t>2/13/2017</a:t>
             </a:fld>
             <a:endParaRPr lang="en-US"/>
           </a:p>
@@ -10393,7 +10519,7 @@
           <a:p>
             <a:fld id="{98558AF6-4215-4AC6-9EE0-A56FB7B1541C}" type="datetimeFigureOut">
               <a:rPr lang="en-US" smtClean="0"/>
-              <a:t>2/6/2017</a:t>
+              <a:t>2/13/2017</a:t>
             </a:fld>
             <a:endParaRPr lang="en-US"/>
           </a:p>
@@ -10488,7 +10614,7 @@
           <a:p>
             <a:fld id="{98558AF6-4215-4AC6-9EE0-A56FB7B1541C}" type="datetimeFigureOut">
               <a:rPr lang="en-US" smtClean="0"/>
-              <a:t>2/6/2017</a:t>
+              <a:t>2/13/2017</a:t>
             </a:fld>
             <a:endParaRPr lang="en-US"/>
           </a:p>
@@ -10765,7 +10891,7 @@
           <a:p>
             <a:fld id="{98558AF6-4215-4AC6-9EE0-A56FB7B1541C}" type="datetimeFigureOut">
               <a:rPr lang="en-US" smtClean="0"/>
-              <a:t>2/6/2017</a:t>
+              <a:t>2/13/2017</a:t>
             </a:fld>
             <a:endParaRPr lang="en-US"/>
           </a:p>
@@ -11022,7 +11148,7 @@
           <a:p>
             <a:fld id="{98558AF6-4215-4AC6-9EE0-A56FB7B1541C}" type="datetimeFigureOut">
               <a:rPr lang="en-US" smtClean="0"/>
-              <a:t>2/6/2017</a:t>
+              <a:t>2/13/2017</a:t>
             </a:fld>
             <a:endParaRPr lang="en-US"/>
           </a:p>
@@ -11235,7 +11361,7 @@
           <a:p>
             <a:fld id="{98558AF6-4215-4AC6-9EE0-A56FB7B1541C}" type="datetimeFigureOut">
               <a:rPr lang="en-US" smtClean="0"/>
-              <a:t>2/6/2017</a:t>
+              <a:t>2/13/2017</a:t>
             </a:fld>
             <a:endParaRPr lang="en-US"/>
           </a:p>
@@ -11672,15 +11798,7 @@
           <a:p>
             <a:r>
               <a:rPr lang="en-US" dirty="0" smtClean="0"/>
-              <a:t>01. Introduction, Review of </a:t>
-            </a:r>
-            <a:r>
-              <a:rPr lang="en-US" dirty="0" smtClean="0"/>
-              <a:t>DAA </a:t>
-            </a:r>
-            <a:r>
-              <a:rPr lang="en-US" dirty="0" smtClean="0"/>
-              <a:t>1</a:t>
+              <a:t>01. Introduction, Review of DAA 1</a:t>
             </a:r>
             <a:endParaRPr lang="en-US" dirty="0"/>
           </a:p>
@@ -11707,11 +11825,7 @@
             </a:r>
             <a:r>
               <a:rPr lang="en-US" smtClean="0"/>
-              <a:t>of </a:t>
-            </a:r>
-            <a:r>
-              <a:rPr lang="en-US" smtClean="0"/>
-              <a:t>Algorithm (DAA) </a:t>
+              <a:t>of Algorithm (DAA) </a:t>
             </a:r>
             <a:r>
               <a:rPr lang="en-US" dirty="0" smtClean="0"/>
@@ -11809,11 +11923,7 @@
           <a:p>
             <a:r>
               <a:rPr lang="en-US" dirty="0" smtClean="0"/>
-              <a:t>Pseudocode </a:t>
-            </a:r>
-            <a:r>
-              <a:rPr lang="en-US" dirty="0" smtClean="0"/>
-              <a:t>convention</a:t>
+              <a:t>Pseudocode convention</a:t>
             </a:r>
           </a:p>
           <a:p>
@@ -11827,7 +11937,6 @@
               <a:rPr lang="en-US" dirty="0" smtClean="0"/>
               <a:t>Asymptotic Notation</a:t>
             </a:r>
-            <a:endParaRPr lang="en-US" dirty="0" smtClean="0"/>
           </a:p>
           <a:p>
             <a:endParaRPr lang="en-US" dirty="0"/>
@@ -12230,7 +12339,7 @@
           <a:graphicData uri="http://schemas.openxmlformats.org/presentationml/2006/ole">
             <mc:AlternateContent xmlns:mc="http://schemas.openxmlformats.org/markup-compatibility/2006">
               <mc:Choice xmlns:v="urn:schemas-microsoft-com:vml" Requires="v">
-                <p:oleObj spid="_x0000_s3353" name="Equation" r:id="rId3" imgW="1346040" imgH="253800" progId="Equation.DSMT4">
+                <p:oleObj spid="_x0000_s3356" name="Equation" r:id="rId3" imgW="1346040" imgH="253800" progId="Equation.DSMT4">
                   <p:embed/>
                 </p:oleObj>
               </mc:Choice>
@@ -12287,7 +12396,7 @@
           <a:graphicData uri="http://schemas.openxmlformats.org/presentationml/2006/ole">
             <mc:AlternateContent xmlns:mc="http://schemas.openxmlformats.org/markup-compatibility/2006">
               <mc:Choice xmlns:v="urn:schemas-microsoft-com:vml" Requires="v">
-                <p:oleObj spid="_x0000_s3354" name="Equation" r:id="rId5" imgW="1549080" imgH="1523880" progId="Equation.DSMT4">
+                <p:oleObj spid="_x0000_s3357" name="Equation" r:id="rId5" imgW="1549080" imgH="1523880" progId="Equation.DSMT4">
                   <p:embed/>
                 </p:oleObj>
               </mc:Choice>
@@ -12344,7 +12453,7 @@
           <a:graphicData uri="http://schemas.openxmlformats.org/presentationml/2006/ole">
             <mc:AlternateContent xmlns:mc="http://schemas.openxmlformats.org/markup-compatibility/2006">
               <mc:Choice xmlns:v="urn:schemas-microsoft-com:vml" Requires="v">
-                <p:oleObj spid="_x0000_s3355" name="Equation" r:id="rId7" imgW="2361960" imgH="253800" progId="Equation.DSMT4">
+                <p:oleObj spid="_x0000_s3358" name="Equation" r:id="rId7" imgW="2361960" imgH="253800" progId="Equation.DSMT4">
                   <p:embed/>
                 </p:oleObj>
               </mc:Choice>
@@ -12490,7 +12599,7 @@
           <a:graphicData uri="http://schemas.openxmlformats.org/presentationml/2006/ole">
             <mc:AlternateContent xmlns:mc="http://schemas.openxmlformats.org/markup-compatibility/2006">
               <mc:Choice xmlns:v="urn:schemas-microsoft-com:vml" Requires="v">
-                <p:oleObj spid="_x0000_s1136" name="Equation" r:id="rId4" imgW="1346040" imgH="253800" progId="Equation.DSMT4">
+                <p:oleObj spid="_x0000_s1137" name="Equation" r:id="rId4" imgW="1346040" imgH="253800" progId="Equation.DSMT4">
                   <p:embed/>
                 </p:oleObj>
               </mc:Choice>
@@ -12691,7 +12800,7 @@
           <a:graphicData uri="http://schemas.openxmlformats.org/presentationml/2006/ole">
             <mc:AlternateContent xmlns:mc="http://schemas.openxmlformats.org/markup-compatibility/2006">
               <mc:Choice xmlns:v="urn:schemas-microsoft-com:vml" Requires="v">
-                <p:oleObj spid="_x0000_s2256" name="Equation" r:id="rId3" imgW="1346040" imgH="1638000" progId="Equation.DSMT4">
+                <p:oleObj spid="_x0000_s2258" name="Equation" r:id="rId3" imgW="1346040" imgH="1638000" progId="Equation.DSMT4">
                   <p:embed/>
                 </p:oleObj>
               </mc:Choice>
@@ -12748,7 +12857,7 @@
           <a:graphicData uri="http://schemas.openxmlformats.org/presentationml/2006/ole">
             <mc:AlternateContent xmlns:mc="http://schemas.openxmlformats.org/markup-compatibility/2006">
               <mc:Choice xmlns:v="urn:schemas-microsoft-com:vml" Requires="v">
-                <p:oleObj spid="_x0000_s2257" name="Equation" r:id="rId5" imgW="1104840" imgH="482400" progId="Equation.DSMT4">
+                <p:oleObj spid="_x0000_s2259" name="Equation" r:id="rId5" imgW="1104840" imgH="482400" progId="Equation.DSMT4">
                   <p:embed/>
                 </p:oleObj>
               </mc:Choice>
@@ -12865,7 +12974,7 @@
           <a:graphicData uri="http://schemas.openxmlformats.org/presentationml/2006/ole">
             <mc:AlternateContent xmlns:mc="http://schemas.openxmlformats.org/markup-compatibility/2006">
               <mc:Choice xmlns:v="urn:schemas-microsoft-com:vml" Requires="v">
-                <p:oleObj spid="_x0000_s4329" name="Equation" r:id="rId3" imgW="4368600" imgH="533160" progId="Equation.DSMT4">
+                <p:oleObj spid="_x0000_s4332" name="Equation" r:id="rId3" imgW="4368600" imgH="533160" progId="Equation.DSMT4">
                   <p:embed/>
                 </p:oleObj>
               </mc:Choice>
@@ -12922,7 +13031,7 @@
           <a:graphicData uri="http://schemas.openxmlformats.org/presentationml/2006/ole">
             <mc:AlternateContent xmlns:mc="http://schemas.openxmlformats.org/markup-compatibility/2006">
               <mc:Choice xmlns:v="urn:schemas-microsoft-com:vml" Requires="v">
-                <p:oleObj spid="_x0000_s4330" name="Equation" r:id="rId5" imgW="4089240" imgH="533160" progId="Equation.DSMT4">
+                <p:oleObj spid="_x0000_s4333" name="Equation" r:id="rId5" imgW="4089240" imgH="533160" progId="Equation.DSMT4">
                   <p:embed/>
                 </p:oleObj>
               </mc:Choice>
@@ -12979,7 +13088,7 @@
           <a:graphicData uri="http://schemas.openxmlformats.org/presentationml/2006/ole">
             <mc:AlternateContent xmlns:mc="http://schemas.openxmlformats.org/markup-compatibility/2006">
               <mc:Choice xmlns:v="urn:schemas-microsoft-com:vml" Requires="v">
-                <p:oleObj spid="_x0000_s4331" name="Equation" r:id="rId7" imgW="4101840" imgH="533160" progId="Equation.DSMT4">
+                <p:oleObj spid="_x0000_s4334" name="Equation" r:id="rId7" imgW="4101840" imgH="533160" progId="Equation.DSMT4">
                   <p:embed/>
                 </p:oleObj>
               </mc:Choice>
@@ -13096,7 +13205,7 @@
           <a:graphicData uri="http://schemas.openxmlformats.org/presentationml/2006/ole">
             <mc:AlternateContent xmlns:mc="http://schemas.openxmlformats.org/markup-compatibility/2006">
               <mc:Choice xmlns:v="urn:schemas-microsoft-com:vml" Requires="v">
-                <p:oleObj spid="_x0000_s5274" name="Equation" r:id="rId3" imgW="4470120" imgH="1244520" progId="Equation.DSMT4">
+                <p:oleObj spid="_x0000_s5276" name="Equation" r:id="rId3" imgW="4470120" imgH="1244520" progId="Equation.DSMT4">
                   <p:embed/>
                 </p:oleObj>
               </mc:Choice>
@@ -13153,7 +13262,7 @@
           <a:graphicData uri="http://schemas.openxmlformats.org/presentationml/2006/ole">
             <mc:AlternateContent xmlns:mc="http://schemas.openxmlformats.org/markup-compatibility/2006">
               <mc:Choice xmlns:v="urn:schemas-microsoft-com:vml" Requires="v">
-                <p:oleObj spid="_x0000_s5275" name="Equation" r:id="rId5" imgW="4495680" imgH="1244520" progId="Equation.DSMT4">
+                <p:oleObj spid="_x0000_s5277" name="Equation" r:id="rId5" imgW="4495680" imgH="1244520" progId="Equation.DSMT4">
                   <p:embed/>
                 </p:oleObj>
               </mc:Choice>
@@ -13303,11 +13412,7 @@
           <a:p>
             <a:r>
               <a:rPr lang="en-US" dirty="0" smtClean="0"/>
-              <a:t>I encourage you to use </a:t>
-            </a:r>
-            <a:r>
-              <a:rPr lang="en-US" dirty="0" smtClean="0"/>
-              <a:t>English for </a:t>
+              <a:t>I encourage you to use English for </a:t>
             </a:r>
             <a:r>
               <a:rPr lang="en-US" b="1" dirty="0" smtClean="0">
@@ -14355,7 +14460,7 @@
           <a:graphicData uri="http://schemas.openxmlformats.org/presentationml/2006/ole">
             <mc:AlternateContent xmlns:mc="http://schemas.openxmlformats.org/markup-compatibility/2006">
               <mc:Choice xmlns:v="urn:schemas-microsoft-com:vml" Requires="v">
-                <p:oleObj spid="_x0000_s6202" name="Equation" r:id="rId3" imgW="914400" imgH="190440" progId="Equation.DSMT4">
+                <p:oleObj spid="_x0000_s6203" name="Equation" r:id="rId3" imgW="914400" imgH="190440" progId="Equation.DSMT4">
                   <p:embed/>
                 </p:oleObj>
               </mc:Choice>
@@ -15026,7 +15131,6 @@
               <a:rPr lang="en-US" dirty="0" smtClean="0"/>
               <a:t>Asymptotic notation</a:t>
             </a:r>
-            <a:endParaRPr lang="en-US" dirty="0" smtClean="0"/>
           </a:p>
           <a:p>
             <a:r>
@@ -15486,15 +15590,7 @@
             <a:pPr marL="357188" indent="-357188"/>
             <a:r>
               <a:rPr lang="en-US" dirty="0" smtClean="0"/>
-              <a:t>Review of </a:t>
-            </a:r>
-            <a:r>
-              <a:rPr lang="en-US" dirty="0" smtClean="0"/>
-              <a:t>DAA </a:t>
-            </a:r>
-            <a:r>
-              <a:rPr lang="en-US" dirty="0" smtClean="0"/>
-              <a:t>1</a:t>
+              <a:t>Review of DAA 1</a:t>
             </a:r>
           </a:p>
           <a:p>
@@ -15623,15 +15719,7 @@
             </a:pPr>
             <a:r>
               <a:rPr lang="en-US" sz="4300" dirty="0" smtClean="0"/>
-              <a:t>Recap from </a:t>
-            </a:r>
-            <a:r>
-              <a:rPr lang="en-US" sz="4300" dirty="0" smtClean="0"/>
-              <a:t>DAA 1, </a:t>
-            </a:r>
-            <a:r>
-              <a:rPr lang="en-US" sz="4300" dirty="0" smtClean="0"/>
-              <a:t>we will use </a:t>
+              <a:t>Recap from DAA 1, we will use </a:t>
             </a:r>
             <a:r>
               <a:rPr lang="en-US" sz="4300" b="1" dirty="0" smtClean="0">

</xml_diff>

<commit_message>
Updating presentation 1 and 2 (C)
</commit_message>
<xml_diff>
--- a/161702/presentation/01 - Syllabus, Review of PAA 1/01. Syllabus, Review of PAA 1.pptx
+++ b/161702/presentation/01 - Syllabus, Review of PAA 1/01. Syllabus, Review of PAA 1.pptx
@@ -5,7 +5,7 @@
     <p:sldMasterId id="2147483720" r:id="rId1"/>
   </p:sldMasterIdLst>
   <p:notesMasterIdLst>
-    <p:notesMasterId r:id="rId37"/>
+    <p:notesMasterId r:id="rId39"/>
   </p:notesMasterIdLst>
   <p:sldIdLst>
     <p:sldId id="256" r:id="rId2"/>
@@ -40,9 +40,11 @@
     <p:sldId id="285" r:id="rId31"/>
     <p:sldId id="286" r:id="rId32"/>
     <p:sldId id="287" r:id="rId33"/>
-    <p:sldId id="259" r:id="rId34"/>
-    <p:sldId id="260" r:id="rId35"/>
-    <p:sldId id="288" r:id="rId36"/>
+    <p:sldId id="293" r:id="rId34"/>
+    <p:sldId id="294" r:id="rId35"/>
+    <p:sldId id="292" r:id="rId36"/>
+    <p:sldId id="259" r:id="rId37"/>
+    <p:sldId id="260" r:id="rId38"/>
   </p:sldIdLst>
   <p:sldSz cx="9144000" cy="6858000" type="screen4x3"/>
   <p:notesSz cx="6858000" cy="9144000"/>
@@ -2713,6 +2715,13 @@
         </dgm:presLayoutVars>
       </dgm:prSet>
       <dgm:spPr/>
+      <dgm:t>
+        <a:bodyPr/>
+        <a:lstStyle/>
+        <a:p>
+          <a:endParaRPr lang="en-US"/>
+        </a:p>
+      </dgm:t>
     </dgm:pt>
     <dgm:pt modelId="{445500B0-F324-410D-9A19-38DE8615FAE0}" type="pres">
       <dgm:prSet presAssocID="{9BBFAAE6-258D-45BE-83EF-4CC1C1B53B48}" presName="tSp" presStyleCnt="0"/>
@@ -2741,6 +2750,13 @@
         </dgm:presLayoutVars>
       </dgm:prSet>
       <dgm:spPr/>
+      <dgm:t>
+        <a:bodyPr/>
+        <a:lstStyle/>
+        <a:p>
+          <a:endParaRPr lang="en-US"/>
+        </a:p>
+      </dgm:t>
     </dgm:pt>
     <dgm:pt modelId="{C5C3795D-9639-446E-B772-21DF6A1AE184}" type="pres">
       <dgm:prSet presAssocID="{78FE7DA1-9E59-4351-A0C3-840B4CEC6B8B}" presName="childNode1tx" presStyleLbl="bgAcc1" presStyleIdx="0" presStyleCnt="3">
@@ -2749,6 +2765,13 @@
         </dgm:presLayoutVars>
       </dgm:prSet>
       <dgm:spPr/>
+      <dgm:t>
+        <a:bodyPr/>
+        <a:lstStyle/>
+        <a:p>
+          <a:endParaRPr lang="en-US"/>
+        </a:p>
+      </dgm:t>
     </dgm:pt>
     <dgm:pt modelId="{47C95866-64A5-47E9-80F8-FDB6E18B76FC}" type="pres">
       <dgm:prSet presAssocID="{78FE7DA1-9E59-4351-A0C3-840B4CEC6B8B}" presName="parentNode1" presStyleLbl="node1" presStyleIdx="0" presStyleCnt="3">
@@ -2758,6 +2781,13 @@
         </dgm:presLayoutVars>
       </dgm:prSet>
       <dgm:spPr/>
+      <dgm:t>
+        <a:bodyPr/>
+        <a:lstStyle/>
+        <a:p>
+          <a:endParaRPr lang="en-US"/>
+        </a:p>
+      </dgm:t>
     </dgm:pt>
     <dgm:pt modelId="{86104BD7-7E25-4710-87D2-17722B37CAE2}" type="pres">
       <dgm:prSet presAssocID="{78FE7DA1-9E59-4351-A0C3-840B4CEC6B8B}" presName="connSite1" presStyleCnt="0"/>
@@ -2766,6 +2796,13 @@
     <dgm:pt modelId="{9E995594-4D40-425B-B6C3-5192722DD04E}" type="pres">
       <dgm:prSet presAssocID="{42409908-29D1-4CE0-96E0-2193869AD446}" presName="Name9" presStyleLbl="sibTrans2D1" presStyleIdx="0" presStyleCnt="2"/>
       <dgm:spPr/>
+      <dgm:t>
+        <a:bodyPr/>
+        <a:lstStyle/>
+        <a:p>
+          <a:endParaRPr lang="en-US"/>
+        </a:p>
+      </dgm:t>
     </dgm:pt>
     <dgm:pt modelId="{547200FE-EAA2-4EF2-BFAB-8B03E5C4A54C}" type="pres">
       <dgm:prSet presAssocID="{F1AE3206-75CB-4280-A0BF-FBD4E28FFC84}" presName="composite2" presStyleCnt="0"/>
@@ -2782,6 +2819,13 @@
         </dgm:presLayoutVars>
       </dgm:prSet>
       <dgm:spPr/>
+      <dgm:t>
+        <a:bodyPr/>
+        <a:lstStyle/>
+        <a:p>
+          <a:endParaRPr lang="en-US"/>
+        </a:p>
+      </dgm:t>
     </dgm:pt>
     <dgm:pt modelId="{C833A0CD-1554-4189-9DEE-7765ED5001B0}" type="pres">
       <dgm:prSet presAssocID="{F1AE3206-75CB-4280-A0BF-FBD4E28FFC84}" presName="childNode2tx" presStyleLbl="bgAcc1" presStyleIdx="1" presStyleCnt="3">
@@ -2790,6 +2834,13 @@
         </dgm:presLayoutVars>
       </dgm:prSet>
       <dgm:spPr/>
+      <dgm:t>
+        <a:bodyPr/>
+        <a:lstStyle/>
+        <a:p>
+          <a:endParaRPr lang="en-US"/>
+        </a:p>
+      </dgm:t>
     </dgm:pt>
     <dgm:pt modelId="{72CDD254-7DB9-47C3-BDAB-1749354C558B}" type="pres">
       <dgm:prSet presAssocID="{F1AE3206-75CB-4280-A0BF-FBD4E28FFC84}" presName="parentNode2" presStyleLbl="node1" presStyleIdx="1" presStyleCnt="3">
@@ -2799,6 +2850,13 @@
         </dgm:presLayoutVars>
       </dgm:prSet>
       <dgm:spPr/>
+      <dgm:t>
+        <a:bodyPr/>
+        <a:lstStyle/>
+        <a:p>
+          <a:endParaRPr lang="en-US"/>
+        </a:p>
+      </dgm:t>
     </dgm:pt>
     <dgm:pt modelId="{2D235F5F-A454-4F8F-BC53-B8FFB8CC7BEB}" type="pres">
       <dgm:prSet presAssocID="{F1AE3206-75CB-4280-A0BF-FBD4E28FFC84}" presName="connSite2" presStyleCnt="0"/>
@@ -2807,6 +2865,13 @@
     <dgm:pt modelId="{17B402CA-3C9E-4FE9-BFE7-F11FFC449096}" type="pres">
       <dgm:prSet presAssocID="{C913CB2B-7253-4823-813D-F140198DFF7F}" presName="Name18" presStyleLbl="sibTrans2D1" presStyleIdx="1" presStyleCnt="2"/>
       <dgm:spPr/>
+      <dgm:t>
+        <a:bodyPr/>
+        <a:lstStyle/>
+        <a:p>
+          <a:endParaRPr lang="en-US"/>
+        </a:p>
+      </dgm:t>
     </dgm:pt>
     <dgm:pt modelId="{26AB677A-0428-4009-A77F-6009D46BFF40}" type="pres">
       <dgm:prSet presAssocID="{07ACBF5B-41EE-45BC-9F26-0C59BEB8E720}" presName="composite1" presStyleCnt="0"/>
@@ -2823,6 +2888,13 @@
         </dgm:presLayoutVars>
       </dgm:prSet>
       <dgm:spPr/>
+      <dgm:t>
+        <a:bodyPr/>
+        <a:lstStyle/>
+        <a:p>
+          <a:endParaRPr lang="en-US"/>
+        </a:p>
+      </dgm:t>
     </dgm:pt>
     <dgm:pt modelId="{DF91D674-87D8-43E1-B096-AF82EC896719}" type="pres">
       <dgm:prSet presAssocID="{07ACBF5B-41EE-45BC-9F26-0C59BEB8E720}" presName="childNode1tx" presStyleLbl="bgAcc1" presStyleIdx="2" presStyleCnt="3">
@@ -2831,6 +2903,13 @@
         </dgm:presLayoutVars>
       </dgm:prSet>
       <dgm:spPr/>
+      <dgm:t>
+        <a:bodyPr/>
+        <a:lstStyle/>
+        <a:p>
+          <a:endParaRPr lang="en-US"/>
+        </a:p>
+      </dgm:t>
     </dgm:pt>
     <dgm:pt modelId="{60055938-3D5E-4F77-8B65-9CC7ABF71EC1}" type="pres">
       <dgm:prSet presAssocID="{07ACBF5B-41EE-45BC-9F26-0C59BEB8E720}" presName="parentNode1" presStyleLbl="node1" presStyleIdx="2" presStyleCnt="3">
@@ -2840,6 +2919,13 @@
         </dgm:presLayoutVars>
       </dgm:prSet>
       <dgm:spPr/>
+      <dgm:t>
+        <a:bodyPr/>
+        <a:lstStyle/>
+        <a:p>
+          <a:endParaRPr lang="en-US"/>
+        </a:p>
+      </dgm:t>
     </dgm:pt>
     <dgm:pt modelId="{1B970AE4-B878-44C5-AC42-895103D3D5C1}" type="pres">
       <dgm:prSet presAssocID="{07ACBF5B-41EE-45BC-9F26-0C59BEB8E720}" presName="connSite1" presStyleCnt="0"/>
@@ -2847,27 +2933,27 @@
     </dgm:pt>
   </dgm:ptLst>
   <dgm:cxnLst>
+    <dgm:cxn modelId="{6E0F4F21-D8E1-4ECC-A0BE-B007C3A542A8}" type="presOf" srcId="{78FE7DA1-9E59-4351-A0C3-840B4CEC6B8B}" destId="{47C95866-64A5-47E9-80F8-FDB6E18B76FC}" srcOrd="0" destOrd="0" presId="urn:microsoft.com/office/officeart/2005/8/layout/hProcess4"/>
+    <dgm:cxn modelId="{2AD9506D-8678-4463-8BEE-674171AF029F}" type="presOf" srcId="{42409908-29D1-4CE0-96E0-2193869AD446}" destId="{9E995594-4D40-425B-B6C3-5192722DD04E}" srcOrd="0" destOrd="0" presId="urn:microsoft.com/office/officeart/2005/8/layout/hProcess4"/>
+    <dgm:cxn modelId="{9A03DF29-D4A9-43C6-87A3-654F141ACB50}" type="presOf" srcId="{DAD88AB1-D040-48C3-9C8A-C5BD0814DF57}" destId="{E89BAE0A-F2AE-4D7B-85FE-6E7861DA1276}" srcOrd="0" destOrd="1" presId="urn:microsoft.com/office/officeart/2005/8/layout/hProcess4"/>
+    <dgm:cxn modelId="{1BF90691-69FA-4B3C-9BFB-124A9070CC76}" srcId="{F1AE3206-75CB-4280-A0BF-FBD4E28FFC84}" destId="{5579AFF2-84FC-47E4-8BA4-5409DA1E0F8A}" srcOrd="0" destOrd="0" parTransId="{6147226A-24FC-4C60-A1E7-6F0211288257}" sibTransId="{C6A3F0BA-9969-4572-AA27-4A870FCACA99}"/>
+    <dgm:cxn modelId="{55E475BA-AED7-4BBB-9062-40C435BFB6BF}" type="presOf" srcId="{5579AFF2-84FC-47E4-8BA4-5409DA1E0F8A}" destId="{C833A0CD-1554-4189-9DEE-7765ED5001B0}" srcOrd="1" destOrd="0" presId="urn:microsoft.com/office/officeart/2005/8/layout/hProcess4"/>
+    <dgm:cxn modelId="{4B6E621A-9667-4643-A502-115AC47950EF}" type="presOf" srcId="{F1AE3206-75CB-4280-A0BF-FBD4E28FFC84}" destId="{72CDD254-7DB9-47C3-BDAB-1749354C558B}" srcOrd="0" destOrd="0" presId="urn:microsoft.com/office/officeart/2005/8/layout/hProcess4"/>
+    <dgm:cxn modelId="{4F925B48-E3E2-4575-A982-EA3C673A7878}" type="presOf" srcId="{76D81896-1C46-42DE-87D3-5A45E28CE80C}" destId="{E89BAE0A-F2AE-4D7B-85FE-6E7861DA1276}" srcOrd="0" destOrd="0" presId="urn:microsoft.com/office/officeart/2005/8/layout/hProcess4"/>
+    <dgm:cxn modelId="{57AFEE38-E877-4A2E-8EDD-6A59F3DAA36B}" type="presOf" srcId="{07ACBF5B-41EE-45BC-9F26-0C59BEB8E720}" destId="{60055938-3D5E-4F77-8B65-9CC7ABF71EC1}" srcOrd="0" destOrd="0" presId="urn:microsoft.com/office/officeart/2005/8/layout/hProcess4"/>
+    <dgm:cxn modelId="{81DF4524-15C8-4BC1-AFA2-39D58DBB5BD9}" srcId="{9BBFAAE6-258D-45BE-83EF-4CC1C1B53B48}" destId="{F1AE3206-75CB-4280-A0BF-FBD4E28FFC84}" srcOrd="1" destOrd="0" parTransId="{DD14A4E8-9146-447B-9D4F-BD7940A60ED5}" sibTransId="{C913CB2B-7253-4823-813D-F140198DFF7F}"/>
     <dgm:cxn modelId="{4044DEB9-691C-4B5E-94E7-BB340DA9878E}" type="presOf" srcId="{9BBFAAE6-258D-45BE-83EF-4CC1C1B53B48}" destId="{C547005F-C70B-42E0-98DD-253002E640A0}" srcOrd="0" destOrd="0" presId="urn:microsoft.com/office/officeart/2005/8/layout/hProcess4"/>
-    <dgm:cxn modelId="{9B8B33AF-C9FF-4CB0-805E-3818BD96E2EA}" type="presOf" srcId="{6D643C8B-D23F-468C-8A3A-6D9C4F65202B}" destId="{C5C3795D-9639-446E-B772-21DF6A1AE184}" srcOrd="1" destOrd="0" presId="urn:microsoft.com/office/officeart/2005/8/layout/hProcess4"/>
+    <dgm:cxn modelId="{C419C141-0DA2-4652-B644-626B5ADDE819}" srcId="{07ACBF5B-41EE-45BC-9F26-0C59BEB8E720}" destId="{DAD88AB1-D040-48C3-9C8A-C5BD0814DF57}" srcOrd="1" destOrd="0" parTransId="{57F1F36D-4BCB-46EE-8070-28BF61EB7FA9}" sibTransId="{26EA948E-21DD-4D97-950B-3897246E1E8C}"/>
+    <dgm:cxn modelId="{1984DA53-B032-42BA-8C18-668DB615D106}" srcId="{9BBFAAE6-258D-45BE-83EF-4CC1C1B53B48}" destId="{07ACBF5B-41EE-45BC-9F26-0C59BEB8E720}" srcOrd="2" destOrd="0" parTransId="{9789B8F6-2FE2-460A-95DE-572065C04CB2}" sibTransId="{5132266D-CE6E-4715-BB65-9A9D0BCDF2EB}"/>
+    <dgm:cxn modelId="{CB30325B-E022-417C-B6A5-90DC48FD5215}" type="presOf" srcId="{5579AFF2-84FC-47E4-8BA4-5409DA1E0F8A}" destId="{DDC744F6-E538-44A1-8F96-92ACE8690B9B}" srcOrd="0" destOrd="0" presId="urn:microsoft.com/office/officeart/2005/8/layout/hProcess4"/>
     <dgm:cxn modelId="{75AE2E8B-629F-4076-9E27-9EDE7570E091}" type="presOf" srcId="{C913CB2B-7253-4823-813D-F140198DFF7F}" destId="{17B402CA-3C9E-4FE9-BFE7-F11FFC449096}" srcOrd="0" destOrd="0" presId="urn:microsoft.com/office/officeart/2005/8/layout/hProcess4"/>
     <dgm:cxn modelId="{A383C5A5-2490-432D-9838-67CB132EE4A4}" srcId="{78FE7DA1-9E59-4351-A0C3-840B4CEC6B8B}" destId="{6D643C8B-D23F-468C-8A3A-6D9C4F65202B}" srcOrd="0" destOrd="0" parTransId="{601B77FF-C486-4C1A-9A99-A4428C52C768}" sibTransId="{81156465-3098-4FBF-8422-ED00F14E8B6C}"/>
-    <dgm:cxn modelId="{81DF4524-15C8-4BC1-AFA2-39D58DBB5BD9}" srcId="{9BBFAAE6-258D-45BE-83EF-4CC1C1B53B48}" destId="{F1AE3206-75CB-4280-A0BF-FBD4E28FFC84}" srcOrd="1" destOrd="0" parTransId="{DD14A4E8-9146-447B-9D4F-BD7940A60ED5}" sibTransId="{C913CB2B-7253-4823-813D-F140198DFF7F}"/>
-    <dgm:cxn modelId="{57AFEE38-E877-4A2E-8EDD-6A59F3DAA36B}" type="presOf" srcId="{07ACBF5B-41EE-45BC-9F26-0C59BEB8E720}" destId="{60055938-3D5E-4F77-8B65-9CC7ABF71EC1}" srcOrd="0" destOrd="0" presId="urn:microsoft.com/office/officeart/2005/8/layout/hProcess4"/>
-    <dgm:cxn modelId="{1984DA53-B032-42BA-8C18-668DB615D106}" srcId="{9BBFAAE6-258D-45BE-83EF-4CC1C1B53B48}" destId="{07ACBF5B-41EE-45BC-9F26-0C59BEB8E720}" srcOrd="2" destOrd="0" parTransId="{9789B8F6-2FE2-460A-95DE-572065C04CB2}" sibTransId="{5132266D-CE6E-4715-BB65-9A9D0BCDF2EB}"/>
-    <dgm:cxn modelId="{4B6E621A-9667-4643-A502-115AC47950EF}" type="presOf" srcId="{F1AE3206-75CB-4280-A0BF-FBD4E28FFC84}" destId="{72CDD254-7DB9-47C3-BDAB-1749354C558B}" srcOrd="0" destOrd="0" presId="urn:microsoft.com/office/officeart/2005/8/layout/hProcess4"/>
+    <dgm:cxn modelId="{369298E0-B03F-4393-ABCB-D96AE4B1CDC7}" srcId="{9BBFAAE6-258D-45BE-83EF-4CC1C1B53B48}" destId="{78FE7DA1-9E59-4351-A0C3-840B4CEC6B8B}" srcOrd="0" destOrd="0" parTransId="{ECF79735-E5EC-4733-BC81-A8A28CC7A6FF}" sibTransId="{42409908-29D1-4CE0-96E0-2193869AD446}"/>
+    <dgm:cxn modelId="{1D005D69-BC60-4D82-AE4C-07DA63AA60FF}" type="presOf" srcId="{DAD88AB1-D040-48C3-9C8A-C5BD0814DF57}" destId="{DF91D674-87D8-43E1-B096-AF82EC896719}" srcOrd="1" destOrd="1" presId="urn:microsoft.com/office/officeart/2005/8/layout/hProcess4"/>
+    <dgm:cxn modelId="{9B8B33AF-C9FF-4CB0-805E-3818BD96E2EA}" type="presOf" srcId="{6D643C8B-D23F-468C-8A3A-6D9C4F65202B}" destId="{C5C3795D-9639-446E-B772-21DF6A1AE184}" srcOrd="1" destOrd="0" presId="urn:microsoft.com/office/officeart/2005/8/layout/hProcess4"/>
+    <dgm:cxn modelId="{067FDA65-92B1-4E83-8827-9FC8FEBFB00E}" type="presOf" srcId="{76D81896-1C46-42DE-87D3-5A45E28CE80C}" destId="{DF91D674-87D8-43E1-B096-AF82EC896719}" srcOrd="1" destOrd="0" presId="urn:microsoft.com/office/officeart/2005/8/layout/hProcess4"/>
     <dgm:cxn modelId="{16D1C678-B8E9-4387-95EB-916E8C5D300C}" srcId="{07ACBF5B-41EE-45BC-9F26-0C59BEB8E720}" destId="{76D81896-1C46-42DE-87D3-5A45E28CE80C}" srcOrd="0" destOrd="0" parTransId="{30AF906F-9AC3-4441-881D-77F5666055FD}" sibTransId="{BEA812B5-BB26-4762-ADE9-6F862D145942}"/>
-    <dgm:cxn modelId="{55E475BA-AED7-4BBB-9062-40C435BFB6BF}" type="presOf" srcId="{5579AFF2-84FC-47E4-8BA4-5409DA1E0F8A}" destId="{C833A0CD-1554-4189-9DEE-7765ED5001B0}" srcOrd="1" destOrd="0" presId="urn:microsoft.com/office/officeart/2005/8/layout/hProcess4"/>
-    <dgm:cxn modelId="{1BF90691-69FA-4B3C-9BFB-124A9070CC76}" srcId="{F1AE3206-75CB-4280-A0BF-FBD4E28FFC84}" destId="{5579AFF2-84FC-47E4-8BA4-5409DA1E0F8A}" srcOrd="0" destOrd="0" parTransId="{6147226A-24FC-4C60-A1E7-6F0211288257}" sibTransId="{C6A3F0BA-9969-4572-AA27-4A870FCACA99}"/>
-    <dgm:cxn modelId="{6E0F4F21-D8E1-4ECC-A0BE-B007C3A542A8}" type="presOf" srcId="{78FE7DA1-9E59-4351-A0C3-840B4CEC6B8B}" destId="{47C95866-64A5-47E9-80F8-FDB6E18B76FC}" srcOrd="0" destOrd="0" presId="urn:microsoft.com/office/officeart/2005/8/layout/hProcess4"/>
-    <dgm:cxn modelId="{CB30325B-E022-417C-B6A5-90DC48FD5215}" type="presOf" srcId="{5579AFF2-84FC-47E4-8BA4-5409DA1E0F8A}" destId="{DDC744F6-E538-44A1-8F96-92ACE8690B9B}" srcOrd="0" destOrd="0" presId="urn:microsoft.com/office/officeart/2005/8/layout/hProcess4"/>
-    <dgm:cxn modelId="{1D005D69-BC60-4D82-AE4C-07DA63AA60FF}" type="presOf" srcId="{DAD88AB1-D040-48C3-9C8A-C5BD0814DF57}" destId="{DF91D674-87D8-43E1-B096-AF82EC896719}" srcOrd="1" destOrd="1" presId="urn:microsoft.com/office/officeart/2005/8/layout/hProcess4"/>
-    <dgm:cxn modelId="{9A03DF29-D4A9-43C6-87A3-654F141ACB50}" type="presOf" srcId="{DAD88AB1-D040-48C3-9C8A-C5BD0814DF57}" destId="{E89BAE0A-F2AE-4D7B-85FE-6E7861DA1276}" srcOrd="0" destOrd="1" presId="urn:microsoft.com/office/officeart/2005/8/layout/hProcess4"/>
     <dgm:cxn modelId="{EDB19DA6-8BEE-4626-9FC4-A68D1069A869}" type="presOf" srcId="{6D643C8B-D23F-468C-8A3A-6D9C4F65202B}" destId="{3FD38DDF-DF88-4B13-841F-7C239A8C582F}" srcOrd="0" destOrd="0" presId="urn:microsoft.com/office/officeart/2005/8/layout/hProcess4"/>
-    <dgm:cxn modelId="{C419C141-0DA2-4652-B644-626B5ADDE819}" srcId="{07ACBF5B-41EE-45BC-9F26-0C59BEB8E720}" destId="{DAD88AB1-D040-48C3-9C8A-C5BD0814DF57}" srcOrd="1" destOrd="0" parTransId="{57F1F36D-4BCB-46EE-8070-28BF61EB7FA9}" sibTransId="{26EA948E-21DD-4D97-950B-3897246E1E8C}"/>
-    <dgm:cxn modelId="{2AD9506D-8678-4463-8BEE-674171AF029F}" type="presOf" srcId="{42409908-29D1-4CE0-96E0-2193869AD446}" destId="{9E995594-4D40-425B-B6C3-5192722DD04E}" srcOrd="0" destOrd="0" presId="urn:microsoft.com/office/officeart/2005/8/layout/hProcess4"/>
-    <dgm:cxn modelId="{4F925B48-E3E2-4575-A982-EA3C673A7878}" type="presOf" srcId="{76D81896-1C46-42DE-87D3-5A45E28CE80C}" destId="{E89BAE0A-F2AE-4D7B-85FE-6E7861DA1276}" srcOrd="0" destOrd="0" presId="urn:microsoft.com/office/officeart/2005/8/layout/hProcess4"/>
-    <dgm:cxn modelId="{369298E0-B03F-4393-ABCB-D96AE4B1CDC7}" srcId="{9BBFAAE6-258D-45BE-83EF-4CC1C1B53B48}" destId="{78FE7DA1-9E59-4351-A0C3-840B4CEC6B8B}" srcOrd="0" destOrd="0" parTransId="{ECF79735-E5EC-4733-BC81-A8A28CC7A6FF}" sibTransId="{42409908-29D1-4CE0-96E0-2193869AD446}"/>
-    <dgm:cxn modelId="{067FDA65-92B1-4E83-8827-9FC8FEBFB00E}" type="presOf" srcId="{76D81896-1C46-42DE-87D3-5A45E28CE80C}" destId="{DF91D674-87D8-43E1-B096-AF82EC896719}" srcOrd="1" destOrd="0" presId="urn:microsoft.com/office/officeart/2005/8/layout/hProcess4"/>
     <dgm:cxn modelId="{CFA2BAA9-22F0-4B27-82E2-782E822111FE}" type="presParOf" srcId="{C547005F-C70B-42E0-98DD-253002E640A0}" destId="{445500B0-F324-410D-9A19-38DE8615FAE0}" srcOrd="0" destOrd="0" presId="urn:microsoft.com/office/officeart/2005/8/layout/hProcess4"/>
     <dgm:cxn modelId="{CEDFB3DF-35B9-4F98-9D58-BD8D09C9C3AA}" type="presParOf" srcId="{C547005F-C70B-42E0-98DD-253002E640A0}" destId="{C222B8B3-271E-4191-9D8A-5E74AB504B1D}" srcOrd="1" destOrd="0" presId="urn:microsoft.com/office/officeart/2005/8/layout/hProcess4"/>
     <dgm:cxn modelId="{326AF4E5-006C-4A22-AD25-94CEC5828B60}" type="presParOf" srcId="{C547005F-C70B-42E0-98DD-253002E640A0}" destId="{FB7D34AD-BE76-4310-A51E-50FA1E8BF49B}" srcOrd="2" destOrd="0" presId="urn:microsoft.com/office/officeart/2005/8/layout/hProcess4"/>
@@ -3004,6 +3090,13 @@
         </dgm:presLayoutVars>
       </dgm:prSet>
       <dgm:spPr/>
+      <dgm:t>
+        <a:bodyPr/>
+        <a:lstStyle/>
+        <a:p>
+          <a:endParaRPr lang="en-US"/>
+        </a:p>
+      </dgm:t>
     </dgm:pt>
     <dgm:pt modelId="{59BEBBC8-2151-4B59-BA25-A8495CBB2170}" type="pres">
       <dgm:prSet presAssocID="{1A7B5DD4-8482-445B-8DEE-786314DD7AE5}" presName="node" presStyleLbl="node1" presStyleIdx="0" presStyleCnt="2">
@@ -3023,10 +3116,24 @@
     <dgm:pt modelId="{2640DD53-E18C-476B-8D00-62CF4361DCA0}" type="pres">
       <dgm:prSet presAssocID="{4CC63B35-E6E4-4BE7-B0DB-E1A2C0D1506D}" presName="sibTrans" presStyleLbl="sibTrans2D1" presStyleIdx="0" presStyleCnt="1"/>
       <dgm:spPr/>
+      <dgm:t>
+        <a:bodyPr/>
+        <a:lstStyle/>
+        <a:p>
+          <a:endParaRPr lang="en-US"/>
+        </a:p>
+      </dgm:t>
     </dgm:pt>
     <dgm:pt modelId="{FC92ACD2-DF3E-4B31-A225-935F55BF57F4}" type="pres">
       <dgm:prSet presAssocID="{4CC63B35-E6E4-4BE7-B0DB-E1A2C0D1506D}" presName="connectorText" presStyleLbl="sibTrans2D1" presStyleIdx="0" presStyleCnt="1"/>
       <dgm:spPr/>
+      <dgm:t>
+        <a:bodyPr/>
+        <a:lstStyle/>
+        <a:p>
+          <a:endParaRPr lang="en-US"/>
+        </a:p>
+      </dgm:t>
     </dgm:pt>
     <dgm:pt modelId="{1EE0288E-7DEE-4029-9523-5BB6B52E5940}" type="pres">
       <dgm:prSet presAssocID="{2B060916-2C74-4F54-B694-C5408B72CFD0}" presName="node" presStyleLbl="node1" presStyleIdx="1" presStyleCnt="2">
@@ -3045,13 +3152,13 @@
     </dgm:pt>
   </dgm:ptLst>
   <dgm:cxnLst>
+    <dgm:cxn modelId="{4E78C071-00DE-4084-BF74-03C90D20542F}" type="presOf" srcId="{4CC63B35-E6E4-4BE7-B0DB-E1A2C0D1506D}" destId="{FC92ACD2-DF3E-4B31-A225-935F55BF57F4}" srcOrd="1" destOrd="0" presId="urn:microsoft.com/office/officeart/2005/8/layout/process5"/>
+    <dgm:cxn modelId="{A0322CD6-DDB0-431D-BE5E-F0B3F0A1DC46}" type="presOf" srcId="{1A7B5DD4-8482-445B-8DEE-786314DD7AE5}" destId="{59BEBBC8-2151-4B59-BA25-A8495CBB2170}" srcOrd="0" destOrd="0" presId="urn:microsoft.com/office/officeart/2005/8/layout/process5"/>
+    <dgm:cxn modelId="{82DB7744-CDB6-45DE-A89C-AD6E919BFE1D}" type="presOf" srcId="{4CC63B35-E6E4-4BE7-B0DB-E1A2C0D1506D}" destId="{2640DD53-E18C-476B-8D00-62CF4361DCA0}" srcOrd="0" destOrd="0" presId="urn:microsoft.com/office/officeart/2005/8/layout/process5"/>
+    <dgm:cxn modelId="{677F8D9D-FD39-41BF-AB29-FDEBC372200A}" type="presOf" srcId="{2B060916-2C74-4F54-B694-C5408B72CFD0}" destId="{1EE0288E-7DEE-4029-9523-5BB6B52E5940}" srcOrd="0" destOrd="0" presId="urn:microsoft.com/office/officeart/2005/8/layout/process5"/>
     <dgm:cxn modelId="{96BB573A-D4CB-4488-8261-B9DC7B01A84F}" srcId="{1B7011AC-E756-440E-81AC-4DF9E16F9C52}" destId="{1A7B5DD4-8482-445B-8DEE-786314DD7AE5}" srcOrd="0" destOrd="0" parTransId="{7B412554-7DAD-48A8-8C12-D55AAD805B43}" sibTransId="{4CC63B35-E6E4-4BE7-B0DB-E1A2C0D1506D}"/>
     <dgm:cxn modelId="{3A37A281-A04C-4AF6-99F8-2FC117308EC3}" type="presOf" srcId="{1B7011AC-E756-440E-81AC-4DF9E16F9C52}" destId="{576A4653-B346-46C5-8C35-024745C9D83A}" srcOrd="0" destOrd="0" presId="urn:microsoft.com/office/officeart/2005/8/layout/process5"/>
-    <dgm:cxn modelId="{A0322CD6-DDB0-431D-BE5E-F0B3F0A1DC46}" type="presOf" srcId="{1A7B5DD4-8482-445B-8DEE-786314DD7AE5}" destId="{59BEBBC8-2151-4B59-BA25-A8495CBB2170}" srcOrd="0" destOrd="0" presId="urn:microsoft.com/office/officeart/2005/8/layout/process5"/>
-    <dgm:cxn modelId="{4E78C071-00DE-4084-BF74-03C90D20542F}" type="presOf" srcId="{4CC63B35-E6E4-4BE7-B0DB-E1A2C0D1506D}" destId="{FC92ACD2-DF3E-4B31-A225-935F55BF57F4}" srcOrd="1" destOrd="0" presId="urn:microsoft.com/office/officeart/2005/8/layout/process5"/>
     <dgm:cxn modelId="{D1EB4DBC-1D74-40FF-80FE-FE5C064FB0F2}" srcId="{1B7011AC-E756-440E-81AC-4DF9E16F9C52}" destId="{2B060916-2C74-4F54-B694-C5408B72CFD0}" srcOrd="1" destOrd="0" parTransId="{2B71E673-0AAA-4D41-9DF4-EEBB83AB31AB}" sibTransId="{9225931A-FC25-4F69-9597-716CFBEE9932}"/>
-    <dgm:cxn modelId="{82DB7744-CDB6-45DE-A89C-AD6E919BFE1D}" type="presOf" srcId="{4CC63B35-E6E4-4BE7-B0DB-E1A2C0D1506D}" destId="{2640DD53-E18C-476B-8D00-62CF4361DCA0}" srcOrd="0" destOrd="0" presId="urn:microsoft.com/office/officeart/2005/8/layout/process5"/>
-    <dgm:cxn modelId="{677F8D9D-FD39-41BF-AB29-FDEBC372200A}" type="presOf" srcId="{2B060916-2C74-4F54-B694-C5408B72CFD0}" destId="{1EE0288E-7DEE-4029-9523-5BB6B52E5940}" srcOrd="0" destOrd="0" presId="urn:microsoft.com/office/officeart/2005/8/layout/process5"/>
     <dgm:cxn modelId="{237F7912-A85E-4092-8C06-C748BB64B7D8}" type="presParOf" srcId="{576A4653-B346-46C5-8C35-024745C9D83A}" destId="{59BEBBC8-2151-4B59-BA25-A8495CBB2170}" srcOrd="0" destOrd="0" presId="urn:microsoft.com/office/officeart/2005/8/layout/process5"/>
     <dgm:cxn modelId="{55D2AA25-67F7-4A2F-9E23-F9992CF7EC7A}" type="presParOf" srcId="{576A4653-B346-46C5-8C35-024745C9D83A}" destId="{2640DD53-E18C-476B-8D00-62CF4361DCA0}" srcOrd="1" destOrd="0" presId="urn:microsoft.com/office/officeart/2005/8/layout/process5"/>
     <dgm:cxn modelId="{E4892C76-C02E-4618-931C-EF64137CABDA}" type="presParOf" srcId="{2640DD53-E18C-476B-8D00-62CF4361DCA0}" destId="{FC92ACD2-DF3E-4B31-A225-935F55BF57F4}" srcOrd="0" destOrd="0" presId="urn:microsoft.com/office/officeart/2005/8/layout/process5"/>
@@ -3169,6 +3276,13 @@
         </dgm:presLayoutVars>
       </dgm:prSet>
       <dgm:spPr/>
+      <dgm:t>
+        <a:bodyPr/>
+        <a:lstStyle/>
+        <a:p>
+          <a:endParaRPr lang="en-US"/>
+        </a:p>
+      </dgm:t>
     </dgm:pt>
     <dgm:pt modelId="{59BEBBC8-2151-4B59-BA25-A8495CBB2170}" type="pres">
       <dgm:prSet presAssocID="{1A7B5DD4-8482-445B-8DEE-786314DD7AE5}" presName="node" presStyleLbl="node1" presStyleIdx="0" presStyleCnt="2">
@@ -3188,10 +3302,24 @@
     <dgm:pt modelId="{2640DD53-E18C-476B-8D00-62CF4361DCA0}" type="pres">
       <dgm:prSet presAssocID="{4CC63B35-E6E4-4BE7-B0DB-E1A2C0D1506D}" presName="sibTrans" presStyleLbl="sibTrans2D1" presStyleIdx="0" presStyleCnt="1"/>
       <dgm:spPr/>
+      <dgm:t>
+        <a:bodyPr/>
+        <a:lstStyle/>
+        <a:p>
+          <a:endParaRPr lang="en-US"/>
+        </a:p>
+      </dgm:t>
     </dgm:pt>
     <dgm:pt modelId="{FC92ACD2-DF3E-4B31-A225-935F55BF57F4}" type="pres">
       <dgm:prSet presAssocID="{4CC63B35-E6E4-4BE7-B0DB-E1A2C0D1506D}" presName="connectorText" presStyleLbl="sibTrans2D1" presStyleIdx="0" presStyleCnt="1"/>
       <dgm:spPr/>
+      <dgm:t>
+        <a:bodyPr/>
+        <a:lstStyle/>
+        <a:p>
+          <a:endParaRPr lang="en-US"/>
+        </a:p>
+      </dgm:t>
     </dgm:pt>
     <dgm:pt modelId="{1EE0288E-7DEE-4029-9523-5BB6B52E5940}" type="pres">
       <dgm:prSet presAssocID="{2B060916-2C74-4F54-B694-C5408B72CFD0}" presName="node" presStyleLbl="node1" presStyleIdx="1" presStyleCnt="2">
@@ -8429,7 +8557,7 @@
           <a:p>
             <a:fld id="{54A0D01E-5226-49DB-B876-7FE474C4AC43}" type="datetimeFigureOut">
               <a:rPr lang="en-US" smtClean="0"/>
-              <a:t>2/6/2017</a:t>
+              <a:t>2/13/2017</a:t>
             </a:fld>
             <a:endParaRPr lang="en-US"/>
           </a:p>
@@ -8912,7 +9040,7 @@
           <a:p>
             <a:fld id="{98558AF6-4215-4AC6-9EE0-A56FB7B1541C}" type="datetimeFigureOut">
               <a:rPr lang="en-US" smtClean="0"/>
-              <a:t>2/6/2017</a:t>
+              <a:t>2/13/2017</a:t>
             </a:fld>
             <a:endParaRPr lang="en-US"/>
           </a:p>
@@ -9082,7 +9210,7 @@
           <a:p>
             <a:fld id="{98558AF6-4215-4AC6-9EE0-A56FB7B1541C}" type="datetimeFigureOut">
               <a:rPr lang="en-US" smtClean="0"/>
-              <a:t>2/6/2017</a:t>
+              <a:t>2/13/2017</a:t>
             </a:fld>
             <a:endParaRPr lang="en-US"/>
           </a:p>
@@ -9262,7 +9390,7 @@
           <a:p>
             <a:fld id="{98558AF6-4215-4AC6-9EE0-A56FB7B1541C}" type="datetimeFigureOut">
               <a:rPr lang="en-US" smtClean="0"/>
-              <a:t>2/6/2017</a:t>
+              <a:t>2/13/2017</a:t>
             </a:fld>
             <a:endParaRPr lang="en-US"/>
           </a:p>
@@ -9432,7 +9560,7 @@
           <a:p>
             <a:fld id="{98558AF6-4215-4AC6-9EE0-A56FB7B1541C}" type="datetimeFigureOut">
               <a:rPr lang="en-US" smtClean="0"/>
-              <a:t>2/6/2017</a:t>
+              <a:t>2/13/2017</a:t>
             </a:fld>
             <a:endParaRPr lang="en-US"/>
           </a:p>
@@ -9676,7 +9804,7 @@
           <a:p>
             <a:fld id="{98558AF6-4215-4AC6-9EE0-A56FB7B1541C}" type="datetimeFigureOut">
               <a:rPr lang="en-US" smtClean="0"/>
-              <a:t>2/6/2017</a:t>
+              <a:t>2/13/2017</a:t>
             </a:fld>
             <a:endParaRPr lang="en-US"/>
           </a:p>
@@ -9908,7 +10036,7 @@
           <a:p>
             <a:fld id="{98558AF6-4215-4AC6-9EE0-A56FB7B1541C}" type="datetimeFigureOut">
               <a:rPr lang="en-US" smtClean="0"/>
-              <a:t>2/6/2017</a:t>
+              <a:t>2/13/2017</a:t>
             </a:fld>
             <a:endParaRPr lang="en-US"/>
           </a:p>
@@ -10275,7 +10403,7 @@
           <a:p>
             <a:fld id="{98558AF6-4215-4AC6-9EE0-A56FB7B1541C}" type="datetimeFigureOut">
               <a:rPr lang="en-US" smtClean="0"/>
-              <a:t>2/6/2017</a:t>
+              <a:t>2/13/2017</a:t>
             </a:fld>
             <a:endParaRPr lang="en-US"/>
           </a:p>
@@ -10393,7 +10521,7 @@
           <a:p>
             <a:fld id="{98558AF6-4215-4AC6-9EE0-A56FB7B1541C}" type="datetimeFigureOut">
               <a:rPr lang="en-US" smtClean="0"/>
-              <a:t>2/6/2017</a:t>
+              <a:t>2/13/2017</a:t>
             </a:fld>
             <a:endParaRPr lang="en-US"/>
           </a:p>
@@ -10488,7 +10616,7 @@
           <a:p>
             <a:fld id="{98558AF6-4215-4AC6-9EE0-A56FB7B1541C}" type="datetimeFigureOut">
               <a:rPr lang="en-US" smtClean="0"/>
-              <a:t>2/6/2017</a:t>
+              <a:t>2/13/2017</a:t>
             </a:fld>
             <a:endParaRPr lang="en-US"/>
           </a:p>
@@ -10765,7 +10893,7 @@
           <a:p>
             <a:fld id="{98558AF6-4215-4AC6-9EE0-A56FB7B1541C}" type="datetimeFigureOut">
               <a:rPr lang="en-US" smtClean="0"/>
-              <a:t>2/6/2017</a:t>
+              <a:t>2/13/2017</a:t>
             </a:fld>
             <a:endParaRPr lang="en-US"/>
           </a:p>
@@ -11022,7 +11150,7 @@
           <a:p>
             <a:fld id="{98558AF6-4215-4AC6-9EE0-A56FB7B1541C}" type="datetimeFigureOut">
               <a:rPr lang="en-US" smtClean="0"/>
-              <a:t>2/6/2017</a:t>
+              <a:t>2/13/2017</a:t>
             </a:fld>
             <a:endParaRPr lang="en-US"/>
           </a:p>
@@ -11235,7 +11363,7 @@
           <a:p>
             <a:fld id="{98558AF6-4215-4AC6-9EE0-A56FB7B1541C}" type="datetimeFigureOut">
               <a:rPr lang="en-US" smtClean="0"/>
-              <a:t>2/6/2017</a:t>
+              <a:t>2/13/2017</a:t>
             </a:fld>
             <a:endParaRPr lang="en-US"/>
           </a:p>
@@ -11672,15 +11800,7 @@
           <a:p>
             <a:r>
               <a:rPr lang="en-US" dirty="0" smtClean="0"/>
-              <a:t>01. Introduction, Review of </a:t>
-            </a:r>
-            <a:r>
-              <a:rPr lang="en-US" dirty="0" smtClean="0"/>
-              <a:t>DAA </a:t>
-            </a:r>
-            <a:r>
-              <a:rPr lang="en-US" dirty="0" smtClean="0"/>
-              <a:t>1</a:t>
+              <a:t>01. Introduction, Review of DAA 1</a:t>
             </a:r>
             <a:endParaRPr lang="en-US" dirty="0"/>
           </a:p>
@@ -11707,11 +11827,7 @@
             </a:r>
             <a:r>
               <a:rPr lang="en-US" smtClean="0"/>
-              <a:t>of </a:t>
-            </a:r>
-            <a:r>
-              <a:rPr lang="en-US" smtClean="0"/>
-              <a:t>Algorithm (DAA) </a:t>
+              <a:t>of Algorithm (DAA) </a:t>
             </a:r>
             <a:r>
               <a:rPr lang="en-US" dirty="0" smtClean="0"/>
@@ -11809,11 +11925,7 @@
           <a:p>
             <a:r>
               <a:rPr lang="en-US" dirty="0" smtClean="0"/>
-              <a:t>Pseudocode </a:t>
-            </a:r>
-            <a:r>
-              <a:rPr lang="en-US" dirty="0" smtClean="0"/>
-              <a:t>convention</a:t>
+              <a:t>Pseudocode convention</a:t>
             </a:r>
           </a:p>
           <a:p>
@@ -11827,7 +11939,6 @@
               <a:rPr lang="en-US" dirty="0" smtClean="0"/>
               <a:t>Asymptotic Notation</a:t>
             </a:r>
-            <a:endParaRPr lang="en-US" dirty="0" smtClean="0"/>
           </a:p>
           <a:p>
             <a:endParaRPr lang="en-US" dirty="0"/>
@@ -12230,7 +12341,7 @@
           <a:graphicData uri="http://schemas.openxmlformats.org/presentationml/2006/ole">
             <mc:AlternateContent xmlns:mc="http://schemas.openxmlformats.org/markup-compatibility/2006">
               <mc:Choice xmlns:v="urn:schemas-microsoft-com:vml" Requires="v">
-                <p:oleObj spid="_x0000_s3353" name="Equation" r:id="rId3" imgW="1346040" imgH="253800" progId="Equation.DSMT4">
+                <p:oleObj spid="_x0000_s3449" name="Equation" r:id="rId3" imgW="1346040" imgH="253800" progId="Equation.DSMT4">
                   <p:embed/>
                 </p:oleObj>
               </mc:Choice>
@@ -12287,7 +12398,7 @@
           <a:graphicData uri="http://schemas.openxmlformats.org/presentationml/2006/ole">
             <mc:AlternateContent xmlns:mc="http://schemas.openxmlformats.org/markup-compatibility/2006">
               <mc:Choice xmlns:v="urn:schemas-microsoft-com:vml" Requires="v">
-                <p:oleObj spid="_x0000_s3354" name="Equation" r:id="rId5" imgW="1549080" imgH="1523880" progId="Equation.DSMT4">
+                <p:oleObj spid="_x0000_s3450" name="Equation" r:id="rId5" imgW="1549080" imgH="1523880" progId="Equation.DSMT4">
                   <p:embed/>
                 </p:oleObj>
               </mc:Choice>
@@ -12344,7 +12455,7 @@
           <a:graphicData uri="http://schemas.openxmlformats.org/presentationml/2006/ole">
             <mc:AlternateContent xmlns:mc="http://schemas.openxmlformats.org/markup-compatibility/2006">
               <mc:Choice xmlns:v="urn:schemas-microsoft-com:vml" Requires="v">
-                <p:oleObj spid="_x0000_s3355" name="Equation" r:id="rId7" imgW="2361960" imgH="253800" progId="Equation.DSMT4">
+                <p:oleObj spid="_x0000_s3451" name="Equation" r:id="rId7" imgW="2361960" imgH="253800" progId="Equation.DSMT4">
                   <p:embed/>
                 </p:oleObj>
               </mc:Choice>
@@ -12490,7 +12601,7 @@
           <a:graphicData uri="http://schemas.openxmlformats.org/presentationml/2006/ole">
             <mc:AlternateContent xmlns:mc="http://schemas.openxmlformats.org/markup-compatibility/2006">
               <mc:Choice xmlns:v="urn:schemas-microsoft-com:vml" Requires="v">
-                <p:oleObj spid="_x0000_s1136" name="Equation" r:id="rId4" imgW="1346040" imgH="253800" progId="Equation.DSMT4">
+                <p:oleObj spid="_x0000_s1168" name="Equation" r:id="rId4" imgW="1346040" imgH="253800" progId="Equation.DSMT4">
                   <p:embed/>
                 </p:oleObj>
               </mc:Choice>
@@ -12691,7 +12802,7 @@
           <a:graphicData uri="http://schemas.openxmlformats.org/presentationml/2006/ole">
             <mc:AlternateContent xmlns:mc="http://schemas.openxmlformats.org/markup-compatibility/2006">
               <mc:Choice xmlns:v="urn:schemas-microsoft-com:vml" Requires="v">
-                <p:oleObj spid="_x0000_s2256" name="Equation" r:id="rId3" imgW="1346040" imgH="1638000" progId="Equation.DSMT4">
+                <p:oleObj spid="_x0000_s2320" name="Equation" r:id="rId3" imgW="1346040" imgH="1638000" progId="Equation.DSMT4">
                   <p:embed/>
                 </p:oleObj>
               </mc:Choice>
@@ -12748,7 +12859,7 @@
           <a:graphicData uri="http://schemas.openxmlformats.org/presentationml/2006/ole">
             <mc:AlternateContent xmlns:mc="http://schemas.openxmlformats.org/markup-compatibility/2006">
               <mc:Choice xmlns:v="urn:schemas-microsoft-com:vml" Requires="v">
-                <p:oleObj spid="_x0000_s2257" name="Equation" r:id="rId5" imgW="1104840" imgH="482400" progId="Equation.DSMT4">
+                <p:oleObj spid="_x0000_s2321" name="Equation" r:id="rId5" imgW="1104840" imgH="482400" progId="Equation.DSMT4">
                   <p:embed/>
                 </p:oleObj>
               </mc:Choice>
@@ -12865,7 +12976,7 @@
           <a:graphicData uri="http://schemas.openxmlformats.org/presentationml/2006/ole">
             <mc:AlternateContent xmlns:mc="http://schemas.openxmlformats.org/markup-compatibility/2006">
               <mc:Choice xmlns:v="urn:schemas-microsoft-com:vml" Requires="v">
-                <p:oleObj spid="_x0000_s4329" name="Equation" r:id="rId3" imgW="4368600" imgH="533160" progId="Equation.DSMT4">
+                <p:oleObj spid="_x0000_s4425" name="Equation" r:id="rId3" imgW="4368600" imgH="533160" progId="Equation.DSMT4">
                   <p:embed/>
                 </p:oleObj>
               </mc:Choice>
@@ -12922,7 +13033,7 @@
           <a:graphicData uri="http://schemas.openxmlformats.org/presentationml/2006/ole">
             <mc:AlternateContent xmlns:mc="http://schemas.openxmlformats.org/markup-compatibility/2006">
               <mc:Choice xmlns:v="urn:schemas-microsoft-com:vml" Requires="v">
-                <p:oleObj spid="_x0000_s4330" name="Equation" r:id="rId5" imgW="4089240" imgH="533160" progId="Equation.DSMT4">
+                <p:oleObj spid="_x0000_s4426" name="Equation" r:id="rId5" imgW="4089240" imgH="533160" progId="Equation.DSMT4">
                   <p:embed/>
                 </p:oleObj>
               </mc:Choice>
@@ -12979,7 +13090,7 @@
           <a:graphicData uri="http://schemas.openxmlformats.org/presentationml/2006/ole">
             <mc:AlternateContent xmlns:mc="http://schemas.openxmlformats.org/markup-compatibility/2006">
               <mc:Choice xmlns:v="urn:schemas-microsoft-com:vml" Requires="v">
-                <p:oleObj spid="_x0000_s4331" name="Equation" r:id="rId7" imgW="4101840" imgH="533160" progId="Equation.DSMT4">
+                <p:oleObj spid="_x0000_s4427" name="Equation" r:id="rId7" imgW="4101840" imgH="533160" progId="Equation.DSMT4">
                   <p:embed/>
                 </p:oleObj>
               </mc:Choice>
@@ -13096,7 +13207,7 @@
           <a:graphicData uri="http://schemas.openxmlformats.org/presentationml/2006/ole">
             <mc:AlternateContent xmlns:mc="http://schemas.openxmlformats.org/markup-compatibility/2006">
               <mc:Choice xmlns:v="urn:schemas-microsoft-com:vml" Requires="v">
-                <p:oleObj spid="_x0000_s5274" name="Equation" r:id="rId3" imgW="4470120" imgH="1244520" progId="Equation.DSMT4">
+                <p:oleObj spid="_x0000_s5338" name="Equation" r:id="rId3" imgW="4470120" imgH="1244520" progId="Equation.DSMT4">
                   <p:embed/>
                 </p:oleObj>
               </mc:Choice>
@@ -13153,7 +13264,7 @@
           <a:graphicData uri="http://schemas.openxmlformats.org/presentationml/2006/ole">
             <mc:AlternateContent xmlns:mc="http://schemas.openxmlformats.org/markup-compatibility/2006">
               <mc:Choice xmlns:v="urn:schemas-microsoft-com:vml" Requires="v">
-                <p:oleObj spid="_x0000_s5275" name="Equation" r:id="rId5" imgW="4495680" imgH="1244520" progId="Equation.DSMT4">
+                <p:oleObj spid="_x0000_s5339" name="Equation" r:id="rId5" imgW="4495680" imgH="1244520" progId="Equation.DSMT4">
                   <p:embed/>
                 </p:oleObj>
               </mc:Choice>
@@ -13303,11 +13414,7 @@
           <a:p>
             <a:r>
               <a:rPr lang="en-US" dirty="0" smtClean="0"/>
-              <a:t>I encourage you to use </a:t>
-            </a:r>
-            <a:r>
-              <a:rPr lang="en-US" dirty="0" smtClean="0"/>
-              <a:t>English for </a:t>
+              <a:t>I encourage you to use English for </a:t>
             </a:r>
             <a:r>
               <a:rPr lang="en-US" b="1" dirty="0" smtClean="0">
@@ -14355,7 +14462,7 @@
           <a:graphicData uri="http://schemas.openxmlformats.org/presentationml/2006/ole">
             <mc:AlternateContent xmlns:mc="http://schemas.openxmlformats.org/markup-compatibility/2006">
               <mc:Choice xmlns:v="urn:schemas-microsoft-com:vml" Requires="v">
-                <p:oleObj spid="_x0000_s6202" name="Equation" r:id="rId3" imgW="914400" imgH="190440" progId="Equation.DSMT4">
+                <p:oleObj spid="_x0000_s6234" name="Equation" r:id="rId3" imgW="914400" imgH="190440" progId="Equation.DSMT4">
                   <p:embed/>
                 </p:oleObj>
               </mc:Choice>
@@ -14753,6 +14860,13 @@
   <p:clrMapOvr>
     <a:masterClrMapping/>
   </p:clrMapOvr>
+  <p:timing>
+    <p:tnLst>
+      <p:par>
+        <p:cTn id="1" dur="indefinite" restart="never" nodeType="tmRoot"/>
+      </p:par>
+    </p:tnLst>
+  </p:timing>
 </p:sld>
 </file>
 
@@ -14790,7 +14904,7 @@
           <a:p>
             <a:r>
               <a:rPr lang="en-US" dirty="0" smtClean="0"/>
-              <a:t>Terminology</a:t>
+              <a:t>DP Bottom Up</a:t>
             </a:r>
             <a:endParaRPr lang="en-US" dirty="0"/>
           </a:p>
@@ -14803,153 +14917,46 @@
             <a:spLocks noGrp="1"/>
           </p:cNvSpPr>
           <p:nvPr>
-            <p:ph sz="half" idx="1"/>
+            <p:ph idx="1"/>
           </p:nvPr>
         </p:nvSpPr>
         <p:spPr/>
         <p:txBody>
-          <a:bodyPr>
-            <a:normAutofit/>
-          </a:bodyPr>
+          <a:bodyPr/>
           <a:lstStyle/>
           <a:p>
-            <a:pPr marL="0" indent="0">
-              <a:buNone/>
-            </a:pPr>
-            <a:r>
-              <a:rPr lang="en-US" sz="2800" dirty="0" smtClean="0"/>
-              <a:t>iterative algorithm</a:t>
-            </a:r>
-            <a:endParaRPr lang="en-US" sz="2800" dirty="0"/>
-          </a:p>
-          <a:p>
-            <a:pPr marL="0" indent="0">
-              <a:buNone/>
-            </a:pPr>
-            <a:r>
-              <a:rPr lang="en-US" sz="2800" dirty="0" smtClean="0"/>
-              <a:t>recurrence</a:t>
-            </a:r>
-          </a:p>
-          <a:p>
-            <a:pPr marL="0" indent="0">
-              <a:buNone/>
-            </a:pPr>
-            <a:r>
-              <a:rPr lang="en-US" sz="2800" dirty="0"/>
-              <a:t>substitution method</a:t>
-            </a:r>
-          </a:p>
-          <a:p>
-            <a:pPr marL="0" indent="0">
-              <a:buNone/>
-            </a:pPr>
-            <a:r>
-              <a:rPr lang="en-US" sz="2800" dirty="0" smtClean="0"/>
-              <a:t>recursion tree</a:t>
-            </a:r>
-          </a:p>
-          <a:p>
-            <a:pPr marL="0" indent="0">
-              <a:buNone/>
-            </a:pPr>
-            <a:r>
-              <a:rPr lang="en-US" sz="2800" dirty="0" smtClean="0"/>
-              <a:t>master method</a:t>
-            </a:r>
-          </a:p>
-          <a:p>
-            <a:pPr marL="0" indent="0">
-              <a:buNone/>
-            </a:pPr>
-            <a:r>
-              <a:rPr lang="en-US" sz="2800" dirty="0" smtClean="0"/>
-              <a:t>asymptotic notation</a:t>
+            <a:r>
+              <a:rPr lang="en-US" dirty="0" smtClean="0"/>
+              <a:t>Define ‘bottom’ solution </a:t>
+            </a:r>
+            <a:r>
+              <a:rPr lang="en-US" dirty="0" smtClean="0">
+                <a:sym typeface="Wingdings" panose="05000000000000000000" pitchFamily="2" charset="2"/>
+              </a:rPr>
+              <a:t> base case on recurrence</a:t>
+            </a:r>
+          </a:p>
+          <a:p>
+            <a:r>
+              <a:rPr lang="en-US" dirty="0" smtClean="0">
+                <a:sym typeface="Wingdings" panose="05000000000000000000" pitchFamily="2" charset="2"/>
+              </a:rPr>
+              <a:t>Define a strategy for solving overlapping sub-problems</a:t>
             </a:r>
             <a:endParaRPr lang="en-US" dirty="0"/>
-          </a:p>
-        </p:txBody>
-      </p:sp>
-      <p:sp>
-        <p:nvSpPr>
-          <p:cNvPr id="4" name="Content Placeholder 3"/>
-          <p:cNvSpPr>
-            <a:spLocks noGrp="1"/>
-          </p:cNvSpPr>
-          <p:nvPr>
-            <p:ph sz="half" idx="2"/>
-          </p:nvPr>
-        </p:nvSpPr>
-        <p:spPr/>
-        <p:txBody>
-          <a:bodyPr>
-            <a:normAutofit/>
-          </a:bodyPr>
-          <a:lstStyle/>
-          <a:p>
-            <a:pPr marL="0" indent="0">
-              <a:buNone/>
-            </a:pPr>
-            <a:r>
-              <a:rPr lang="en-US" sz="2800" dirty="0" smtClean="0"/>
-              <a:t>dynamic programming</a:t>
-            </a:r>
-          </a:p>
-          <a:p>
-            <a:pPr marL="0" indent="0">
-              <a:buNone/>
-            </a:pPr>
-            <a:r>
-              <a:rPr lang="en-US" sz="2800" dirty="0"/>
-              <a:t>m</a:t>
-            </a:r>
-            <a:r>
-              <a:rPr lang="en-US" sz="2800" dirty="0" smtClean="0"/>
-              <a:t>emo table</a:t>
-            </a:r>
-          </a:p>
-          <a:p>
-            <a:pPr marL="0" indent="0">
-              <a:buNone/>
-            </a:pPr>
-            <a:r>
-              <a:rPr lang="en-US" sz="2800" dirty="0" smtClean="0"/>
-              <a:t>top-down DP</a:t>
-            </a:r>
-          </a:p>
-          <a:p>
-            <a:pPr marL="0" indent="0">
-              <a:buNone/>
-            </a:pPr>
-            <a:r>
-              <a:rPr lang="en-US" sz="2800" dirty="0"/>
-              <a:t>b</a:t>
-            </a:r>
-            <a:r>
-              <a:rPr lang="en-US" sz="2800" dirty="0" smtClean="0"/>
-              <a:t>ottom-up DP</a:t>
-            </a:r>
-            <a:endParaRPr lang="en-US" sz="2800" dirty="0"/>
           </a:p>
         </p:txBody>
       </p:sp>
     </p:spTree>
     <p:extLst>
       <p:ext uri="{BB962C8B-B14F-4D97-AF65-F5344CB8AC3E}">
-        <p14:creationId xmlns:p14="http://schemas.microsoft.com/office/powerpoint/2010/main" val="83867626"/>
+        <p14:creationId xmlns:p14="http://schemas.microsoft.com/office/powerpoint/2010/main" val="898102032"/>
       </p:ext>
     </p:extLst>
   </p:cSld>
   <p:clrMapOvr>
     <a:masterClrMapping/>
   </p:clrMapOvr>
-  <p:timing>
-    <p:tnLst>
-      <p:par>
-        <p:cTn id="1" dur="indefinite" restart="never" nodeType="tmRoot"/>
-      </p:par>
-    </p:tnLst>
-  </p:timing>
 </p:sld>
 </file>
 
@@ -14987,7 +14994,7 @@
           <a:p>
             <a:r>
               <a:rPr lang="en-US" dirty="0" smtClean="0"/>
-              <a:t>Summary</a:t>
+              <a:t>DP Bottom Up</a:t>
             </a:r>
             <a:endParaRPr lang="en-US" dirty="0"/>
           </a:p>
@@ -15005,52 +15012,17 @@
         </p:nvSpPr>
         <p:spPr/>
         <p:txBody>
-          <a:bodyPr>
-            <a:normAutofit/>
-          </a:bodyPr>
+          <a:bodyPr/>
           <a:lstStyle/>
           <a:p>
-            <a:r>
-              <a:rPr lang="en-US" dirty="0" smtClean="0"/>
-              <a:t>Pseudocode convention</a:t>
-            </a:r>
-          </a:p>
-          <a:p>
-            <a:r>
-              <a:rPr lang="en-US" dirty="0" smtClean="0"/>
-              <a:t>Complexity analysis: iterative, recursive</a:t>
-            </a:r>
-          </a:p>
-          <a:p>
-            <a:r>
-              <a:rPr lang="en-US" dirty="0" smtClean="0"/>
-              <a:t>Asymptotic notation</a:t>
-            </a:r>
-            <a:endParaRPr lang="en-US" dirty="0" smtClean="0"/>
-          </a:p>
-          <a:p>
-            <a:r>
-              <a:rPr lang="en-US" dirty="0" smtClean="0"/>
-              <a:t>Examples:</a:t>
-            </a:r>
-          </a:p>
-          <a:p>
-            <a:pPr lvl="1"/>
-            <a:r>
-              <a:rPr lang="en-US" dirty="0" smtClean="0"/>
-              <a:t>Fibonacci: iterative, recursive, DP</a:t>
-            </a:r>
-          </a:p>
-          <a:p>
-            <a:pPr lvl="1"/>
-            <a:endParaRPr lang="en-US" dirty="0" smtClean="0"/>
+            <a:endParaRPr lang="en-US" dirty="0"/>
           </a:p>
         </p:txBody>
       </p:sp>
     </p:spTree>
     <p:extLst>
       <p:ext uri="{BB962C8B-B14F-4D97-AF65-F5344CB8AC3E}">
-        <p14:creationId xmlns:p14="http://schemas.microsoft.com/office/powerpoint/2010/main" val="2996499416"/>
+        <p14:creationId xmlns:p14="http://schemas.microsoft.com/office/powerpoint/2010/main" val="347435707"/>
       </p:ext>
     </p:extLst>
   </p:cSld>
@@ -15101,7 +15073,432 @@
           <a:p>
             <a:r>
               <a:rPr lang="en-US" dirty="0" smtClean="0"/>
-              <a:t>Exercise</a:t>
+              <a:t>The differences of DP Top Down vs DP Bottom Up</a:t>
+            </a:r>
+            <a:endParaRPr lang="en-US" dirty="0"/>
+          </a:p>
+        </p:txBody>
+      </p:sp>
+      <p:sp>
+        <p:nvSpPr>
+          <p:cNvPr id="4" name="Text Placeholder 3"/>
+          <p:cNvSpPr>
+            <a:spLocks noGrp="1"/>
+          </p:cNvSpPr>
+          <p:nvPr>
+            <p:ph type="body" idx="1"/>
+          </p:nvPr>
+        </p:nvSpPr>
+        <p:spPr/>
+        <p:txBody>
+          <a:bodyPr/>
+          <a:lstStyle/>
+          <a:p>
+            <a:pPr algn="ctr"/>
+            <a:r>
+              <a:rPr lang="en-US" dirty="0" smtClean="0"/>
+              <a:t>DP Top Down</a:t>
+            </a:r>
+            <a:endParaRPr lang="en-US" dirty="0"/>
+          </a:p>
+        </p:txBody>
+      </p:sp>
+      <p:sp>
+        <p:nvSpPr>
+          <p:cNvPr id="5" name="Content Placeholder 4"/>
+          <p:cNvSpPr>
+            <a:spLocks noGrp="1"/>
+          </p:cNvSpPr>
+          <p:nvPr>
+            <p:ph sz="half" idx="2"/>
+          </p:nvPr>
+        </p:nvSpPr>
+        <p:spPr/>
+        <p:txBody>
+          <a:bodyPr>
+            <a:normAutofit/>
+          </a:bodyPr>
+          <a:lstStyle/>
+          <a:p>
+            <a:r>
+              <a:rPr lang="en-US" sz="2400" dirty="0" smtClean="0"/>
+              <a:t>Direction of solving the problem </a:t>
+            </a:r>
+            <a:r>
+              <a:rPr lang="en-US" sz="2400" dirty="0" smtClean="0">
+                <a:sym typeface="Wingdings" panose="05000000000000000000" pitchFamily="2" charset="2"/>
+              </a:rPr>
+              <a:t> top</a:t>
+            </a:r>
+          </a:p>
+          <a:p>
+            <a:r>
+              <a:rPr lang="en-US" sz="2400" dirty="0" smtClean="0">
+                <a:sym typeface="Wingdings" panose="05000000000000000000" pitchFamily="2" charset="2"/>
+              </a:rPr>
+              <a:t>Each case will returning the result  recursion</a:t>
+            </a:r>
+          </a:p>
+          <a:p>
+            <a:r>
+              <a:rPr lang="en-US" sz="2400" b="1" dirty="0" smtClean="0">
+                <a:sym typeface="Wingdings" panose="05000000000000000000" pitchFamily="2" charset="2"/>
+              </a:rPr>
+              <a:t>Recursion</a:t>
+            </a:r>
+            <a:r>
+              <a:rPr lang="en-US" sz="2400" dirty="0" smtClean="0">
+                <a:sym typeface="Wingdings" panose="05000000000000000000" pitchFamily="2" charset="2"/>
+              </a:rPr>
+              <a:t>  </a:t>
+            </a:r>
+            <a:r>
+              <a:rPr lang="en-US" sz="2400" b="1" dirty="0" smtClean="0">
+                <a:sym typeface="Wingdings" panose="05000000000000000000" pitchFamily="2" charset="2"/>
+              </a:rPr>
+              <a:t>DP</a:t>
+            </a:r>
+            <a:endParaRPr lang="en-US" sz="2400" b="1" dirty="0"/>
+          </a:p>
+        </p:txBody>
+      </p:sp>
+      <p:sp>
+        <p:nvSpPr>
+          <p:cNvPr id="6" name="Text Placeholder 5"/>
+          <p:cNvSpPr>
+            <a:spLocks noGrp="1"/>
+          </p:cNvSpPr>
+          <p:nvPr>
+            <p:ph type="body" sz="quarter" idx="3"/>
+          </p:nvPr>
+        </p:nvSpPr>
+        <p:spPr/>
+        <p:txBody>
+          <a:bodyPr/>
+          <a:lstStyle/>
+          <a:p>
+            <a:pPr algn="ctr"/>
+            <a:r>
+              <a:rPr lang="en-US" dirty="0" smtClean="0"/>
+              <a:t>DP Bottom Up</a:t>
+            </a:r>
+            <a:endParaRPr lang="en-US" dirty="0"/>
+          </a:p>
+        </p:txBody>
+      </p:sp>
+      <p:sp>
+        <p:nvSpPr>
+          <p:cNvPr id="7" name="Content Placeholder 6"/>
+          <p:cNvSpPr>
+            <a:spLocks noGrp="1"/>
+          </p:cNvSpPr>
+          <p:nvPr>
+            <p:ph sz="quarter" idx="4"/>
+          </p:nvPr>
+        </p:nvSpPr>
+        <p:spPr/>
+        <p:txBody>
+          <a:bodyPr>
+            <a:normAutofit/>
+          </a:bodyPr>
+          <a:lstStyle/>
+          <a:p>
+            <a:r>
+              <a:rPr lang="en-US" sz="2400" dirty="0"/>
+              <a:t>Direction of solving the problem </a:t>
+            </a:r>
+            <a:r>
+              <a:rPr lang="en-US" sz="2400" dirty="0">
+                <a:sym typeface="Wingdings" panose="05000000000000000000" pitchFamily="2" charset="2"/>
+              </a:rPr>
+              <a:t> </a:t>
+            </a:r>
+            <a:r>
+              <a:rPr lang="en-US" sz="2400" dirty="0" smtClean="0">
+                <a:sym typeface="Wingdings" panose="05000000000000000000" pitchFamily="2" charset="2"/>
+              </a:rPr>
+              <a:t>bottom</a:t>
+            </a:r>
+            <a:endParaRPr lang="en-US" sz="2400" dirty="0"/>
+          </a:p>
+          <a:p>
+            <a:r>
+              <a:rPr lang="en-US" sz="2400" dirty="0" smtClean="0"/>
+              <a:t>The result will be returned at the end of algorithm/iteration</a:t>
+            </a:r>
+          </a:p>
+          <a:p>
+            <a:r>
+              <a:rPr lang="en-US" sz="2400" dirty="0" smtClean="0"/>
+              <a:t>Define </a:t>
+            </a:r>
+            <a:r>
+              <a:rPr lang="en-US" sz="2400" b="1" dirty="0" smtClean="0"/>
+              <a:t>a new approach </a:t>
+            </a:r>
+            <a:r>
+              <a:rPr lang="en-US" sz="2400" b="1" dirty="0" smtClean="0">
+                <a:sym typeface="Wingdings" panose="05000000000000000000" pitchFamily="2" charset="2"/>
+              </a:rPr>
+              <a:t> regular iteration</a:t>
+            </a:r>
+            <a:endParaRPr lang="en-US" sz="2400" b="1" dirty="0"/>
+          </a:p>
+        </p:txBody>
+      </p:sp>
+    </p:spTree>
+    <p:extLst>
+      <p:ext uri="{BB962C8B-B14F-4D97-AF65-F5344CB8AC3E}">
+        <p14:creationId xmlns:p14="http://schemas.microsoft.com/office/powerpoint/2010/main" val="3106144361"/>
+      </p:ext>
+    </p:extLst>
+  </p:cSld>
+  <p:clrMapOvr>
+    <a:masterClrMapping/>
+  </p:clrMapOvr>
+  <p:timing>
+    <p:tnLst>
+      <p:par>
+        <p:cTn id="1" dur="indefinite" restart="never" nodeType="tmRoot"/>
+      </p:par>
+    </p:tnLst>
+  </p:timing>
+</p:sld>
+</file>
+
+<file path=ppt/slides/slide36.xml><?xml version="1.0" encoding="utf-8"?>
+<p:sld xmlns:a="http://schemas.openxmlformats.org/drawingml/2006/main" xmlns:r="http://schemas.openxmlformats.org/officeDocument/2006/relationships" xmlns:p="http://schemas.openxmlformats.org/presentationml/2006/main">
+  <p:cSld>
+    <p:spTree>
+      <p:nvGrpSpPr>
+        <p:cNvPr id="1" name=""/>
+        <p:cNvGrpSpPr/>
+        <p:nvPr/>
+      </p:nvGrpSpPr>
+      <p:grpSpPr>
+        <a:xfrm>
+          <a:off x="0" y="0"/>
+          <a:ext cx="0" cy="0"/>
+          <a:chOff x="0" y="0"/>
+          <a:chExt cx="0" cy="0"/>
+        </a:xfrm>
+      </p:grpSpPr>
+      <p:sp>
+        <p:nvSpPr>
+          <p:cNvPr id="2" name="Title 1"/>
+          <p:cNvSpPr>
+            <a:spLocks noGrp="1"/>
+          </p:cNvSpPr>
+          <p:nvPr>
+            <p:ph type="title"/>
+          </p:nvPr>
+        </p:nvSpPr>
+        <p:spPr/>
+        <p:txBody>
+          <a:bodyPr/>
+          <a:lstStyle/>
+          <a:p>
+            <a:r>
+              <a:rPr lang="en-US" dirty="0" smtClean="0"/>
+              <a:t>Terminology</a:t>
+            </a:r>
+            <a:endParaRPr lang="en-US" dirty="0"/>
+          </a:p>
+        </p:txBody>
+      </p:sp>
+      <p:sp>
+        <p:nvSpPr>
+          <p:cNvPr id="3" name="Content Placeholder 2"/>
+          <p:cNvSpPr>
+            <a:spLocks noGrp="1"/>
+          </p:cNvSpPr>
+          <p:nvPr>
+            <p:ph sz="half" idx="1"/>
+          </p:nvPr>
+        </p:nvSpPr>
+        <p:spPr/>
+        <p:txBody>
+          <a:bodyPr>
+            <a:normAutofit/>
+          </a:bodyPr>
+          <a:lstStyle/>
+          <a:p>
+            <a:pPr marL="0" indent="0">
+              <a:buNone/>
+            </a:pPr>
+            <a:r>
+              <a:rPr lang="en-US" sz="2800" dirty="0" smtClean="0"/>
+              <a:t>iterative algorithm</a:t>
+            </a:r>
+            <a:endParaRPr lang="en-US" sz="2800" dirty="0"/>
+          </a:p>
+          <a:p>
+            <a:pPr marL="0" indent="0">
+              <a:buNone/>
+            </a:pPr>
+            <a:r>
+              <a:rPr lang="en-US" sz="2800" dirty="0" smtClean="0"/>
+              <a:t>recurrence</a:t>
+            </a:r>
+          </a:p>
+          <a:p>
+            <a:pPr marL="0" indent="0">
+              <a:buNone/>
+            </a:pPr>
+            <a:r>
+              <a:rPr lang="en-US" sz="2800" dirty="0"/>
+              <a:t>substitution method</a:t>
+            </a:r>
+          </a:p>
+          <a:p>
+            <a:pPr marL="0" indent="0">
+              <a:buNone/>
+            </a:pPr>
+            <a:r>
+              <a:rPr lang="en-US" sz="2800" dirty="0" smtClean="0"/>
+              <a:t>recursion tree</a:t>
+            </a:r>
+          </a:p>
+          <a:p>
+            <a:pPr marL="0" indent="0">
+              <a:buNone/>
+            </a:pPr>
+            <a:r>
+              <a:rPr lang="en-US" sz="2800" dirty="0" smtClean="0"/>
+              <a:t>master method</a:t>
+            </a:r>
+          </a:p>
+          <a:p>
+            <a:pPr marL="0" indent="0">
+              <a:buNone/>
+            </a:pPr>
+            <a:r>
+              <a:rPr lang="en-US" sz="2800" dirty="0" smtClean="0"/>
+              <a:t>asymptotic notation</a:t>
+            </a:r>
+            <a:endParaRPr lang="en-US" dirty="0"/>
+          </a:p>
+        </p:txBody>
+      </p:sp>
+      <p:sp>
+        <p:nvSpPr>
+          <p:cNvPr id="4" name="Content Placeholder 3"/>
+          <p:cNvSpPr>
+            <a:spLocks noGrp="1"/>
+          </p:cNvSpPr>
+          <p:nvPr>
+            <p:ph sz="half" idx="2"/>
+          </p:nvPr>
+        </p:nvSpPr>
+        <p:spPr/>
+        <p:txBody>
+          <a:bodyPr>
+            <a:normAutofit/>
+          </a:bodyPr>
+          <a:lstStyle/>
+          <a:p>
+            <a:pPr marL="0" indent="0">
+              <a:buNone/>
+            </a:pPr>
+            <a:r>
+              <a:rPr lang="en-US" sz="2800" dirty="0" smtClean="0"/>
+              <a:t>dynamic programming</a:t>
+            </a:r>
+          </a:p>
+          <a:p>
+            <a:pPr marL="0" indent="0">
+              <a:buNone/>
+            </a:pPr>
+            <a:r>
+              <a:rPr lang="en-US" sz="2800" dirty="0"/>
+              <a:t>m</a:t>
+            </a:r>
+            <a:r>
+              <a:rPr lang="en-US" sz="2800" dirty="0" smtClean="0"/>
+              <a:t>emo table</a:t>
+            </a:r>
+          </a:p>
+          <a:p>
+            <a:pPr marL="0" indent="0">
+              <a:buNone/>
+            </a:pPr>
+            <a:r>
+              <a:rPr lang="en-US" sz="2800" dirty="0" smtClean="0"/>
+              <a:t>DP top-down</a:t>
+            </a:r>
+            <a:endParaRPr lang="en-US" sz="2800" dirty="0" smtClean="0"/>
+          </a:p>
+          <a:p>
+            <a:pPr marL="0" indent="0">
+              <a:buNone/>
+            </a:pPr>
+            <a:r>
+              <a:rPr lang="en-US" sz="2800" dirty="0"/>
+              <a:t>DP </a:t>
+            </a:r>
+            <a:r>
+              <a:rPr lang="en-US" sz="2800" dirty="0" smtClean="0"/>
+              <a:t>bottom-up</a:t>
+            </a:r>
+            <a:endParaRPr lang="en-US" sz="2800" dirty="0"/>
+          </a:p>
+        </p:txBody>
+      </p:sp>
+    </p:spTree>
+    <p:extLst>
+      <p:ext uri="{BB962C8B-B14F-4D97-AF65-F5344CB8AC3E}">
+        <p14:creationId xmlns:p14="http://schemas.microsoft.com/office/powerpoint/2010/main" val="83867626"/>
+      </p:ext>
+    </p:extLst>
+  </p:cSld>
+  <p:clrMapOvr>
+    <a:masterClrMapping/>
+  </p:clrMapOvr>
+  <p:timing>
+    <p:tnLst>
+      <p:par>
+        <p:cTn id="1" dur="indefinite" restart="never" nodeType="tmRoot"/>
+      </p:par>
+    </p:tnLst>
+  </p:timing>
+</p:sld>
+</file>
+
+<file path=ppt/slides/slide37.xml><?xml version="1.0" encoding="utf-8"?>
+<p:sld xmlns:a="http://schemas.openxmlformats.org/drawingml/2006/main" xmlns:r="http://schemas.openxmlformats.org/officeDocument/2006/relationships" xmlns:p="http://schemas.openxmlformats.org/presentationml/2006/main">
+  <p:cSld>
+    <p:spTree>
+      <p:nvGrpSpPr>
+        <p:cNvPr id="1" name=""/>
+        <p:cNvGrpSpPr/>
+        <p:nvPr/>
+      </p:nvGrpSpPr>
+      <p:grpSpPr>
+        <a:xfrm>
+          <a:off x="0" y="0"/>
+          <a:ext cx="0" cy="0"/>
+          <a:chOff x="0" y="0"/>
+          <a:chExt cx="0" cy="0"/>
+        </a:xfrm>
+      </p:grpSpPr>
+      <p:sp>
+        <p:nvSpPr>
+          <p:cNvPr id="2" name="Title 1"/>
+          <p:cNvSpPr>
+            <a:spLocks noGrp="1"/>
+          </p:cNvSpPr>
+          <p:nvPr>
+            <p:ph type="title"/>
+          </p:nvPr>
+        </p:nvSpPr>
+        <p:spPr/>
+        <p:txBody>
+          <a:bodyPr/>
+          <a:lstStyle/>
+          <a:p>
+            <a:r>
+              <a:rPr lang="en-US" dirty="0" smtClean="0"/>
+              <a:t>Summary</a:t>
             </a:r>
             <a:endParaRPr lang="en-US" dirty="0"/>
           </a:p>
@@ -15119,61 +15516,64 @@
         </p:nvSpPr>
         <p:spPr/>
         <p:txBody>
-          <a:bodyPr/>
+          <a:bodyPr>
+            <a:normAutofit/>
+          </a:bodyPr>
           <a:lstStyle/>
           <a:p>
             <a:r>
               <a:rPr lang="en-US" dirty="0" smtClean="0"/>
-              <a:t>Create </a:t>
-            </a:r>
-            <a:r>
-              <a:rPr lang="en-US" dirty="0"/>
-              <a:t>an account on SPOJ (</a:t>
-            </a:r>
-            <a:r>
-              <a:rPr lang="en-US" dirty="0">
-                <a:hlinkClick r:id="rId2"/>
-              </a:rPr>
-              <a:t>http://www.spoj.com</a:t>
-            </a:r>
-            <a:r>
-              <a:rPr lang="en-US" dirty="0" smtClean="0">
-                <a:hlinkClick r:id="rId2"/>
-              </a:rPr>
-              <a:t>/</a:t>
-            </a:r>
+              <a:t>Pseudocode convention</a:t>
+            </a:r>
+          </a:p>
+          <a:p>
             <a:r>
               <a:rPr lang="en-US" dirty="0" smtClean="0"/>
-              <a:t>) </a:t>
+              <a:t>Complexity analysis: iterative, recursive</a:t>
             </a:r>
           </a:p>
           <a:p>
             <a:r>
               <a:rPr lang="en-US" dirty="0" smtClean="0"/>
-              <a:t>Solve </a:t>
-            </a:r>
-            <a:r>
-              <a:rPr lang="en-US" b="1" dirty="0" smtClean="0"/>
-              <a:t>SMPSEQ4</a:t>
-            </a:r>
+              <a:t>Asymptotic notation</a:t>
+            </a:r>
+          </a:p>
+          <a:p>
             <a:r>
               <a:rPr lang="en-US" dirty="0" smtClean="0"/>
-              <a:t> and submit your code</a:t>
-            </a:r>
-            <a:endParaRPr lang="en-US" dirty="0"/>
+              <a:t>Examples:</a:t>
+            </a:r>
+          </a:p>
+          <a:p>
+            <a:pPr lvl="1"/>
+            <a:r>
+              <a:rPr lang="en-US" dirty="0" smtClean="0"/>
+              <a:t>Fibonacci: iterative, recursive, DP</a:t>
+            </a:r>
+          </a:p>
+          <a:p>
+            <a:pPr lvl="1"/>
+            <a:endParaRPr lang="en-US" dirty="0" smtClean="0"/>
           </a:p>
         </p:txBody>
       </p:sp>
     </p:spTree>
     <p:extLst>
       <p:ext uri="{BB962C8B-B14F-4D97-AF65-F5344CB8AC3E}">
-        <p14:creationId xmlns:p14="http://schemas.microsoft.com/office/powerpoint/2010/main" val="947968129"/>
+        <p14:creationId xmlns:p14="http://schemas.microsoft.com/office/powerpoint/2010/main" val="2996499416"/>
       </p:ext>
     </p:extLst>
   </p:cSld>
   <p:clrMapOvr>
     <a:masterClrMapping/>
   </p:clrMapOvr>
+  <p:timing>
+    <p:tnLst>
+      <p:par>
+        <p:cTn id="1" dur="indefinite" restart="never" nodeType="tmRoot"/>
+      </p:par>
+    </p:tnLst>
+  </p:timing>
 </p:sld>
 </file>
 
@@ -15486,15 +15886,7 @@
             <a:pPr marL="357188" indent="-357188"/>
             <a:r>
               <a:rPr lang="en-US" dirty="0" smtClean="0"/>
-              <a:t>Review of </a:t>
-            </a:r>
-            <a:r>
-              <a:rPr lang="en-US" dirty="0" smtClean="0"/>
-              <a:t>DAA </a:t>
-            </a:r>
-            <a:r>
-              <a:rPr lang="en-US" dirty="0" smtClean="0"/>
-              <a:t>1</a:t>
+              <a:t>Review of DAA 1</a:t>
             </a:r>
           </a:p>
           <a:p>
@@ -15623,15 +16015,7 @@
             </a:pPr>
             <a:r>
               <a:rPr lang="en-US" sz="4300" dirty="0" smtClean="0"/>
-              <a:t>Recap from </a:t>
-            </a:r>
-            <a:r>
-              <a:rPr lang="en-US" sz="4300" dirty="0" smtClean="0"/>
-              <a:t>DAA 1, </a:t>
-            </a:r>
-            <a:r>
-              <a:rPr lang="en-US" sz="4300" dirty="0" smtClean="0"/>
-              <a:t>we will use </a:t>
+              <a:t>Recap from DAA 1, we will use </a:t>
             </a:r>
             <a:r>
               <a:rPr lang="en-US" sz="4300" b="1" dirty="0" smtClean="0">

</xml_diff>

<commit_message>
Updating after week02 class
</commit_message>
<xml_diff>
--- a/161702/presentation/01 - Syllabus, Review of PAA 1/01. Syllabus, Review of PAA 1.pptx
+++ b/161702/presentation/01 - Syllabus, Review of PAA 1/01. Syllabus, Review of PAA 1.pptx
@@ -41,7 +41,7 @@
     <p:sldId id="286" r:id="rId32"/>
     <p:sldId id="287" r:id="rId33"/>
     <p:sldId id="293" r:id="rId34"/>
-    <p:sldId id="294" r:id="rId35"/>
+    <p:sldId id="295" r:id="rId35"/>
     <p:sldId id="292" r:id="rId36"/>
     <p:sldId id="259" r:id="rId37"/>
     <p:sldId id="260" r:id="rId38"/>
@@ -12341,7 +12341,7 @@
           <a:graphicData uri="http://schemas.openxmlformats.org/presentationml/2006/ole">
             <mc:AlternateContent xmlns:mc="http://schemas.openxmlformats.org/markup-compatibility/2006">
               <mc:Choice xmlns:v="urn:schemas-microsoft-com:vml" Requires="v">
-                <p:oleObj spid="_x0000_s3449" name="Equation" r:id="rId3" imgW="1346040" imgH="253800" progId="Equation.DSMT4">
+                <p:oleObj spid="_x0000_s3479" name="Equation" r:id="rId3" imgW="1346040" imgH="253800" progId="Equation.DSMT4">
                   <p:embed/>
                 </p:oleObj>
               </mc:Choice>
@@ -12398,7 +12398,7 @@
           <a:graphicData uri="http://schemas.openxmlformats.org/presentationml/2006/ole">
             <mc:AlternateContent xmlns:mc="http://schemas.openxmlformats.org/markup-compatibility/2006">
               <mc:Choice xmlns:v="urn:schemas-microsoft-com:vml" Requires="v">
-                <p:oleObj spid="_x0000_s3450" name="Equation" r:id="rId5" imgW="1549080" imgH="1523880" progId="Equation.DSMT4">
+                <p:oleObj spid="_x0000_s3480" name="Equation" r:id="rId5" imgW="1549080" imgH="1523880" progId="Equation.DSMT4">
                   <p:embed/>
                 </p:oleObj>
               </mc:Choice>
@@ -12455,7 +12455,7 @@
           <a:graphicData uri="http://schemas.openxmlformats.org/presentationml/2006/ole">
             <mc:AlternateContent xmlns:mc="http://schemas.openxmlformats.org/markup-compatibility/2006">
               <mc:Choice xmlns:v="urn:schemas-microsoft-com:vml" Requires="v">
-                <p:oleObj spid="_x0000_s3451" name="Equation" r:id="rId7" imgW="2361960" imgH="253800" progId="Equation.DSMT4">
+                <p:oleObj spid="_x0000_s3481" name="Equation" r:id="rId7" imgW="2361960" imgH="253800" progId="Equation.DSMT4">
                   <p:embed/>
                 </p:oleObj>
               </mc:Choice>
@@ -12601,7 +12601,7 @@
           <a:graphicData uri="http://schemas.openxmlformats.org/presentationml/2006/ole">
             <mc:AlternateContent xmlns:mc="http://schemas.openxmlformats.org/markup-compatibility/2006">
               <mc:Choice xmlns:v="urn:schemas-microsoft-com:vml" Requires="v">
-                <p:oleObj spid="_x0000_s1168" name="Equation" r:id="rId4" imgW="1346040" imgH="253800" progId="Equation.DSMT4">
+                <p:oleObj spid="_x0000_s1178" name="Equation" r:id="rId4" imgW="1346040" imgH="253800" progId="Equation.DSMT4">
                   <p:embed/>
                 </p:oleObj>
               </mc:Choice>
@@ -12802,7 +12802,7 @@
           <a:graphicData uri="http://schemas.openxmlformats.org/presentationml/2006/ole">
             <mc:AlternateContent xmlns:mc="http://schemas.openxmlformats.org/markup-compatibility/2006">
               <mc:Choice xmlns:v="urn:schemas-microsoft-com:vml" Requires="v">
-                <p:oleObj spid="_x0000_s2320" name="Equation" r:id="rId3" imgW="1346040" imgH="1638000" progId="Equation.DSMT4">
+                <p:oleObj spid="_x0000_s2340" name="Equation" r:id="rId3" imgW="1346040" imgH="1638000" progId="Equation.DSMT4">
                   <p:embed/>
                 </p:oleObj>
               </mc:Choice>
@@ -12859,7 +12859,7 @@
           <a:graphicData uri="http://schemas.openxmlformats.org/presentationml/2006/ole">
             <mc:AlternateContent xmlns:mc="http://schemas.openxmlformats.org/markup-compatibility/2006">
               <mc:Choice xmlns:v="urn:schemas-microsoft-com:vml" Requires="v">
-                <p:oleObj spid="_x0000_s2321" name="Equation" r:id="rId5" imgW="1104840" imgH="482400" progId="Equation.DSMT4">
+                <p:oleObj spid="_x0000_s2341" name="Equation" r:id="rId5" imgW="1104840" imgH="482400" progId="Equation.DSMT4">
                   <p:embed/>
                 </p:oleObj>
               </mc:Choice>
@@ -12976,7 +12976,7 @@
           <a:graphicData uri="http://schemas.openxmlformats.org/presentationml/2006/ole">
             <mc:AlternateContent xmlns:mc="http://schemas.openxmlformats.org/markup-compatibility/2006">
               <mc:Choice xmlns:v="urn:schemas-microsoft-com:vml" Requires="v">
-                <p:oleObj spid="_x0000_s4425" name="Equation" r:id="rId3" imgW="4368600" imgH="533160" progId="Equation.DSMT4">
+                <p:oleObj spid="_x0000_s4455" name="Equation" r:id="rId3" imgW="4368600" imgH="533160" progId="Equation.DSMT4">
                   <p:embed/>
                 </p:oleObj>
               </mc:Choice>
@@ -13033,7 +13033,7 @@
           <a:graphicData uri="http://schemas.openxmlformats.org/presentationml/2006/ole">
             <mc:AlternateContent xmlns:mc="http://schemas.openxmlformats.org/markup-compatibility/2006">
               <mc:Choice xmlns:v="urn:schemas-microsoft-com:vml" Requires="v">
-                <p:oleObj spid="_x0000_s4426" name="Equation" r:id="rId5" imgW="4089240" imgH="533160" progId="Equation.DSMT4">
+                <p:oleObj spid="_x0000_s4456" name="Equation" r:id="rId5" imgW="4089240" imgH="533160" progId="Equation.DSMT4">
                   <p:embed/>
                 </p:oleObj>
               </mc:Choice>
@@ -13090,7 +13090,7 @@
           <a:graphicData uri="http://schemas.openxmlformats.org/presentationml/2006/ole">
             <mc:AlternateContent xmlns:mc="http://schemas.openxmlformats.org/markup-compatibility/2006">
               <mc:Choice xmlns:v="urn:schemas-microsoft-com:vml" Requires="v">
-                <p:oleObj spid="_x0000_s4427" name="Equation" r:id="rId7" imgW="4101840" imgH="533160" progId="Equation.DSMT4">
+                <p:oleObj spid="_x0000_s4457" name="Equation" r:id="rId7" imgW="4101840" imgH="533160" progId="Equation.DSMT4">
                   <p:embed/>
                 </p:oleObj>
               </mc:Choice>
@@ -13207,7 +13207,7 @@
           <a:graphicData uri="http://schemas.openxmlformats.org/presentationml/2006/ole">
             <mc:AlternateContent xmlns:mc="http://schemas.openxmlformats.org/markup-compatibility/2006">
               <mc:Choice xmlns:v="urn:schemas-microsoft-com:vml" Requires="v">
-                <p:oleObj spid="_x0000_s5338" name="Equation" r:id="rId3" imgW="4470120" imgH="1244520" progId="Equation.DSMT4">
+                <p:oleObj spid="_x0000_s5358" name="Equation" r:id="rId3" imgW="4470120" imgH="1244520" progId="Equation.DSMT4">
                   <p:embed/>
                 </p:oleObj>
               </mc:Choice>
@@ -13264,7 +13264,7 @@
           <a:graphicData uri="http://schemas.openxmlformats.org/presentationml/2006/ole">
             <mc:AlternateContent xmlns:mc="http://schemas.openxmlformats.org/markup-compatibility/2006">
               <mc:Choice xmlns:v="urn:schemas-microsoft-com:vml" Requires="v">
-                <p:oleObj spid="_x0000_s5339" name="Equation" r:id="rId5" imgW="4495680" imgH="1244520" progId="Equation.DSMT4">
+                <p:oleObj spid="_x0000_s5359" name="Equation" r:id="rId5" imgW="4495680" imgH="1244520" progId="Equation.DSMT4">
                   <p:embed/>
                 </p:oleObj>
               </mc:Choice>
@@ -14462,7 +14462,7 @@
           <a:graphicData uri="http://schemas.openxmlformats.org/presentationml/2006/ole">
             <mc:AlternateContent xmlns:mc="http://schemas.openxmlformats.org/markup-compatibility/2006">
               <mc:Choice xmlns:v="urn:schemas-microsoft-com:vml" Requires="v">
-                <p:oleObj spid="_x0000_s6234" name="Equation" r:id="rId3" imgW="914400" imgH="190440" progId="Equation.DSMT4">
+                <p:oleObj spid="_x0000_s6244" name="Equation" r:id="rId3" imgW="914400" imgH="190440" progId="Equation.DSMT4">
                   <p:embed/>
                 </p:oleObj>
               </mc:Choice>
@@ -14957,6 +14957,13 @@
   <p:clrMapOvr>
     <a:masterClrMapping/>
   </p:clrMapOvr>
+  <p:timing>
+    <p:tnLst>
+      <p:par>
+        <p:cTn id="1" dur="indefinite" restart="never" nodeType="tmRoot"/>
+      </p:par>
+    </p:tnLst>
+  </p:timing>
 </p:sld>
 </file>
 
@@ -14994,7 +15001,7 @@
           <a:p>
             <a:r>
               <a:rPr lang="en-US" dirty="0" smtClean="0"/>
-              <a:t>DP Bottom Up</a:t>
+              <a:t>The differences of DP Top Down vs DP Bottom Up</a:t>
             </a:r>
             <a:endParaRPr lang="en-US" dirty="0"/>
           </a:p>
@@ -15002,12 +15009,12 @@
       </p:sp>
       <p:sp>
         <p:nvSpPr>
-          <p:cNvPr id="3" name="Content Placeholder 2"/>
+          <p:cNvPr id="4" name="Text Placeholder 3"/>
           <p:cNvSpPr>
             <a:spLocks noGrp="1"/>
           </p:cNvSpPr>
           <p:nvPr>
-            <p:ph idx="1"/>
+            <p:ph type="body" idx="1"/>
           </p:nvPr>
         </p:nvSpPr>
         <p:spPr/>
@@ -15015,14 +15022,136 @@
           <a:bodyPr/>
           <a:lstStyle/>
           <a:p>
+            <a:pPr algn="ctr"/>
+            <a:r>
+              <a:rPr lang="en-US" dirty="0" smtClean="0"/>
+              <a:t>DP Top Down</a:t>
+            </a:r>
             <a:endParaRPr lang="en-US" dirty="0"/>
+          </a:p>
+        </p:txBody>
+      </p:sp>
+      <p:sp>
+        <p:nvSpPr>
+          <p:cNvPr id="5" name="Content Placeholder 4"/>
+          <p:cNvSpPr>
+            <a:spLocks noGrp="1"/>
+          </p:cNvSpPr>
+          <p:nvPr>
+            <p:ph sz="half" idx="2"/>
+          </p:nvPr>
+        </p:nvSpPr>
+        <p:spPr/>
+        <p:txBody>
+          <a:bodyPr>
+            <a:normAutofit/>
+          </a:bodyPr>
+          <a:lstStyle/>
+          <a:p>
+            <a:r>
+              <a:rPr lang="en-US" sz="2400" dirty="0" smtClean="0"/>
+              <a:t>recursive + memo </a:t>
+            </a:r>
+            <a:r>
+              <a:rPr lang="en-US" sz="2400" dirty="0" smtClean="0">
+                <a:sym typeface="Wingdings" panose="05000000000000000000" pitchFamily="2" charset="2"/>
+              </a:rPr>
+              <a:t> DP</a:t>
+            </a:r>
+          </a:p>
+          <a:p>
+            <a:r>
+              <a:rPr lang="en-US" sz="2400" dirty="0" smtClean="0">
+                <a:sym typeface="Wingdings" panose="05000000000000000000" pitchFamily="2" charset="2"/>
+              </a:rPr>
+              <a:t>Based on </a:t>
+            </a:r>
+            <a:r>
+              <a:rPr lang="en-US" sz="2400" b="1" dirty="0" smtClean="0">
+                <a:solidFill>
+                  <a:srgbClr val="0070C0"/>
+                </a:solidFill>
+                <a:sym typeface="Wingdings" panose="05000000000000000000" pitchFamily="2" charset="2"/>
+              </a:rPr>
+              <a:t>recurrence</a:t>
+            </a:r>
+          </a:p>
+          <a:p>
+            <a:endParaRPr lang="en-US" sz="2400" dirty="0"/>
+          </a:p>
+        </p:txBody>
+      </p:sp>
+      <p:sp>
+        <p:nvSpPr>
+          <p:cNvPr id="6" name="Text Placeholder 5"/>
+          <p:cNvSpPr>
+            <a:spLocks noGrp="1"/>
+          </p:cNvSpPr>
+          <p:nvPr>
+            <p:ph type="body" sz="quarter" idx="3"/>
+          </p:nvPr>
+        </p:nvSpPr>
+        <p:spPr/>
+        <p:txBody>
+          <a:bodyPr/>
+          <a:lstStyle/>
+          <a:p>
+            <a:pPr algn="ctr"/>
+            <a:r>
+              <a:rPr lang="en-US" dirty="0" smtClean="0"/>
+              <a:t>DP Bottom Up</a:t>
+            </a:r>
+            <a:endParaRPr lang="en-US" dirty="0"/>
+          </a:p>
+        </p:txBody>
+      </p:sp>
+      <p:sp>
+        <p:nvSpPr>
+          <p:cNvPr id="7" name="Content Placeholder 6"/>
+          <p:cNvSpPr>
+            <a:spLocks noGrp="1"/>
+          </p:cNvSpPr>
+          <p:nvPr>
+            <p:ph sz="quarter" idx="4"/>
+          </p:nvPr>
+        </p:nvSpPr>
+        <p:spPr/>
+        <p:txBody>
+          <a:bodyPr>
+            <a:normAutofit/>
+          </a:bodyPr>
+          <a:lstStyle/>
+          <a:p>
+            <a:r>
+              <a:rPr lang="en-US" sz="2400" dirty="0" smtClean="0"/>
+              <a:t>iterative</a:t>
+            </a:r>
+          </a:p>
+          <a:p>
+            <a:r>
+              <a:rPr lang="en-US" sz="2400" dirty="0" smtClean="0"/>
+              <a:t>Define </a:t>
+            </a:r>
+            <a:r>
+              <a:rPr lang="en-US" sz="2400" b="1" dirty="0" smtClean="0">
+                <a:solidFill>
+                  <a:srgbClr val="0070C0"/>
+                </a:solidFill>
+              </a:rPr>
+              <a:t>a new solutions</a:t>
+            </a:r>
+            <a:endParaRPr lang="en-US" sz="2400" b="1" dirty="0">
+              <a:solidFill>
+                <a:srgbClr val="0070C0"/>
+              </a:solidFill>
+            </a:endParaRPr>
           </a:p>
         </p:txBody>
       </p:sp>
     </p:spTree>
     <p:extLst>
       <p:ext uri="{BB962C8B-B14F-4D97-AF65-F5344CB8AC3E}">
-        <p14:creationId xmlns:p14="http://schemas.microsoft.com/office/powerpoint/2010/main" val="347435707"/>
+        <p14:creationId xmlns:p14="http://schemas.microsoft.com/office/powerpoint/2010/main" val="3699580524"/>
       </p:ext>
     </p:extLst>
   </p:cSld>

</xml_diff>